<commit_message>
añadido los componentes, completos, de la aplicacion
</commit_message>
<xml_diff>
--- a/Presentacion FutbolFichajes.pptx
+++ b/Presentacion FutbolFichajes.pptx
@@ -263,7 +263,7 @@
           <a:p>
             <a:fld id="{AF2B4D62-3BA8-E643-8809-D7017F5BF04E}" type="datetimeFigureOut">
               <a:rPr lang="es-ES" smtClean="0"/>
-              <a:t>29/11/20</a:t>
+              <a:t>2/12/20</a:t>
             </a:fld>
             <a:endParaRPr lang="es-ES"/>
           </a:p>
@@ -461,7 +461,7 @@
           <a:p>
             <a:fld id="{AF2B4D62-3BA8-E643-8809-D7017F5BF04E}" type="datetimeFigureOut">
               <a:rPr lang="es-ES" smtClean="0"/>
-              <a:t>29/11/20</a:t>
+              <a:t>2/12/20</a:t>
             </a:fld>
             <a:endParaRPr lang="es-ES"/>
           </a:p>
@@ -669,7 +669,7 @@
           <a:p>
             <a:fld id="{AF2B4D62-3BA8-E643-8809-D7017F5BF04E}" type="datetimeFigureOut">
               <a:rPr lang="es-ES" smtClean="0"/>
-              <a:t>29/11/20</a:t>
+              <a:t>2/12/20</a:t>
             </a:fld>
             <a:endParaRPr lang="es-ES"/>
           </a:p>
@@ -867,7 +867,7 @@
           <a:p>
             <a:fld id="{AF2B4D62-3BA8-E643-8809-D7017F5BF04E}" type="datetimeFigureOut">
               <a:rPr lang="es-ES" smtClean="0"/>
-              <a:t>29/11/20</a:t>
+              <a:t>2/12/20</a:t>
             </a:fld>
             <a:endParaRPr lang="es-ES"/>
           </a:p>
@@ -1142,7 +1142,7 @@
           <a:p>
             <a:fld id="{AF2B4D62-3BA8-E643-8809-D7017F5BF04E}" type="datetimeFigureOut">
               <a:rPr lang="es-ES" smtClean="0"/>
-              <a:t>29/11/20</a:t>
+              <a:t>2/12/20</a:t>
             </a:fld>
             <a:endParaRPr lang="es-ES"/>
           </a:p>
@@ -1407,7 +1407,7 @@
           <a:p>
             <a:fld id="{AF2B4D62-3BA8-E643-8809-D7017F5BF04E}" type="datetimeFigureOut">
               <a:rPr lang="es-ES" smtClean="0"/>
-              <a:t>29/11/20</a:t>
+              <a:t>2/12/20</a:t>
             </a:fld>
             <a:endParaRPr lang="es-ES"/>
           </a:p>
@@ -1819,7 +1819,7 @@
           <a:p>
             <a:fld id="{AF2B4D62-3BA8-E643-8809-D7017F5BF04E}" type="datetimeFigureOut">
               <a:rPr lang="es-ES" smtClean="0"/>
-              <a:t>29/11/20</a:t>
+              <a:t>2/12/20</a:t>
             </a:fld>
             <a:endParaRPr lang="es-ES"/>
           </a:p>
@@ -1960,7 +1960,7 @@
           <a:p>
             <a:fld id="{AF2B4D62-3BA8-E643-8809-D7017F5BF04E}" type="datetimeFigureOut">
               <a:rPr lang="es-ES" smtClean="0"/>
-              <a:t>29/11/20</a:t>
+              <a:t>2/12/20</a:t>
             </a:fld>
             <a:endParaRPr lang="es-ES"/>
           </a:p>
@@ -2073,7 +2073,7 @@
           <a:p>
             <a:fld id="{AF2B4D62-3BA8-E643-8809-D7017F5BF04E}" type="datetimeFigureOut">
               <a:rPr lang="es-ES" smtClean="0"/>
-              <a:t>29/11/20</a:t>
+              <a:t>2/12/20</a:t>
             </a:fld>
             <a:endParaRPr lang="es-ES"/>
           </a:p>
@@ -2384,7 +2384,7 @@
           <a:p>
             <a:fld id="{AF2B4D62-3BA8-E643-8809-D7017F5BF04E}" type="datetimeFigureOut">
               <a:rPr lang="es-ES" smtClean="0"/>
-              <a:t>29/11/20</a:t>
+              <a:t>2/12/20</a:t>
             </a:fld>
             <a:endParaRPr lang="es-ES"/>
           </a:p>
@@ -2675,7 +2675,7 @@
           <a:p>
             <a:fld id="{AF2B4D62-3BA8-E643-8809-D7017F5BF04E}" type="datetimeFigureOut">
               <a:rPr lang="es-ES" smtClean="0"/>
-              <a:t>29/11/20</a:t>
+              <a:t>2/12/20</a:t>
             </a:fld>
             <a:endParaRPr lang="es-ES"/>
           </a:p>
@@ -2925,7 +2925,7 @@
           <a:p>
             <a:fld id="{AF2B4D62-3BA8-E643-8809-D7017F5BF04E}" type="datetimeFigureOut">
               <a:rPr lang="es-ES" smtClean="0"/>
-              <a:t>29/11/20</a:t>
+              <a:t>2/12/20</a:t>
             </a:fld>
             <a:endParaRPr lang="es-ES"/>
           </a:p>
@@ -3561,26 +3561,20 @@
               <a:buAutoNum type="arabicPeriod"/>
             </a:pPr>
             <a:r>
+              <a:rPr lang="es-ES">
+                <a:solidFill>
+                  <a:schemeClr val="bg1"/>
+                </a:solidFill>
+              </a:rPr>
+              <a:t>Análisis </a:t>
+            </a:r>
+            <a:r>
               <a:rPr lang="es-ES" dirty="0">
                 <a:solidFill>
                   <a:schemeClr val="bg1"/>
                 </a:solidFill>
               </a:rPr>
-              <a:t>Composición de la aplicación.</a:t>
-            </a:r>
-          </a:p>
-          <a:p>
-            <a:pPr marL="514350" indent="-514350">
-              <a:buFont typeface="+mj-lt"/>
-              <a:buAutoNum type="arabicPeriod"/>
-            </a:pPr>
-            <a:r>
-              <a:rPr lang="es-ES" dirty="0">
-                <a:solidFill>
-                  <a:schemeClr val="bg1"/>
-                </a:solidFill>
-              </a:rPr>
-              <a:t>Análisis de resultados.</a:t>
+              <a:t>de resultados.</a:t>
             </a:r>
           </a:p>
           <a:p>

</xml_diff>

<commit_message>
añadido dafo tanto en memoria como el presentacion y composicion de aplicacion en presentacion
</commit_message>
<xml_diff>
--- a/Presentacion FutbolFichajes.pptx
+++ b/Presentacion FutbolFichajes.pptx
@@ -9,7 +9,9 @@
     <p:sldId id="257" r:id="rId3"/>
     <p:sldId id="258" r:id="rId4"/>
     <p:sldId id="259" r:id="rId5"/>
-    <p:sldId id="260" r:id="rId6"/>
+    <p:sldId id="261" r:id="rId6"/>
+    <p:sldId id="262" r:id="rId7"/>
+    <p:sldId id="260" r:id="rId8"/>
   </p:sldIdLst>
   <p:sldSz cx="12192000" cy="6858000"/>
   <p:notesSz cx="6858000" cy="9144000"/>
@@ -116,6 +118,2606 @@
 </p:presentation>
 </file>
 
+<file path=ppt/diagrams/colors1.xml><?xml version="1.0" encoding="utf-8"?>
+<dgm:colorsDef xmlns:dgm="http://schemas.openxmlformats.org/drawingml/2006/diagram" xmlns:a="http://schemas.openxmlformats.org/drawingml/2006/main" uniqueId="urn:microsoft.com/office/officeart/2005/8/colors/accent1_2">
+  <dgm:title val=""/>
+  <dgm:desc val=""/>
+  <dgm:catLst>
+    <dgm:cat type="accent1" pri="11200"/>
+  </dgm:catLst>
+  <dgm:styleLbl name="node0">
+    <dgm:fillClrLst meth="repeat">
+      <a:schemeClr val="accent1"/>
+    </dgm:fillClrLst>
+    <dgm:linClrLst meth="repeat">
+      <a:schemeClr val="lt1"/>
+    </dgm:linClrLst>
+    <dgm:effectClrLst/>
+    <dgm:txLinClrLst/>
+    <dgm:txFillClrLst/>
+    <dgm:txEffectClrLst/>
+  </dgm:styleLbl>
+  <dgm:styleLbl name="alignNode1">
+    <dgm:fillClrLst meth="repeat">
+      <a:schemeClr val="accent1"/>
+    </dgm:fillClrLst>
+    <dgm:linClrLst meth="repeat">
+      <a:schemeClr val="accent1"/>
+    </dgm:linClrLst>
+    <dgm:effectClrLst/>
+    <dgm:txLinClrLst/>
+    <dgm:txFillClrLst/>
+    <dgm:txEffectClrLst/>
+  </dgm:styleLbl>
+  <dgm:styleLbl name="node1">
+    <dgm:fillClrLst meth="repeat">
+      <a:schemeClr val="accent1"/>
+    </dgm:fillClrLst>
+    <dgm:linClrLst meth="repeat">
+      <a:schemeClr val="lt1"/>
+    </dgm:linClrLst>
+    <dgm:effectClrLst/>
+    <dgm:txLinClrLst/>
+    <dgm:txFillClrLst/>
+    <dgm:txEffectClrLst/>
+  </dgm:styleLbl>
+  <dgm:styleLbl name="lnNode1">
+    <dgm:fillClrLst meth="repeat">
+      <a:schemeClr val="accent1"/>
+    </dgm:fillClrLst>
+    <dgm:linClrLst meth="repeat">
+      <a:schemeClr val="lt1"/>
+    </dgm:linClrLst>
+    <dgm:effectClrLst/>
+    <dgm:txLinClrLst/>
+    <dgm:txFillClrLst/>
+    <dgm:txEffectClrLst/>
+  </dgm:styleLbl>
+  <dgm:styleLbl name="vennNode1">
+    <dgm:fillClrLst meth="repeat">
+      <a:schemeClr val="accent1">
+        <a:alpha val="50000"/>
+      </a:schemeClr>
+    </dgm:fillClrLst>
+    <dgm:linClrLst meth="repeat">
+      <a:schemeClr val="lt1"/>
+    </dgm:linClrLst>
+    <dgm:effectClrLst/>
+    <dgm:txLinClrLst/>
+    <dgm:txFillClrLst/>
+    <dgm:txEffectClrLst/>
+  </dgm:styleLbl>
+  <dgm:styleLbl name="node2">
+    <dgm:fillClrLst meth="repeat">
+      <a:schemeClr val="accent1"/>
+    </dgm:fillClrLst>
+    <dgm:linClrLst meth="repeat">
+      <a:schemeClr val="lt1"/>
+    </dgm:linClrLst>
+    <dgm:effectClrLst/>
+    <dgm:txLinClrLst/>
+    <dgm:txFillClrLst/>
+    <dgm:txEffectClrLst/>
+  </dgm:styleLbl>
+  <dgm:styleLbl name="node3">
+    <dgm:fillClrLst meth="repeat">
+      <a:schemeClr val="accent1"/>
+    </dgm:fillClrLst>
+    <dgm:linClrLst meth="repeat">
+      <a:schemeClr val="lt1"/>
+    </dgm:linClrLst>
+    <dgm:effectClrLst/>
+    <dgm:txLinClrLst/>
+    <dgm:txFillClrLst/>
+    <dgm:txEffectClrLst/>
+  </dgm:styleLbl>
+  <dgm:styleLbl name="node4">
+    <dgm:fillClrLst meth="repeat">
+      <a:schemeClr val="accent1"/>
+    </dgm:fillClrLst>
+    <dgm:linClrLst meth="repeat">
+      <a:schemeClr val="lt1"/>
+    </dgm:linClrLst>
+    <dgm:effectClrLst/>
+    <dgm:txLinClrLst/>
+    <dgm:txFillClrLst/>
+    <dgm:txEffectClrLst/>
+  </dgm:styleLbl>
+  <dgm:styleLbl name="fgImgPlace1">
+    <dgm:fillClrLst meth="repeat">
+      <a:schemeClr val="accent1">
+        <a:tint val="50000"/>
+      </a:schemeClr>
+    </dgm:fillClrLst>
+    <dgm:linClrLst meth="repeat">
+      <a:schemeClr val="lt1"/>
+    </dgm:linClrLst>
+    <dgm:effectClrLst/>
+    <dgm:txLinClrLst/>
+    <dgm:txFillClrLst meth="repeat">
+      <a:schemeClr val="lt1"/>
+    </dgm:txFillClrLst>
+    <dgm:txEffectClrLst/>
+  </dgm:styleLbl>
+  <dgm:styleLbl name="alignImgPlace1">
+    <dgm:fillClrLst meth="repeat">
+      <a:schemeClr val="accent1">
+        <a:tint val="50000"/>
+      </a:schemeClr>
+    </dgm:fillClrLst>
+    <dgm:linClrLst meth="repeat">
+      <a:schemeClr val="lt1"/>
+    </dgm:linClrLst>
+    <dgm:effectClrLst/>
+    <dgm:txLinClrLst/>
+    <dgm:txFillClrLst meth="repeat">
+      <a:schemeClr val="lt1"/>
+    </dgm:txFillClrLst>
+    <dgm:txEffectClrLst/>
+  </dgm:styleLbl>
+  <dgm:styleLbl name="bgImgPlace1">
+    <dgm:fillClrLst meth="repeat">
+      <a:schemeClr val="accent1">
+        <a:tint val="50000"/>
+      </a:schemeClr>
+    </dgm:fillClrLst>
+    <dgm:linClrLst meth="repeat">
+      <a:schemeClr val="lt1"/>
+    </dgm:linClrLst>
+    <dgm:effectClrLst/>
+    <dgm:txLinClrLst/>
+    <dgm:txFillClrLst meth="repeat">
+      <a:schemeClr val="lt1"/>
+    </dgm:txFillClrLst>
+    <dgm:txEffectClrLst/>
+  </dgm:styleLbl>
+  <dgm:styleLbl name="sibTrans2D1">
+    <dgm:fillClrLst meth="repeat">
+      <a:schemeClr val="accent1">
+        <a:tint val="60000"/>
+      </a:schemeClr>
+    </dgm:fillClrLst>
+    <dgm:linClrLst meth="repeat">
+      <a:schemeClr val="accent1">
+        <a:tint val="60000"/>
+      </a:schemeClr>
+    </dgm:linClrLst>
+    <dgm:effectClrLst/>
+    <dgm:txLinClrLst/>
+    <dgm:txFillClrLst/>
+    <dgm:txEffectClrLst/>
+  </dgm:styleLbl>
+  <dgm:styleLbl name="fgSibTrans2D1">
+    <dgm:fillClrLst meth="repeat">
+      <a:schemeClr val="accent1">
+        <a:tint val="60000"/>
+      </a:schemeClr>
+    </dgm:fillClrLst>
+    <dgm:linClrLst meth="repeat">
+      <a:schemeClr val="accent1">
+        <a:tint val="60000"/>
+      </a:schemeClr>
+    </dgm:linClrLst>
+    <dgm:effectClrLst/>
+    <dgm:txLinClrLst/>
+    <dgm:txFillClrLst/>
+    <dgm:txEffectClrLst/>
+  </dgm:styleLbl>
+  <dgm:styleLbl name="bgSibTrans2D1">
+    <dgm:fillClrLst meth="repeat">
+      <a:schemeClr val="accent1">
+        <a:tint val="60000"/>
+      </a:schemeClr>
+    </dgm:fillClrLst>
+    <dgm:linClrLst meth="repeat">
+      <a:schemeClr val="accent1">
+        <a:tint val="60000"/>
+      </a:schemeClr>
+    </dgm:linClrLst>
+    <dgm:effectClrLst/>
+    <dgm:txLinClrLst/>
+    <dgm:txFillClrLst/>
+    <dgm:txEffectClrLst/>
+  </dgm:styleLbl>
+  <dgm:styleLbl name="sibTrans1D1">
+    <dgm:fillClrLst meth="repeat">
+      <a:schemeClr val="accent1"/>
+    </dgm:fillClrLst>
+    <dgm:linClrLst meth="repeat">
+      <a:schemeClr val="accent1"/>
+    </dgm:linClrLst>
+    <dgm:effectClrLst/>
+    <dgm:txLinClrLst/>
+    <dgm:txFillClrLst meth="repeat">
+      <a:schemeClr val="tx1"/>
+    </dgm:txFillClrLst>
+    <dgm:txEffectClrLst/>
+  </dgm:styleLbl>
+  <dgm:styleLbl name="callout">
+    <dgm:fillClrLst meth="repeat">
+      <a:schemeClr val="accent1"/>
+    </dgm:fillClrLst>
+    <dgm:linClrLst meth="repeat">
+      <a:schemeClr val="accent1">
+        <a:tint val="50000"/>
+      </a:schemeClr>
+    </dgm:linClrLst>
+    <dgm:effectClrLst/>
+    <dgm:txLinClrLst/>
+    <dgm:txFillClrLst meth="repeat">
+      <a:schemeClr val="tx1"/>
+    </dgm:txFillClrLst>
+    <dgm:txEffectClrLst/>
+  </dgm:styleLbl>
+  <dgm:styleLbl name="asst0">
+    <dgm:fillClrLst meth="repeat">
+      <a:schemeClr val="accent1"/>
+    </dgm:fillClrLst>
+    <dgm:linClrLst meth="repeat">
+      <a:schemeClr val="lt1"/>
+    </dgm:linClrLst>
+    <dgm:effectClrLst/>
+    <dgm:txLinClrLst/>
+    <dgm:txFillClrLst/>
+    <dgm:txEffectClrLst/>
+  </dgm:styleLbl>
+  <dgm:styleLbl name="asst1">
+    <dgm:fillClrLst meth="repeat">
+      <a:schemeClr val="accent1"/>
+    </dgm:fillClrLst>
+    <dgm:linClrLst meth="repeat">
+      <a:schemeClr val="lt1"/>
+    </dgm:linClrLst>
+    <dgm:effectClrLst/>
+    <dgm:txLinClrLst/>
+    <dgm:txFillClrLst/>
+    <dgm:txEffectClrLst/>
+  </dgm:styleLbl>
+  <dgm:styleLbl name="asst2">
+    <dgm:fillClrLst meth="repeat">
+      <a:schemeClr val="accent1"/>
+    </dgm:fillClrLst>
+    <dgm:linClrLst meth="repeat">
+      <a:schemeClr val="lt1"/>
+    </dgm:linClrLst>
+    <dgm:effectClrLst/>
+    <dgm:txLinClrLst/>
+    <dgm:txFillClrLst/>
+    <dgm:txEffectClrLst/>
+  </dgm:styleLbl>
+  <dgm:styleLbl name="asst3">
+    <dgm:fillClrLst meth="repeat">
+      <a:schemeClr val="accent1"/>
+    </dgm:fillClrLst>
+    <dgm:linClrLst meth="repeat">
+      <a:schemeClr val="lt1"/>
+    </dgm:linClrLst>
+    <dgm:effectClrLst/>
+    <dgm:txLinClrLst/>
+    <dgm:txFillClrLst/>
+    <dgm:txEffectClrLst/>
+  </dgm:styleLbl>
+  <dgm:styleLbl name="asst4">
+    <dgm:fillClrLst meth="repeat">
+      <a:schemeClr val="accent1"/>
+    </dgm:fillClrLst>
+    <dgm:linClrLst meth="repeat">
+      <a:schemeClr val="lt1"/>
+    </dgm:linClrLst>
+    <dgm:effectClrLst/>
+    <dgm:txLinClrLst/>
+    <dgm:txFillClrLst/>
+    <dgm:txEffectClrLst/>
+  </dgm:styleLbl>
+  <dgm:styleLbl name="parChTrans2D1">
+    <dgm:fillClrLst meth="repeat">
+      <a:schemeClr val="accent1">
+        <a:tint val="60000"/>
+      </a:schemeClr>
+    </dgm:fillClrLst>
+    <dgm:linClrLst meth="repeat">
+      <a:schemeClr val="accent1">
+        <a:tint val="60000"/>
+      </a:schemeClr>
+    </dgm:linClrLst>
+    <dgm:effectClrLst/>
+    <dgm:txLinClrLst/>
+    <dgm:txFillClrLst meth="repeat">
+      <a:schemeClr val="lt1"/>
+    </dgm:txFillClrLst>
+    <dgm:txEffectClrLst/>
+  </dgm:styleLbl>
+  <dgm:styleLbl name="parChTrans2D2">
+    <dgm:fillClrLst meth="repeat">
+      <a:schemeClr val="accent1"/>
+    </dgm:fillClrLst>
+    <dgm:linClrLst meth="repeat">
+      <a:schemeClr val="accent1"/>
+    </dgm:linClrLst>
+    <dgm:effectClrLst/>
+    <dgm:txLinClrLst/>
+    <dgm:txFillClrLst meth="repeat">
+      <a:schemeClr val="lt1"/>
+    </dgm:txFillClrLst>
+    <dgm:txEffectClrLst/>
+  </dgm:styleLbl>
+  <dgm:styleLbl name="parChTrans2D3">
+    <dgm:fillClrLst meth="repeat">
+      <a:schemeClr val="accent1"/>
+    </dgm:fillClrLst>
+    <dgm:linClrLst meth="repeat">
+      <a:schemeClr val="accent1"/>
+    </dgm:linClrLst>
+    <dgm:effectClrLst/>
+    <dgm:txLinClrLst/>
+    <dgm:txFillClrLst meth="repeat">
+      <a:schemeClr val="lt1"/>
+    </dgm:txFillClrLst>
+    <dgm:txEffectClrLst/>
+  </dgm:styleLbl>
+  <dgm:styleLbl name="parChTrans2D4">
+    <dgm:fillClrLst meth="repeat">
+      <a:schemeClr val="accent1"/>
+    </dgm:fillClrLst>
+    <dgm:linClrLst meth="repeat">
+      <a:schemeClr val="accent1"/>
+    </dgm:linClrLst>
+    <dgm:effectClrLst/>
+    <dgm:txLinClrLst/>
+    <dgm:txFillClrLst meth="repeat">
+      <a:schemeClr val="lt1"/>
+    </dgm:txFillClrLst>
+    <dgm:txEffectClrLst/>
+  </dgm:styleLbl>
+  <dgm:styleLbl name="parChTrans1D1">
+    <dgm:fillClrLst meth="repeat">
+      <a:schemeClr val="accent1"/>
+    </dgm:fillClrLst>
+    <dgm:linClrLst meth="repeat">
+      <a:schemeClr val="accent1">
+        <a:shade val="60000"/>
+      </a:schemeClr>
+    </dgm:linClrLst>
+    <dgm:effectClrLst/>
+    <dgm:txLinClrLst/>
+    <dgm:txFillClrLst meth="repeat">
+      <a:schemeClr val="tx1"/>
+    </dgm:txFillClrLst>
+    <dgm:txEffectClrLst/>
+  </dgm:styleLbl>
+  <dgm:styleLbl name="parChTrans1D2">
+    <dgm:fillClrLst meth="repeat">
+      <a:schemeClr val="accent1"/>
+    </dgm:fillClrLst>
+    <dgm:linClrLst meth="repeat">
+      <a:schemeClr val="accent1">
+        <a:shade val="60000"/>
+      </a:schemeClr>
+    </dgm:linClrLst>
+    <dgm:effectClrLst/>
+    <dgm:txLinClrLst/>
+    <dgm:txFillClrLst meth="repeat">
+      <a:schemeClr val="tx1"/>
+    </dgm:txFillClrLst>
+    <dgm:txEffectClrLst/>
+  </dgm:styleLbl>
+  <dgm:styleLbl name="parChTrans1D3">
+    <dgm:fillClrLst meth="repeat">
+      <a:schemeClr val="accent1"/>
+    </dgm:fillClrLst>
+    <dgm:linClrLst meth="repeat">
+      <a:schemeClr val="accent1">
+        <a:shade val="80000"/>
+      </a:schemeClr>
+    </dgm:linClrLst>
+    <dgm:effectClrLst/>
+    <dgm:txLinClrLst/>
+    <dgm:txFillClrLst meth="repeat">
+      <a:schemeClr val="tx1"/>
+    </dgm:txFillClrLst>
+    <dgm:txEffectClrLst/>
+  </dgm:styleLbl>
+  <dgm:styleLbl name="parChTrans1D4">
+    <dgm:fillClrLst meth="repeat">
+      <a:schemeClr val="accent1"/>
+    </dgm:fillClrLst>
+    <dgm:linClrLst meth="repeat">
+      <a:schemeClr val="accent1">
+        <a:shade val="80000"/>
+      </a:schemeClr>
+    </dgm:linClrLst>
+    <dgm:effectClrLst/>
+    <dgm:txLinClrLst/>
+    <dgm:txFillClrLst meth="repeat">
+      <a:schemeClr val="tx1"/>
+    </dgm:txFillClrLst>
+    <dgm:txEffectClrLst/>
+  </dgm:styleLbl>
+  <dgm:styleLbl name="fgAcc1">
+    <dgm:fillClrLst meth="repeat">
+      <a:schemeClr val="lt1">
+        <a:alpha val="90000"/>
+      </a:schemeClr>
+    </dgm:fillClrLst>
+    <dgm:linClrLst meth="repeat">
+      <a:schemeClr val="accent1"/>
+    </dgm:linClrLst>
+    <dgm:effectClrLst/>
+    <dgm:txLinClrLst/>
+    <dgm:txFillClrLst meth="repeat">
+      <a:schemeClr val="dk1"/>
+    </dgm:txFillClrLst>
+    <dgm:txEffectClrLst/>
+  </dgm:styleLbl>
+  <dgm:styleLbl name="conFgAcc1">
+    <dgm:fillClrLst meth="repeat">
+      <a:schemeClr val="lt1">
+        <a:alpha val="90000"/>
+      </a:schemeClr>
+    </dgm:fillClrLst>
+    <dgm:linClrLst meth="repeat">
+      <a:schemeClr val="accent1"/>
+    </dgm:linClrLst>
+    <dgm:effectClrLst/>
+    <dgm:txLinClrLst/>
+    <dgm:txFillClrLst meth="repeat">
+      <a:schemeClr val="dk1"/>
+    </dgm:txFillClrLst>
+    <dgm:txEffectClrLst/>
+  </dgm:styleLbl>
+  <dgm:styleLbl name="alignAcc1">
+    <dgm:fillClrLst meth="repeat">
+      <a:schemeClr val="lt1">
+        <a:alpha val="90000"/>
+      </a:schemeClr>
+    </dgm:fillClrLst>
+    <dgm:linClrLst meth="repeat">
+      <a:schemeClr val="accent1"/>
+    </dgm:linClrLst>
+    <dgm:effectClrLst/>
+    <dgm:txLinClrLst/>
+    <dgm:txFillClrLst meth="repeat">
+      <a:schemeClr val="dk1"/>
+    </dgm:txFillClrLst>
+    <dgm:txEffectClrLst/>
+  </dgm:styleLbl>
+  <dgm:styleLbl name="trAlignAcc1">
+    <dgm:fillClrLst meth="repeat">
+      <a:schemeClr val="lt1">
+        <a:alpha val="40000"/>
+      </a:schemeClr>
+    </dgm:fillClrLst>
+    <dgm:linClrLst meth="repeat">
+      <a:schemeClr val="accent1"/>
+    </dgm:linClrLst>
+    <dgm:effectClrLst/>
+    <dgm:txLinClrLst/>
+    <dgm:txFillClrLst meth="repeat">
+      <a:schemeClr val="dk1"/>
+    </dgm:txFillClrLst>
+    <dgm:txEffectClrLst/>
+  </dgm:styleLbl>
+  <dgm:styleLbl name="bgAcc1">
+    <dgm:fillClrLst meth="repeat">
+      <a:schemeClr val="lt1">
+        <a:alpha val="90000"/>
+      </a:schemeClr>
+    </dgm:fillClrLst>
+    <dgm:linClrLst meth="repeat">
+      <a:schemeClr val="accent1"/>
+    </dgm:linClrLst>
+    <dgm:effectClrLst/>
+    <dgm:txLinClrLst/>
+    <dgm:txFillClrLst meth="repeat">
+      <a:schemeClr val="dk1"/>
+    </dgm:txFillClrLst>
+    <dgm:txEffectClrLst/>
+  </dgm:styleLbl>
+  <dgm:styleLbl name="solidFgAcc1">
+    <dgm:fillClrLst meth="repeat">
+      <a:schemeClr val="lt1"/>
+    </dgm:fillClrLst>
+    <dgm:linClrLst meth="repeat">
+      <a:schemeClr val="accent1"/>
+    </dgm:linClrLst>
+    <dgm:effectClrLst/>
+    <dgm:txLinClrLst/>
+    <dgm:txFillClrLst meth="repeat">
+      <a:schemeClr val="dk1"/>
+    </dgm:txFillClrLst>
+    <dgm:txEffectClrLst/>
+  </dgm:styleLbl>
+  <dgm:styleLbl name="solidAlignAcc1">
+    <dgm:fillClrLst meth="repeat">
+      <a:schemeClr val="lt1"/>
+    </dgm:fillClrLst>
+    <dgm:linClrLst meth="repeat">
+      <a:schemeClr val="accent1"/>
+    </dgm:linClrLst>
+    <dgm:effectClrLst/>
+    <dgm:txLinClrLst/>
+    <dgm:txFillClrLst meth="repeat">
+      <a:schemeClr val="dk1"/>
+    </dgm:txFillClrLst>
+    <dgm:txEffectClrLst/>
+  </dgm:styleLbl>
+  <dgm:styleLbl name="solidBgAcc1">
+    <dgm:fillClrLst meth="repeat">
+      <a:schemeClr val="lt1"/>
+    </dgm:fillClrLst>
+    <dgm:linClrLst meth="repeat">
+      <a:schemeClr val="accent1"/>
+    </dgm:linClrLst>
+    <dgm:effectClrLst/>
+    <dgm:txLinClrLst/>
+    <dgm:txFillClrLst meth="repeat">
+      <a:schemeClr val="dk1"/>
+    </dgm:txFillClrLst>
+    <dgm:txEffectClrLst/>
+  </dgm:styleLbl>
+  <dgm:styleLbl name="fgAccFollowNode1">
+    <dgm:fillClrLst meth="repeat">
+      <a:schemeClr val="accent1">
+        <a:alpha val="90000"/>
+        <a:tint val="40000"/>
+      </a:schemeClr>
+    </dgm:fillClrLst>
+    <dgm:linClrLst meth="repeat">
+      <a:schemeClr val="accent1">
+        <a:alpha val="90000"/>
+        <a:tint val="40000"/>
+      </a:schemeClr>
+    </dgm:linClrLst>
+    <dgm:effectClrLst/>
+    <dgm:txLinClrLst/>
+    <dgm:txFillClrLst meth="repeat">
+      <a:schemeClr val="dk1"/>
+    </dgm:txFillClrLst>
+    <dgm:txEffectClrLst/>
+  </dgm:styleLbl>
+  <dgm:styleLbl name="alignAccFollowNode1">
+    <dgm:fillClrLst meth="repeat">
+      <a:schemeClr val="accent1">
+        <a:alpha val="90000"/>
+        <a:tint val="40000"/>
+      </a:schemeClr>
+    </dgm:fillClrLst>
+    <dgm:linClrLst meth="repeat">
+      <a:schemeClr val="accent1">
+        <a:alpha val="90000"/>
+        <a:tint val="40000"/>
+      </a:schemeClr>
+    </dgm:linClrLst>
+    <dgm:effectClrLst/>
+    <dgm:txLinClrLst/>
+    <dgm:txFillClrLst meth="repeat">
+      <a:schemeClr val="dk1"/>
+    </dgm:txFillClrLst>
+    <dgm:txEffectClrLst/>
+  </dgm:styleLbl>
+  <dgm:styleLbl name="bgAccFollowNode1">
+    <dgm:fillClrLst meth="repeat">
+      <a:schemeClr val="accent1">
+        <a:alpha val="90000"/>
+        <a:tint val="40000"/>
+      </a:schemeClr>
+    </dgm:fillClrLst>
+    <dgm:linClrLst meth="repeat">
+      <a:schemeClr val="accent1">
+        <a:alpha val="90000"/>
+        <a:tint val="40000"/>
+      </a:schemeClr>
+    </dgm:linClrLst>
+    <dgm:effectClrLst/>
+    <dgm:txLinClrLst/>
+    <dgm:txFillClrLst meth="repeat">
+      <a:schemeClr val="dk1"/>
+    </dgm:txFillClrLst>
+    <dgm:txEffectClrLst/>
+  </dgm:styleLbl>
+  <dgm:styleLbl name="fgAcc0">
+    <dgm:fillClrLst meth="repeat">
+      <a:schemeClr val="lt1">
+        <a:alpha val="90000"/>
+      </a:schemeClr>
+    </dgm:fillClrLst>
+    <dgm:linClrLst meth="repeat">
+      <a:schemeClr val="accent1"/>
+    </dgm:linClrLst>
+    <dgm:effectClrLst/>
+    <dgm:txLinClrLst/>
+    <dgm:txFillClrLst meth="repeat">
+      <a:schemeClr val="dk1"/>
+    </dgm:txFillClrLst>
+    <dgm:txEffectClrLst/>
+  </dgm:styleLbl>
+  <dgm:styleLbl name="fgAcc2">
+    <dgm:fillClrLst meth="repeat">
+      <a:schemeClr val="lt1">
+        <a:alpha val="90000"/>
+      </a:schemeClr>
+    </dgm:fillClrLst>
+    <dgm:linClrLst meth="repeat">
+      <a:schemeClr val="accent1"/>
+    </dgm:linClrLst>
+    <dgm:effectClrLst/>
+    <dgm:txLinClrLst/>
+    <dgm:txFillClrLst meth="repeat">
+      <a:schemeClr val="dk1"/>
+    </dgm:txFillClrLst>
+    <dgm:txEffectClrLst/>
+  </dgm:styleLbl>
+  <dgm:styleLbl name="fgAcc3">
+    <dgm:fillClrLst meth="repeat">
+      <a:schemeClr val="lt1">
+        <a:alpha val="90000"/>
+      </a:schemeClr>
+    </dgm:fillClrLst>
+    <dgm:linClrLst meth="repeat">
+      <a:schemeClr val="accent1"/>
+    </dgm:linClrLst>
+    <dgm:effectClrLst/>
+    <dgm:txLinClrLst/>
+    <dgm:txFillClrLst meth="repeat">
+      <a:schemeClr val="dk1"/>
+    </dgm:txFillClrLst>
+    <dgm:txEffectClrLst/>
+  </dgm:styleLbl>
+  <dgm:styleLbl name="fgAcc4">
+    <dgm:fillClrLst meth="repeat">
+      <a:schemeClr val="lt1">
+        <a:alpha val="90000"/>
+      </a:schemeClr>
+    </dgm:fillClrLst>
+    <dgm:linClrLst meth="repeat">
+      <a:schemeClr val="accent1"/>
+    </dgm:linClrLst>
+    <dgm:effectClrLst/>
+    <dgm:txLinClrLst/>
+    <dgm:txFillClrLst meth="repeat">
+      <a:schemeClr val="dk1"/>
+    </dgm:txFillClrLst>
+    <dgm:txEffectClrLst/>
+  </dgm:styleLbl>
+  <dgm:styleLbl name="bgShp">
+    <dgm:fillClrLst meth="repeat">
+      <a:schemeClr val="accent1">
+        <a:tint val="40000"/>
+      </a:schemeClr>
+    </dgm:fillClrLst>
+    <dgm:linClrLst meth="repeat">
+      <a:schemeClr val="accent1"/>
+    </dgm:linClrLst>
+    <dgm:effectClrLst/>
+    <dgm:txLinClrLst/>
+    <dgm:txFillClrLst meth="repeat">
+      <a:schemeClr val="dk1"/>
+    </dgm:txFillClrLst>
+    <dgm:txEffectClrLst/>
+  </dgm:styleLbl>
+  <dgm:styleLbl name="dkBgShp">
+    <dgm:fillClrLst meth="repeat">
+      <a:schemeClr val="accent1">
+        <a:shade val="80000"/>
+      </a:schemeClr>
+    </dgm:fillClrLst>
+    <dgm:linClrLst meth="repeat">
+      <a:schemeClr val="accent1"/>
+    </dgm:linClrLst>
+    <dgm:effectClrLst/>
+    <dgm:txLinClrLst/>
+    <dgm:txFillClrLst meth="repeat">
+      <a:schemeClr val="lt1"/>
+    </dgm:txFillClrLst>
+    <dgm:txEffectClrLst/>
+  </dgm:styleLbl>
+  <dgm:styleLbl name="trBgShp">
+    <dgm:fillClrLst meth="repeat">
+      <a:schemeClr val="accent1">
+        <a:tint val="50000"/>
+        <a:alpha val="40000"/>
+      </a:schemeClr>
+    </dgm:fillClrLst>
+    <dgm:linClrLst meth="repeat">
+      <a:schemeClr val="accent1"/>
+    </dgm:linClrLst>
+    <dgm:effectClrLst/>
+    <dgm:txLinClrLst/>
+    <dgm:txFillClrLst meth="repeat">
+      <a:schemeClr val="lt1"/>
+    </dgm:txFillClrLst>
+    <dgm:txEffectClrLst/>
+  </dgm:styleLbl>
+  <dgm:styleLbl name="fgShp">
+    <dgm:fillClrLst meth="repeat">
+      <a:schemeClr val="accent1">
+        <a:tint val="60000"/>
+      </a:schemeClr>
+    </dgm:fillClrLst>
+    <dgm:linClrLst meth="repeat">
+      <a:schemeClr val="lt1"/>
+    </dgm:linClrLst>
+    <dgm:effectClrLst/>
+    <dgm:txLinClrLst/>
+    <dgm:txFillClrLst meth="repeat">
+      <a:schemeClr val="dk1"/>
+    </dgm:txFillClrLst>
+    <dgm:txEffectClrLst/>
+  </dgm:styleLbl>
+  <dgm:styleLbl name="revTx">
+    <dgm:fillClrLst meth="repeat">
+      <a:schemeClr val="lt1">
+        <a:alpha val="0"/>
+      </a:schemeClr>
+    </dgm:fillClrLst>
+    <dgm:linClrLst meth="repeat">
+      <a:schemeClr val="dk1">
+        <a:alpha val="0"/>
+      </a:schemeClr>
+    </dgm:linClrLst>
+    <dgm:effectClrLst/>
+    <dgm:txLinClrLst/>
+    <dgm:txFillClrLst meth="repeat">
+      <a:schemeClr val="tx1"/>
+    </dgm:txFillClrLst>
+    <dgm:txEffectClrLst/>
+  </dgm:styleLbl>
+</dgm:colorsDef>
+</file>
+
+<file path=ppt/diagrams/data1.xml><?xml version="1.0" encoding="utf-8"?>
+<dgm:dataModel xmlns:dgm="http://schemas.openxmlformats.org/drawingml/2006/diagram" xmlns:a="http://schemas.openxmlformats.org/drawingml/2006/main">
+  <dgm:ptLst>
+    <dgm:pt modelId="{C40D42B4-8E68-1749-94C1-3AE0268D09ED}" type="doc">
+      <dgm:prSet loTypeId="urn:microsoft.com/office/officeart/2005/8/layout/matrix2" loCatId="" qsTypeId="urn:microsoft.com/office/officeart/2005/8/quickstyle/simple1" qsCatId="simple" csTypeId="urn:microsoft.com/office/officeart/2005/8/colors/accent1_2" csCatId="accent1" phldr="1"/>
+      <dgm:spPr/>
+      <dgm:t>
+        <a:bodyPr/>
+        <a:lstStyle/>
+        <a:p>
+          <a:endParaRPr lang="es-ES"/>
+        </a:p>
+      </dgm:t>
+    </dgm:pt>
+    <dgm:pt modelId="{C6E19F62-2774-C240-903E-F8E02C052594}">
+      <dgm:prSet phldrT="[Texto]"/>
+      <dgm:spPr>
+        <a:solidFill>
+          <a:srgbClr val="002060"/>
+        </a:solidFill>
+      </dgm:spPr>
+      <dgm:t>
+        <a:bodyPr/>
+        <a:lstStyle/>
+        <a:p>
+          <a:r>
+            <a:rPr lang="es-ES" dirty="0"/>
+            <a:t>Debilidades: muchas funciones y colores diversos.</a:t>
+          </a:r>
+        </a:p>
+      </dgm:t>
+    </dgm:pt>
+    <dgm:pt modelId="{2AFB70FE-4245-8640-9DFD-2CF9CCCDE0C7}" type="parTrans" cxnId="{9AD3BE3F-33F6-1547-9895-9DED34F1E223}">
+      <dgm:prSet/>
+      <dgm:spPr/>
+      <dgm:t>
+        <a:bodyPr/>
+        <a:lstStyle/>
+        <a:p>
+          <a:endParaRPr lang="es-ES"/>
+        </a:p>
+      </dgm:t>
+    </dgm:pt>
+    <dgm:pt modelId="{634DA31F-3B0C-3F4E-9924-C6255F3705DE}" type="sibTrans" cxnId="{9AD3BE3F-33F6-1547-9895-9DED34F1E223}">
+      <dgm:prSet/>
+      <dgm:spPr/>
+      <dgm:t>
+        <a:bodyPr/>
+        <a:lstStyle/>
+        <a:p>
+          <a:endParaRPr lang="es-ES"/>
+        </a:p>
+      </dgm:t>
+    </dgm:pt>
+    <dgm:pt modelId="{A4D3E78A-D4FC-684D-8782-B11CCD943C38}">
+      <dgm:prSet phldrT="[Texto]"/>
+      <dgm:spPr>
+        <a:solidFill>
+          <a:srgbClr val="002060"/>
+        </a:solidFill>
+      </dgm:spPr>
+      <dgm:t>
+        <a:bodyPr/>
+        <a:lstStyle/>
+        <a:p>
+          <a:r>
+            <a:rPr lang="es-ES" dirty="0"/>
+            <a:t>Amenazas: aplicación, con base externa que cualquiera puede tener y que se necesita actualizar.</a:t>
+          </a:r>
+        </a:p>
+      </dgm:t>
+    </dgm:pt>
+    <dgm:pt modelId="{86D2A07A-15DF-284E-8CE0-77F6DFBB5138}" type="parTrans" cxnId="{2EC0EC93-F88E-3346-9D1A-DCF435B5F940}">
+      <dgm:prSet/>
+      <dgm:spPr/>
+      <dgm:t>
+        <a:bodyPr/>
+        <a:lstStyle/>
+        <a:p>
+          <a:endParaRPr lang="es-ES"/>
+        </a:p>
+      </dgm:t>
+    </dgm:pt>
+    <dgm:pt modelId="{40734C8B-B5C5-0A40-B8F8-30F28C935A0A}" type="sibTrans" cxnId="{2EC0EC93-F88E-3346-9D1A-DCF435B5F940}">
+      <dgm:prSet/>
+      <dgm:spPr/>
+      <dgm:t>
+        <a:bodyPr/>
+        <a:lstStyle/>
+        <a:p>
+          <a:endParaRPr lang="es-ES"/>
+        </a:p>
+      </dgm:t>
+    </dgm:pt>
+    <dgm:pt modelId="{38D7FE00-479D-B84D-AEE6-BB0845CCEC11}">
+      <dgm:prSet phldrT="[Texto]"/>
+      <dgm:spPr>
+        <a:solidFill>
+          <a:srgbClr val="002060"/>
+        </a:solidFill>
+      </dgm:spPr>
+      <dgm:t>
+        <a:bodyPr/>
+        <a:lstStyle/>
+        <a:p>
+          <a:r>
+            <a:rPr lang="es-ES" dirty="0"/>
+            <a:t>Fortalezas: interfaz sencilla de utilizar que brinda datos en un tiempo ínfimo.</a:t>
+          </a:r>
+        </a:p>
+      </dgm:t>
+    </dgm:pt>
+    <dgm:pt modelId="{3772F323-034D-6C4E-8C7B-079B637836B0}" type="parTrans" cxnId="{16B97DDB-7118-964B-8737-03396994F434}">
+      <dgm:prSet/>
+      <dgm:spPr/>
+      <dgm:t>
+        <a:bodyPr/>
+        <a:lstStyle/>
+        <a:p>
+          <a:endParaRPr lang="es-ES"/>
+        </a:p>
+      </dgm:t>
+    </dgm:pt>
+    <dgm:pt modelId="{9F714A28-1FCE-F64C-9982-6C1AA5EA8427}" type="sibTrans" cxnId="{16B97DDB-7118-964B-8737-03396994F434}">
+      <dgm:prSet/>
+      <dgm:spPr/>
+      <dgm:t>
+        <a:bodyPr/>
+        <a:lstStyle/>
+        <a:p>
+          <a:endParaRPr lang="es-ES"/>
+        </a:p>
+      </dgm:t>
+    </dgm:pt>
+    <dgm:pt modelId="{A8E420EB-6237-0A4E-B2AF-C65823A043E9}">
+      <dgm:prSet phldrT="[Texto]"/>
+      <dgm:spPr>
+        <a:solidFill>
+          <a:srgbClr val="002060"/>
+        </a:solidFill>
+      </dgm:spPr>
+      <dgm:t>
+        <a:bodyPr/>
+        <a:lstStyle/>
+        <a:p>
+          <a:r>
+            <a:rPr lang="es-ES" dirty="0"/>
+            <a:t>Oportunidades: base de datos actualizable cada año.</a:t>
+          </a:r>
+        </a:p>
+      </dgm:t>
+    </dgm:pt>
+    <dgm:pt modelId="{BDF765FA-2CB7-4B43-ABAA-98173CEF55E9}" type="parTrans" cxnId="{6D5FA306-5F67-1348-B206-CBDBA90BE717}">
+      <dgm:prSet/>
+      <dgm:spPr/>
+      <dgm:t>
+        <a:bodyPr/>
+        <a:lstStyle/>
+        <a:p>
+          <a:endParaRPr lang="es-ES"/>
+        </a:p>
+      </dgm:t>
+    </dgm:pt>
+    <dgm:pt modelId="{1E86D0A4-3354-0A4C-B47D-3D47901193E1}" type="sibTrans" cxnId="{6D5FA306-5F67-1348-B206-CBDBA90BE717}">
+      <dgm:prSet/>
+      <dgm:spPr/>
+      <dgm:t>
+        <a:bodyPr/>
+        <a:lstStyle/>
+        <a:p>
+          <a:endParaRPr lang="es-ES"/>
+        </a:p>
+      </dgm:t>
+    </dgm:pt>
+    <dgm:pt modelId="{2AD14CE6-9971-7047-87D1-0369F912B381}" type="pres">
+      <dgm:prSet presAssocID="{C40D42B4-8E68-1749-94C1-3AE0268D09ED}" presName="matrix" presStyleCnt="0">
+        <dgm:presLayoutVars>
+          <dgm:chMax val="1"/>
+          <dgm:dir/>
+          <dgm:resizeHandles val="exact"/>
+        </dgm:presLayoutVars>
+      </dgm:prSet>
+      <dgm:spPr/>
+    </dgm:pt>
+    <dgm:pt modelId="{5CAAD280-FD73-D244-8AC7-5022BAEEB153}" type="pres">
+      <dgm:prSet presAssocID="{C40D42B4-8E68-1749-94C1-3AE0268D09ED}" presName="axisShape" presStyleLbl="bgShp" presStyleIdx="0" presStyleCnt="1"/>
+      <dgm:spPr/>
+    </dgm:pt>
+    <dgm:pt modelId="{18333134-1D54-5449-B025-D5DB3F527DC1}" type="pres">
+      <dgm:prSet presAssocID="{C40D42B4-8E68-1749-94C1-3AE0268D09ED}" presName="rect1" presStyleLbl="node1" presStyleIdx="0" presStyleCnt="4">
+        <dgm:presLayoutVars>
+          <dgm:chMax val="0"/>
+          <dgm:chPref val="0"/>
+          <dgm:bulletEnabled val="1"/>
+        </dgm:presLayoutVars>
+      </dgm:prSet>
+      <dgm:spPr/>
+    </dgm:pt>
+    <dgm:pt modelId="{CEC4A39F-C143-6C4F-A849-6F7253673BF3}" type="pres">
+      <dgm:prSet presAssocID="{C40D42B4-8E68-1749-94C1-3AE0268D09ED}" presName="rect2" presStyleLbl="node1" presStyleIdx="1" presStyleCnt="4">
+        <dgm:presLayoutVars>
+          <dgm:chMax val="0"/>
+          <dgm:chPref val="0"/>
+          <dgm:bulletEnabled val="1"/>
+        </dgm:presLayoutVars>
+      </dgm:prSet>
+      <dgm:spPr/>
+    </dgm:pt>
+    <dgm:pt modelId="{7557886D-D86C-1147-A931-DCC04F70D27C}" type="pres">
+      <dgm:prSet presAssocID="{C40D42B4-8E68-1749-94C1-3AE0268D09ED}" presName="rect3" presStyleLbl="node1" presStyleIdx="2" presStyleCnt="4">
+        <dgm:presLayoutVars>
+          <dgm:chMax val="0"/>
+          <dgm:chPref val="0"/>
+          <dgm:bulletEnabled val="1"/>
+        </dgm:presLayoutVars>
+      </dgm:prSet>
+      <dgm:spPr/>
+    </dgm:pt>
+    <dgm:pt modelId="{73CE24B6-DA72-C243-9D61-0F7C016B23AE}" type="pres">
+      <dgm:prSet presAssocID="{C40D42B4-8E68-1749-94C1-3AE0268D09ED}" presName="rect4" presStyleLbl="node1" presStyleIdx="3" presStyleCnt="4">
+        <dgm:presLayoutVars>
+          <dgm:chMax val="0"/>
+          <dgm:chPref val="0"/>
+          <dgm:bulletEnabled val="1"/>
+        </dgm:presLayoutVars>
+      </dgm:prSet>
+      <dgm:spPr/>
+    </dgm:pt>
+  </dgm:ptLst>
+  <dgm:cxnLst>
+    <dgm:cxn modelId="{6D5FA306-5F67-1348-B206-CBDBA90BE717}" srcId="{C40D42B4-8E68-1749-94C1-3AE0268D09ED}" destId="{A8E420EB-6237-0A4E-B2AF-C65823A043E9}" srcOrd="3" destOrd="0" parTransId="{BDF765FA-2CB7-4B43-ABAA-98173CEF55E9}" sibTransId="{1E86D0A4-3354-0A4C-B47D-3D47901193E1}"/>
+    <dgm:cxn modelId="{BC08D408-0D4A-D549-B56A-9BB07AD401F1}" type="presOf" srcId="{A4D3E78A-D4FC-684D-8782-B11CCD943C38}" destId="{CEC4A39F-C143-6C4F-A849-6F7253673BF3}" srcOrd="0" destOrd="0" presId="urn:microsoft.com/office/officeart/2005/8/layout/matrix2"/>
+    <dgm:cxn modelId="{EE7A7028-D292-A446-A71C-4AC166BEA05A}" type="presOf" srcId="{38D7FE00-479D-B84D-AEE6-BB0845CCEC11}" destId="{7557886D-D86C-1147-A931-DCC04F70D27C}" srcOrd="0" destOrd="0" presId="urn:microsoft.com/office/officeart/2005/8/layout/matrix2"/>
+    <dgm:cxn modelId="{0D64B832-CFC3-D44B-8A4F-368476E74EE4}" type="presOf" srcId="{C40D42B4-8E68-1749-94C1-3AE0268D09ED}" destId="{2AD14CE6-9971-7047-87D1-0369F912B381}" srcOrd="0" destOrd="0" presId="urn:microsoft.com/office/officeart/2005/8/layout/matrix2"/>
+    <dgm:cxn modelId="{9AD3BE3F-33F6-1547-9895-9DED34F1E223}" srcId="{C40D42B4-8E68-1749-94C1-3AE0268D09ED}" destId="{C6E19F62-2774-C240-903E-F8E02C052594}" srcOrd="0" destOrd="0" parTransId="{2AFB70FE-4245-8640-9DFD-2CF9CCCDE0C7}" sibTransId="{634DA31F-3B0C-3F4E-9924-C6255F3705DE}"/>
+    <dgm:cxn modelId="{BB16EE51-2D3C-4340-B5D4-94953AD1F71F}" type="presOf" srcId="{C6E19F62-2774-C240-903E-F8E02C052594}" destId="{18333134-1D54-5449-B025-D5DB3F527DC1}" srcOrd="0" destOrd="0" presId="urn:microsoft.com/office/officeart/2005/8/layout/matrix2"/>
+    <dgm:cxn modelId="{2EC0EC93-F88E-3346-9D1A-DCF435B5F940}" srcId="{C40D42B4-8E68-1749-94C1-3AE0268D09ED}" destId="{A4D3E78A-D4FC-684D-8782-B11CCD943C38}" srcOrd="1" destOrd="0" parTransId="{86D2A07A-15DF-284E-8CE0-77F6DFBB5138}" sibTransId="{40734C8B-B5C5-0A40-B8F8-30F28C935A0A}"/>
+    <dgm:cxn modelId="{675BB29B-55D0-BD4E-88FB-B29354DD9D85}" type="presOf" srcId="{A8E420EB-6237-0A4E-B2AF-C65823A043E9}" destId="{73CE24B6-DA72-C243-9D61-0F7C016B23AE}" srcOrd="0" destOrd="0" presId="urn:microsoft.com/office/officeart/2005/8/layout/matrix2"/>
+    <dgm:cxn modelId="{16B97DDB-7118-964B-8737-03396994F434}" srcId="{C40D42B4-8E68-1749-94C1-3AE0268D09ED}" destId="{38D7FE00-479D-B84D-AEE6-BB0845CCEC11}" srcOrd="2" destOrd="0" parTransId="{3772F323-034D-6C4E-8C7B-079B637836B0}" sibTransId="{9F714A28-1FCE-F64C-9982-6C1AA5EA8427}"/>
+    <dgm:cxn modelId="{18A1742A-C7FE-0E41-A61E-E416ADA98132}" type="presParOf" srcId="{2AD14CE6-9971-7047-87D1-0369F912B381}" destId="{5CAAD280-FD73-D244-8AC7-5022BAEEB153}" srcOrd="0" destOrd="0" presId="urn:microsoft.com/office/officeart/2005/8/layout/matrix2"/>
+    <dgm:cxn modelId="{6BBD668A-4571-6C4F-86AA-E5793BF95748}" type="presParOf" srcId="{2AD14CE6-9971-7047-87D1-0369F912B381}" destId="{18333134-1D54-5449-B025-D5DB3F527DC1}" srcOrd="1" destOrd="0" presId="urn:microsoft.com/office/officeart/2005/8/layout/matrix2"/>
+    <dgm:cxn modelId="{5CED1CF0-88DD-724B-9858-C1737B264099}" type="presParOf" srcId="{2AD14CE6-9971-7047-87D1-0369F912B381}" destId="{CEC4A39F-C143-6C4F-A849-6F7253673BF3}" srcOrd="2" destOrd="0" presId="urn:microsoft.com/office/officeart/2005/8/layout/matrix2"/>
+    <dgm:cxn modelId="{1FBED7B4-74E7-6A4B-8795-E18068D329E9}" type="presParOf" srcId="{2AD14CE6-9971-7047-87D1-0369F912B381}" destId="{7557886D-D86C-1147-A931-DCC04F70D27C}" srcOrd="3" destOrd="0" presId="urn:microsoft.com/office/officeart/2005/8/layout/matrix2"/>
+    <dgm:cxn modelId="{40B2D307-FA86-B94B-9BCE-025815AF3BA7}" type="presParOf" srcId="{2AD14CE6-9971-7047-87D1-0369F912B381}" destId="{73CE24B6-DA72-C243-9D61-0F7C016B23AE}" srcOrd="4" destOrd="0" presId="urn:microsoft.com/office/officeart/2005/8/layout/matrix2"/>
+  </dgm:cxnLst>
+  <dgm:bg/>
+  <dgm:whole/>
+  <dgm:extLst>
+    <a:ext uri="http://schemas.microsoft.com/office/drawing/2008/diagram">
+      <dsp:dataModelExt xmlns:dsp="http://schemas.microsoft.com/office/drawing/2008/diagram" relId="rId6" minVer="http://schemas.openxmlformats.org/drawingml/2006/diagram"/>
+    </a:ext>
+  </dgm:extLst>
+</dgm:dataModel>
+</file>
+
+<file path=ppt/diagrams/drawing1.xml><?xml version="1.0" encoding="utf-8"?>
+<dsp:drawing xmlns:dgm="http://schemas.openxmlformats.org/drawingml/2006/diagram" xmlns:dsp="http://schemas.microsoft.com/office/drawing/2008/diagram" xmlns:a="http://schemas.openxmlformats.org/drawingml/2006/main">
+  <dsp:spTree>
+    <dsp:nvGrpSpPr>
+      <dsp:cNvPr id="0" name=""/>
+      <dsp:cNvGrpSpPr/>
+    </dsp:nvGrpSpPr>
+    <dsp:grpSpPr/>
+    <dsp:sp modelId="{5CAAD280-FD73-D244-8AC7-5022BAEEB153}">
+      <dsp:nvSpPr>
+        <dsp:cNvPr id="0" name=""/>
+        <dsp:cNvSpPr/>
+      </dsp:nvSpPr>
+      <dsp:spPr>
+        <a:xfrm>
+          <a:off x="932023" y="0"/>
+          <a:ext cx="5011315" cy="5011315"/>
+        </a:xfrm>
+        <a:prstGeom prst="quadArrow">
+          <a:avLst>
+            <a:gd name="adj1" fmla="val 2000"/>
+            <a:gd name="adj2" fmla="val 4000"/>
+            <a:gd name="adj3" fmla="val 5000"/>
+          </a:avLst>
+        </a:prstGeom>
+        <a:solidFill>
+          <a:schemeClr val="accent1">
+            <a:tint val="40000"/>
+            <a:hueOff val="0"/>
+            <a:satOff val="0"/>
+            <a:lumOff val="0"/>
+            <a:alphaOff val="0"/>
+          </a:schemeClr>
+        </a:solidFill>
+        <a:ln>
+          <a:noFill/>
+        </a:ln>
+        <a:effectLst/>
+      </dsp:spPr>
+      <dsp:style>
+        <a:lnRef idx="0">
+          <a:scrgbClr r="0" g="0" b="0"/>
+        </a:lnRef>
+        <a:fillRef idx="1">
+          <a:scrgbClr r="0" g="0" b="0"/>
+        </a:fillRef>
+        <a:effectRef idx="0">
+          <a:scrgbClr r="0" g="0" b="0"/>
+        </a:effectRef>
+        <a:fontRef idx="minor"/>
+      </dsp:style>
+    </dsp:sp>
+    <dsp:sp modelId="{18333134-1D54-5449-B025-D5DB3F527DC1}">
+      <dsp:nvSpPr>
+        <dsp:cNvPr id="0" name=""/>
+        <dsp:cNvSpPr/>
+      </dsp:nvSpPr>
+      <dsp:spPr>
+        <a:xfrm>
+          <a:off x="1257758" y="325735"/>
+          <a:ext cx="2004526" cy="2004526"/>
+        </a:xfrm>
+        <a:prstGeom prst="roundRect">
+          <a:avLst/>
+        </a:prstGeom>
+        <a:solidFill>
+          <a:srgbClr val="002060"/>
+        </a:solidFill>
+        <a:ln w="12700" cap="flat" cmpd="sng" algn="ctr">
+          <a:solidFill>
+            <a:schemeClr val="lt1">
+              <a:hueOff val="0"/>
+              <a:satOff val="0"/>
+              <a:lumOff val="0"/>
+              <a:alphaOff val="0"/>
+            </a:schemeClr>
+          </a:solidFill>
+          <a:prstDash val="solid"/>
+          <a:miter lim="800000"/>
+        </a:ln>
+        <a:effectLst/>
+      </dsp:spPr>
+      <dsp:style>
+        <a:lnRef idx="2">
+          <a:scrgbClr r="0" g="0" b="0"/>
+        </a:lnRef>
+        <a:fillRef idx="1">
+          <a:scrgbClr r="0" g="0" b="0"/>
+        </a:fillRef>
+        <a:effectRef idx="0">
+          <a:scrgbClr r="0" g="0" b="0"/>
+        </a:effectRef>
+        <a:fontRef idx="minor">
+          <a:schemeClr val="lt1"/>
+        </a:fontRef>
+      </dsp:style>
+      <dsp:txBody>
+        <a:bodyPr spcFirstLastPara="0" vert="horz" wrap="square" lIns="64770" tIns="64770" rIns="64770" bIns="64770" numCol="1" spcCol="1270" anchor="ctr" anchorCtr="0">
+          <a:noAutofit/>
+        </a:bodyPr>
+        <a:lstStyle/>
+        <a:p>
+          <a:pPr marL="0" lvl="0" indent="0" algn="ctr" defTabSz="755650">
+            <a:lnSpc>
+              <a:spcPct val="90000"/>
+            </a:lnSpc>
+            <a:spcBef>
+              <a:spcPct val="0"/>
+            </a:spcBef>
+            <a:spcAft>
+              <a:spcPct val="35000"/>
+            </a:spcAft>
+            <a:buNone/>
+          </a:pPr>
+          <a:r>
+            <a:rPr lang="es-ES" sz="1700" kern="1200" dirty="0"/>
+            <a:t>Debilidades: muchas funciones y colores diversos.</a:t>
+          </a:r>
+        </a:p>
+      </dsp:txBody>
+      <dsp:txXfrm>
+        <a:off x="1355611" y="423588"/>
+        <a:ext cx="1808820" cy="1808820"/>
+      </dsp:txXfrm>
+    </dsp:sp>
+    <dsp:sp modelId="{CEC4A39F-C143-6C4F-A849-6F7253673BF3}">
+      <dsp:nvSpPr>
+        <dsp:cNvPr id="0" name=""/>
+        <dsp:cNvSpPr/>
+      </dsp:nvSpPr>
+      <dsp:spPr>
+        <a:xfrm>
+          <a:off x="3613077" y="325735"/>
+          <a:ext cx="2004526" cy="2004526"/>
+        </a:xfrm>
+        <a:prstGeom prst="roundRect">
+          <a:avLst/>
+        </a:prstGeom>
+        <a:solidFill>
+          <a:srgbClr val="002060"/>
+        </a:solidFill>
+        <a:ln w="12700" cap="flat" cmpd="sng" algn="ctr">
+          <a:solidFill>
+            <a:schemeClr val="lt1">
+              <a:hueOff val="0"/>
+              <a:satOff val="0"/>
+              <a:lumOff val="0"/>
+              <a:alphaOff val="0"/>
+            </a:schemeClr>
+          </a:solidFill>
+          <a:prstDash val="solid"/>
+          <a:miter lim="800000"/>
+        </a:ln>
+        <a:effectLst/>
+      </dsp:spPr>
+      <dsp:style>
+        <a:lnRef idx="2">
+          <a:scrgbClr r="0" g="0" b="0"/>
+        </a:lnRef>
+        <a:fillRef idx="1">
+          <a:scrgbClr r="0" g="0" b="0"/>
+        </a:fillRef>
+        <a:effectRef idx="0">
+          <a:scrgbClr r="0" g="0" b="0"/>
+        </a:effectRef>
+        <a:fontRef idx="minor">
+          <a:schemeClr val="lt1"/>
+        </a:fontRef>
+      </dsp:style>
+      <dsp:txBody>
+        <a:bodyPr spcFirstLastPara="0" vert="horz" wrap="square" lIns="64770" tIns="64770" rIns="64770" bIns="64770" numCol="1" spcCol="1270" anchor="ctr" anchorCtr="0">
+          <a:noAutofit/>
+        </a:bodyPr>
+        <a:lstStyle/>
+        <a:p>
+          <a:pPr marL="0" lvl="0" indent="0" algn="ctr" defTabSz="755650">
+            <a:lnSpc>
+              <a:spcPct val="90000"/>
+            </a:lnSpc>
+            <a:spcBef>
+              <a:spcPct val="0"/>
+            </a:spcBef>
+            <a:spcAft>
+              <a:spcPct val="35000"/>
+            </a:spcAft>
+            <a:buNone/>
+          </a:pPr>
+          <a:r>
+            <a:rPr lang="es-ES" sz="1700" kern="1200" dirty="0"/>
+            <a:t>Amenazas: aplicación, con base externa que cualquiera puede tener y que se necesita actualizar.</a:t>
+          </a:r>
+        </a:p>
+      </dsp:txBody>
+      <dsp:txXfrm>
+        <a:off x="3710930" y="423588"/>
+        <a:ext cx="1808820" cy="1808820"/>
+      </dsp:txXfrm>
+    </dsp:sp>
+    <dsp:sp modelId="{7557886D-D86C-1147-A931-DCC04F70D27C}">
+      <dsp:nvSpPr>
+        <dsp:cNvPr id="0" name=""/>
+        <dsp:cNvSpPr/>
+      </dsp:nvSpPr>
+      <dsp:spPr>
+        <a:xfrm>
+          <a:off x="1257758" y="2681053"/>
+          <a:ext cx="2004526" cy="2004526"/>
+        </a:xfrm>
+        <a:prstGeom prst="roundRect">
+          <a:avLst/>
+        </a:prstGeom>
+        <a:solidFill>
+          <a:srgbClr val="002060"/>
+        </a:solidFill>
+        <a:ln w="12700" cap="flat" cmpd="sng" algn="ctr">
+          <a:solidFill>
+            <a:schemeClr val="lt1">
+              <a:hueOff val="0"/>
+              <a:satOff val="0"/>
+              <a:lumOff val="0"/>
+              <a:alphaOff val="0"/>
+            </a:schemeClr>
+          </a:solidFill>
+          <a:prstDash val="solid"/>
+          <a:miter lim="800000"/>
+        </a:ln>
+        <a:effectLst/>
+      </dsp:spPr>
+      <dsp:style>
+        <a:lnRef idx="2">
+          <a:scrgbClr r="0" g="0" b="0"/>
+        </a:lnRef>
+        <a:fillRef idx="1">
+          <a:scrgbClr r="0" g="0" b="0"/>
+        </a:fillRef>
+        <a:effectRef idx="0">
+          <a:scrgbClr r="0" g="0" b="0"/>
+        </a:effectRef>
+        <a:fontRef idx="minor">
+          <a:schemeClr val="lt1"/>
+        </a:fontRef>
+      </dsp:style>
+      <dsp:txBody>
+        <a:bodyPr spcFirstLastPara="0" vert="horz" wrap="square" lIns="64770" tIns="64770" rIns="64770" bIns="64770" numCol="1" spcCol="1270" anchor="ctr" anchorCtr="0">
+          <a:noAutofit/>
+        </a:bodyPr>
+        <a:lstStyle/>
+        <a:p>
+          <a:pPr marL="0" lvl="0" indent="0" algn="ctr" defTabSz="755650">
+            <a:lnSpc>
+              <a:spcPct val="90000"/>
+            </a:lnSpc>
+            <a:spcBef>
+              <a:spcPct val="0"/>
+            </a:spcBef>
+            <a:spcAft>
+              <a:spcPct val="35000"/>
+            </a:spcAft>
+            <a:buNone/>
+          </a:pPr>
+          <a:r>
+            <a:rPr lang="es-ES" sz="1700" kern="1200" dirty="0"/>
+            <a:t>Fortalezas: interfaz sencilla de utilizar que brinda datos en un tiempo ínfimo.</a:t>
+          </a:r>
+        </a:p>
+      </dsp:txBody>
+      <dsp:txXfrm>
+        <a:off x="1355611" y="2778906"/>
+        <a:ext cx="1808820" cy="1808820"/>
+      </dsp:txXfrm>
+    </dsp:sp>
+    <dsp:sp modelId="{73CE24B6-DA72-C243-9D61-0F7C016B23AE}">
+      <dsp:nvSpPr>
+        <dsp:cNvPr id="0" name=""/>
+        <dsp:cNvSpPr/>
+      </dsp:nvSpPr>
+      <dsp:spPr>
+        <a:xfrm>
+          <a:off x="3613077" y="2681053"/>
+          <a:ext cx="2004526" cy="2004526"/>
+        </a:xfrm>
+        <a:prstGeom prst="roundRect">
+          <a:avLst/>
+        </a:prstGeom>
+        <a:solidFill>
+          <a:srgbClr val="002060"/>
+        </a:solidFill>
+        <a:ln w="12700" cap="flat" cmpd="sng" algn="ctr">
+          <a:solidFill>
+            <a:schemeClr val="lt1">
+              <a:hueOff val="0"/>
+              <a:satOff val="0"/>
+              <a:lumOff val="0"/>
+              <a:alphaOff val="0"/>
+            </a:schemeClr>
+          </a:solidFill>
+          <a:prstDash val="solid"/>
+          <a:miter lim="800000"/>
+        </a:ln>
+        <a:effectLst/>
+      </dsp:spPr>
+      <dsp:style>
+        <a:lnRef idx="2">
+          <a:scrgbClr r="0" g="0" b="0"/>
+        </a:lnRef>
+        <a:fillRef idx="1">
+          <a:scrgbClr r="0" g="0" b="0"/>
+        </a:fillRef>
+        <a:effectRef idx="0">
+          <a:scrgbClr r="0" g="0" b="0"/>
+        </a:effectRef>
+        <a:fontRef idx="minor">
+          <a:schemeClr val="lt1"/>
+        </a:fontRef>
+      </dsp:style>
+      <dsp:txBody>
+        <a:bodyPr spcFirstLastPara="0" vert="horz" wrap="square" lIns="64770" tIns="64770" rIns="64770" bIns="64770" numCol="1" spcCol="1270" anchor="ctr" anchorCtr="0">
+          <a:noAutofit/>
+        </a:bodyPr>
+        <a:lstStyle/>
+        <a:p>
+          <a:pPr marL="0" lvl="0" indent="0" algn="ctr" defTabSz="755650">
+            <a:lnSpc>
+              <a:spcPct val="90000"/>
+            </a:lnSpc>
+            <a:spcBef>
+              <a:spcPct val="0"/>
+            </a:spcBef>
+            <a:spcAft>
+              <a:spcPct val="35000"/>
+            </a:spcAft>
+            <a:buNone/>
+          </a:pPr>
+          <a:r>
+            <a:rPr lang="es-ES" sz="1700" kern="1200" dirty="0"/>
+            <a:t>Oportunidades: base de datos actualizable cada año.</a:t>
+          </a:r>
+        </a:p>
+      </dsp:txBody>
+      <dsp:txXfrm>
+        <a:off x="3710930" y="2778906"/>
+        <a:ext cx="1808820" cy="1808820"/>
+      </dsp:txXfrm>
+    </dsp:sp>
+  </dsp:spTree>
+</dsp:drawing>
+</file>
+
+<file path=ppt/diagrams/layout1.xml><?xml version="1.0" encoding="utf-8"?>
+<dgm:layoutDef xmlns:dgm="http://schemas.openxmlformats.org/drawingml/2006/diagram" xmlns:a="http://schemas.openxmlformats.org/drawingml/2006/main" uniqueId="urn:microsoft.com/office/officeart/2005/8/layout/matrix2">
+  <dgm:title val=""/>
+  <dgm:desc val=""/>
+  <dgm:catLst>
+    <dgm:cat type="matrix" pri="3000"/>
+  </dgm:catLst>
+  <dgm:sampData>
+    <dgm:dataModel>
+      <dgm:ptLst>
+        <dgm:pt modelId="0" type="doc"/>
+        <dgm:pt modelId="1">
+          <dgm:prSet phldr="1"/>
+        </dgm:pt>
+        <dgm:pt modelId="2">
+          <dgm:prSet phldr="1"/>
+        </dgm:pt>
+        <dgm:pt modelId="3">
+          <dgm:prSet phldr="1"/>
+        </dgm:pt>
+        <dgm:pt modelId="4">
+          <dgm:prSet phldr="1"/>
+        </dgm:pt>
+      </dgm:ptLst>
+      <dgm:cxnLst>
+        <dgm:cxn modelId="5" srcId="0" destId="1" srcOrd="0" destOrd="0"/>
+        <dgm:cxn modelId="6" srcId="0" destId="2" srcOrd="1" destOrd="0"/>
+        <dgm:cxn modelId="7" srcId="0" destId="3" srcOrd="0" destOrd="0"/>
+        <dgm:cxn modelId="8" srcId="0" destId="4" srcOrd="1" destOrd="0"/>
+      </dgm:cxnLst>
+      <dgm:bg/>
+      <dgm:whole/>
+    </dgm:dataModel>
+  </dgm:sampData>
+  <dgm:styleData useDef="1">
+    <dgm:dataModel>
+      <dgm:ptLst/>
+      <dgm:bg/>
+      <dgm:whole/>
+    </dgm:dataModel>
+  </dgm:styleData>
+  <dgm:clrData useDef="1">
+    <dgm:dataModel>
+      <dgm:ptLst/>
+      <dgm:bg/>
+      <dgm:whole/>
+    </dgm:dataModel>
+  </dgm:clrData>
+  <dgm:layoutNode name="matrix">
+    <dgm:varLst>
+      <dgm:chMax val="1"/>
+      <dgm:dir/>
+      <dgm:resizeHandles val="exact"/>
+    </dgm:varLst>
+    <dgm:alg type="composite">
+      <dgm:param type="ar" val="1"/>
+    </dgm:alg>
+    <dgm:shape xmlns:r="http://schemas.openxmlformats.org/officeDocument/2006/relationships" r:blip="">
+      <dgm:adjLst/>
+    </dgm:shape>
+    <dgm:presOf/>
+    <dgm:choose name="Name0">
+      <dgm:if name="Name1" func="var" arg="dir" op="equ" val="norm">
+        <dgm:constrLst>
+          <dgm:constr type="primFontSz" for="ch" ptType="node" op="equ" val="65"/>
+          <dgm:constr type="w" for="ch" forName="axisShape" refType="w"/>
+          <dgm:constr type="h" for="ch" forName="axisShape" refType="h"/>
+          <dgm:constr type="w" for="ch" forName="rect1" refType="w" fact="0.4"/>
+          <dgm:constr type="h" for="ch" forName="rect1" refType="w" fact="0.4"/>
+          <dgm:constr type="l" for="ch" forName="rect1" refType="w" fact="0.065"/>
+          <dgm:constr type="t" for="ch" forName="rect1" refType="h" fact="0.065"/>
+          <dgm:constr type="w" for="ch" forName="rect2" refType="w" fact="0.4"/>
+          <dgm:constr type="h" for="ch" forName="rect2" refType="h" fact="0.4"/>
+          <dgm:constr type="r" for="ch" forName="rect2" refType="w" fact="0.935"/>
+          <dgm:constr type="t" for="ch" forName="rect2" refType="h" fact="0.065"/>
+          <dgm:constr type="w" for="ch" forName="rect3" refType="w" fact="0.4"/>
+          <dgm:constr type="h" for="ch" forName="rect3" refType="w" fact="0.4"/>
+          <dgm:constr type="l" for="ch" forName="rect3" refType="w" fact="0.065"/>
+          <dgm:constr type="b" for="ch" forName="rect3" refType="h" fact="0.935"/>
+          <dgm:constr type="w" for="ch" forName="rect4" refType="w" fact="0.4"/>
+          <dgm:constr type="h" for="ch" forName="rect4" refType="h" fact="0.4"/>
+          <dgm:constr type="r" for="ch" forName="rect4" refType="w" fact="0.935"/>
+          <dgm:constr type="b" for="ch" forName="rect4" refType="h" fact="0.935"/>
+        </dgm:constrLst>
+      </dgm:if>
+      <dgm:else name="Name2">
+        <dgm:constrLst>
+          <dgm:constr type="primFontSz" for="ch" ptType="node" op="equ" val="65"/>
+          <dgm:constr type="w" for="ch" forName="axisShape" refType="w"/>
+          <dgm:constr type="h" for="ch" forName="axisShape" refType="h"/>
+          <dgm:constr type="w" for="ch" forName="rect1" refType="w" fact="0.4"/>
+          <dgm:constr type="h" for="ch" forName="rect1" refType="w" fact="0.4"/>
+          <dgm:constr type="r" for="ch" forName="rect1" refType="w" fact="0.935"/>
+          <dgm:constr type="t" for="ch" forName="rect1" refType="h" fact="0.065"/>
+          <dgm:constr type="w" for="ch" forName="rect2" refType="w" fact="0.4"/>
+          <dgm:constr type="h" for="ch" forName="rect2" refType="h" fact="0.4"/>
+          <dgm:constr type="l" for="ch" forName="rect2" refType="w" fact="0.065"/>
+          <dgm:constr type="t" for="ch" forName="rect2" refType="h" fact="0.065"/>
+          <dgm:constr type="w" for="ch" forName="rect3" refType="w" fact="0.4"/>
+          <dgm:constr type="h" for="ch" forName="rect3" refType="w" fact="0.4"/>
+          <dgm:constr type="r" for="ch" forName="rect3" refType="w" fact="0.935"/>
+          <dgm:constr type="b" for="ch" forName="rect3" refType="h" fact="0.935"/>
+          <dgm:constr type="w" for="ch" forName="rect4" refType="w" fact="0.4"/>
+          <dgm:constr type="h" for="ch" forName="rect4" refType="h" fact="0.4"/>
+          <dgm:constr type="l" for="ch" forName="rect4" refType="w" fact="0.065"/>
+          <dgm:constr type="b" for="ch" forName="rect4" refType="h" fact="0.935"/>
+        </dgm:constrLst>
+      </dgm:else>
+    </dgm:choose>
+    <dgm:ruleLst/>
+    <dgm:choose name="Name3">
+      <dgm:if name="Name4" axis="ch" ptType="node" func="cnt" op="gte" val="1">
+        <dgm:layoutNode name="axisShape" styleLbl="bgShp">
+          <dgm:alg type="sp"/>
+          <dgm:shape xmlns:r="http://schemas.openxmlformats.org/officeDocument/2006/relationships" type="quadArrow" r:blip="">
+            <dgm:adjLst>
+              <dgm:adj idx="1" val="0.02"/>
+              <dgm:adj idx="2" val="0.04"/>
+              <dgm:adj idx="3" val="0.05"/>
+            </dgm:adjLst>
+          </dgm:shape>
+          <dgm:presOf/>
+          <dgm:constrLst/>
+          <dgm:ruleLst/>
+        </dgm:layoutNode>
+        <dgm:layoutNode name="rect1">
+          <dgm:varLst>
+            <dgm:chMax val="0"/>
+            <dgm:chPref val="0"/>
+            <dgm:bulletEnabled val="1"/>
+          </dgm:varLst>
+          <dgm:alg type="tx"/>
+          <dgm:shape xmlns:r="http://schemas.openxmlformats.org/officeDocument/2006/relationships" type="roundRect" r:blip="">
+            <dgm:adjLst/>
+          </dgm:shape>
+          <dgm:presOf axis="ch desOrSelf" ptType="node node" st="1 1" cnt="1 0"/>
+          <dgm:constrLst>
+            <dgm:constr type="tMarg" refType="primFontSz" fact="0.3"/>
+            <dgm:constr type="bMarg" refType="primFontSz" fact="0.3"/>
+            <dgm:constr type="lMarg" refType="primFontSz" fact="0.3"/>
+            <dgm:constr type="rMarg" refType="primFontSz" fact="0.3"/>
+          </dgm:constrLst>
+          <dgm:ruleLst>
+            <dgm:rule type="primFontSz" val="5" fact="NaN" max="NaN"/>
+          </dgm:ruleLst>
+        </dgm:layoutNode>
+        <dgm:layoutNode name="rect2">
+          <dgm:varLst>
+            <dgm:chMax val="0"/>
+            <dgm:chPref val="0"/>
+            <dgm:bulletEnabled val="1"/>
+          </dgm:varLst>
+          <dgm:alg type="tx"/>
+          <dgm:shape xmlns:r="http://schemas.openxmlformats.org/officeDocument/2006/relationships" type="roundRect" r:blip="">
+            <dgm:adjLst/>
+          </dgm:shape>
+          <dgm:presOf axis="ch desOrSelf" ptType="node node" st="2 1" cnt="1 0"/>
+          <dgm:constrLst>
+            <dgm:constr type="tMarg" refType="primFontSz" fact="0.3"/>
+            <dgm:constr type="bMarg" refType="primFontSz" fact="0.3"/>
+            <dgm:constr type="lMarg" refType="primFontSz" fact="0.3"/>
+            <dgm:constr type="rMarg" refType="primFontSz" fact="0.3"/>
+          </dgm:constrLst>
+          <dgm:ruleLst>
+            <dgm:rule type="primFontSz" val="5" fact="NaN" max="NaN"/>
+          </dgm:ruleLst>
+        </dgm:layoutNode>
+        <dgm:layoutNode name="rect3">
+          <dgm:varLst>
+            <dgm:chMax val="0"/>
+            <dgm:chPref val="0"/>
+            <dgm:bulletEnabled val="1"/>
+          </dgm:varLst>
+          <dgm:alg type="tx"/>
+          <dgm:shape xmlns:r="http://schemas.openxmlformats.org/officeDocument/2006/relationships" type="roundRect" r:blip="">
+            <dgm:adjLst/>
+          </dgm:shape>
+          <dgm:presOf axis="ch desOrSelf" ptType="node node" st="3 1" cnt="1 0"/>
+          <dgm:constrLst>
+            <dgm:constr type="tMarg" refType="primFontSz" fact="0.3"/>
+            <dgm:constr type="bMarg" refType="primFontSz" fact="0.3"/>
+            <dgm:constr type="lMarg" refType="primFontSz" fact="0.3"/>
+            <dgm:constr type="rMarg" refType="primFontSz" fact="0.3"/>
+          </dgm:constrLst>
+          <dgm:ruleLst>
+            <dgm:rule type="primFontSz" val="5" fact="NaN" max="NaN"/>
+          </dgm:ruleLst>
+        </dgm:layoutNode>
+        <dgm:layoutNode name="rect4">
+          <dgm:varLst>
+            <dgm:chMax val="0"/>
+            <dgm:chPref val="0"/>
+            <dgm:bulletEnabled val="1"/>
+          </dgm:varLst>
+          <dgm:alg type="tx"/>
+          <dgm:shape xmlns:r="http://schemas.openxmlformats.org/officeDocument/2006/relationships" type="roundRect" r:blip="">
+            <dgm:adjLst/>
+          </dgm:shape>
+          <dgm:presOf axis="ch desOrSelf" ptType="node node" st="4 1" cnt="1 0"/>
+          <dgm:constrLst>
+            <dgm:constr type="tMarg" refType="primFontSz" fact="0.3"/>
+            <dgm:constr type="bMarg" refType="primFontSz" fact="0.3"/>
+            <dgm:constr type="lMarg" refType="primFontSz" fact="0.3"/>
+            <dgm:constr type="rMarg" refType="primFontSz" fact="0.3"/>
+          </dgm:constrLst>
+          <dgm:ruleLst>
+            <dgm:rule type="primFontSz" val="5" fact="NaN" max="NaN"/>
+          </dgm:ruleLst>
+        </dgm:layoutNode>
+      </dgm:if>
+      <dgm:else name="Name5"/>
+    </dgm:choose>
+  </dgm:layoutNode>
+</dgm:layoutDef>
+</file>
+
+<file path=ppt/diagrams/quickStyle1.xml><?xml version="1.0" encoding="utf-8"?>
+<dgm:styleDef xmlns:dgm="http://schemas.openxmlformats.org/drawingml/2006/diagram" xmlns:a="http://schemas.openxmlformats.org/drawingml/2006/main" uniqueId="urn:microsoft.com/office/officeart/2005/8/quickstyle/simple1">
+  <dgm:title val=""/>
+  <dgm:desc val=""/>
+  <dgm:catLst>
+    <dgm:cat type="simple" pri="10100"/>
+  </dgm:catLst>
+  <dgm:scene3d>
+    <a:camera prst="orthographicFront"/>
+    <a:lightRig rig="threePt" dir="t"/>
+  </dgm:scene3d>
+  <dgm:styleLbl name="node0">
+    <dgm:scene3d>
+      <a:camera prst="orthographicFront"/>
+      <a:lightRig rig="threePt" dir="t"/>
+    </dgm:scene3d>
+    <dgm:sp3d/>
+    <dgm:txPr/>
+    <dgm:style>
+      <a:lnRef idx="2">
+        <a:scrgbClr r="0" g="0" b="0"/>
+      </a:lnRef>
+      <a:fillRef idx="1">
+        <a:scrgbClr r="0" g="0" b="0"/>
+      </a:fillRef>
+      <a:effectRef idx="0">
+        <a:scrgbClr r="0" g="0" b="0"/>
+      </a:effectRef>
+      <a:fontRef idx="minor">
+        <a:schemeClr val="lt1"/>
+      </a:fontRef>
+    </dgm:style>
+  </dgm:styleLbl>
+  <dgm:styleLbl name="lnNode1">
+    <dgm:scene3d>
+      <a:camera prst="orthographicFront"/>
+      <a:lightRig rig="threePt" dir="t"/>
+    </dgm:scene3d>
+    <dgm:sp3d/>
+    <dgm:txPr/>
+    <dgm:style>
+      <a:lnRef idx="2">
+        <a:scrgbClr r="0" g="0" b="0"/>
+      </a:lnRef>
+      <a:fillRef idx="1">
+        <a:scrgbClr r="0" g="0" b="0"/>
+      </a:fillRef>
+      <a:effectRef idx="0">
+        <a:scrgbClr r="0" g="0" b="0"/>
+      </a:effectRef>
+      <a:fontRef idx="minor">
+        <a:schemeClr val="lt1"/>
+      </a:fontRef>
+    </dgm:style>
+  </dgm:styleLbl>
+  <dgm:styleLbl name="vennNode1">
+    <dgm:scene3d>
+      <a:camera prst="orthographicFront"/>
+      <a:lightRig rig="threePt" dir="t"/>
+    </dgm:scene3d>
+    <dgm:sp3d/>
+    <dgm:txPr/>
+    <dgm:style>
+      <a:lnRef idx="2">
+        <a:scrgbClr r="0" g="0" b="0"/>
+      </a:lnRef>
+      <a:fillRef idx="1">
+        <a:scrgbClr r="0" g="0" b="0"/>
+      </a:fillRef>
+      <a:effectRef idx="0">
+        <a:scrgbClr r="0" g="0" b="0"/>
+      </a:effectRef>
+      <a:fontRef idx="minor">
+        <a:schemeClr val="tx1"/>
+      </a:fontRef>
+    </dgm:style>
+  </dgm:styleLbl>
+  <dgm:styleLbl name="alignNode1">
+    <dgm:scene3d>
+      <a:camera prst="orthographicFront"/>
+      <a:lightRig rig="threePt" dir="t"/>
+    </dgm:scene3d>
+    <dgm:sp3d/>
+    <dgm:txPr/>
+    <dgm:style>
+      <a:lnRef idx="2">
+        <a:scrgbClr r="0" g="0" b="0"/>
+      </a:lnRef>
+      <a:fillRef idx="1">
+        <a:scrgbClr r="0" g="0" b="0"/>
+      </a:fillRef>
+      <a:effectRef idx="0">
+        <a:scrgbClr r="0" g="0" b="0"/>
+      </a:effectRef>
+      <a:fontRef idx="minor">
+        <a:schemeClr val="lt1"/>
+      </a:fontRef>
+    </dgm:style>
+  </dgm:styleLbl>
+  <dgm:styleLbl name="node1">
+    <dgm:scene3d>
+      <a:camera prst="orthographicFront"/>
+      <a:lightRig rig="threePt" dir="t"/>
+    </dgm:scene3d>
+    <dgm:sp3d/>
+    <dgm:txPr/>
+    <dgm:style>
+      <a:lnRef idx="2">
+        <a:scrgbClr r="0" g="0" b="0"/>
+      </a:lnRef>
+      <a:fillRef idx="1">
+        <a:scrgbClr r="0" g="0" b="0"/>
+      </a:fillRef>
+      <a:effectRef idx="0">
+        <a:scrgbClr r="0" g="0" b="0"/>
+      </a:effectRef>
+      <a:fontRef idx="minor">
+        <a:schemeClr val="lt1"/>
+      </a:fontRef>
+    </dgm:style>
+  </dgm:styleLbl>
+  <dgm:styleLbl name="node2">
+    <dgm:scene3d>
+      <a:camera prst="orthographicFront"/>
+      <a:lightRig rig="threePt" dir="t"/>
+    </dgm:scene3d>
+    <dgm:sp3d/>
+    <dgm:txPr/>
+    <dgm:style>
+      <a:lnRef idx="2">
+        <a:scrgbClr r="0" g="0" b="0"/>
+      </a:lnRef>
+      <a:fillRef idx="1">
+        <a:scrgbClr r="0" g="0" b="0"/>
+      </a:fillRef>
+      <a:effectRef idx="0">
+        <a:scrgbClr r="0" g="0" b="0"/>
+      </a:effectRef>
+      <a:fontRef idx="minor">
+        <a:schemeClr val="lt1"/>
+      </a:fontRef>
+    </dgm:style>
+  </dgm:styleLbl>
+  <dgm:styleLbl name="node3">
+    <dgm:scene3d>
+      <a:camera prst="orthographicFront"/>
+      <a:lightRig rig="threePt" dir="t"/>
+    </dgm:scene3d>
+    <dgm:sp3d/>
+    <dgm:txPr/>
+    <dgm:style>
+      <a:lnRef idx="2">
+        <a:scrgbClr r="0" g="0" b="0"/>
+      </a:lnRef>
+      <a:fillRef idx="1">
+        <a:scrgbClr r="0" g="0" b="0"/>
+      </a:fillRef>
+      <a:effectRef idx="0">
+        <a:scrgbClr r="0" g="0" b="0"/>
+      </a:effectRef>
+      <a:fontRef idx="minor">
+        <a:schemeClr val="lt1"/>
+      </a:fontRef>
+    </dgm:style>
+  </dgm:styleLbl>
+  <dgm:styleLbl name="node4">
+    <dgm:scene3d>
+      <a:camera prst="orthographicFront"/>
+      <a:lightRig rig="threePt" dir="t"/>
+    </dgm:scene3d>
+    <dgm:sp3d/>
+    <dgm:txPr/>
+    <dgm:style>
+      <a:lnRef idx="2">
+        <a:scrgbClr r="0" g="0" b="0"/>
+      </a:lnRef>
+      <a:fillRef idx="1">
+        <a:scrgbClr r="0" g="0" b="0"/>
+      </a:fillRef>
+      <a:effectRef idx="0">
+        <a:scrgbClr r="0" g="0" b="0"/>
+      </a:effectRef>
+      <a:fontRef idx="minor">
+        <a:schemeClr val="lt1"/>
+      </a:fontRef>
+    </dgm:style>
+  </dgm:styleLbl>
+  <dgm:styleLbl name="fgImgPlace1">
+    <dgm:scene3d>
+      <a:camera prst="orthographicFront"/>
+      <a:lightRig rig="threePt" dir="t"/>
+    </dgm:scene3d>
+    <dgm:sp3d/>
+    <dgm:txPr/>
+    <dgm:style>
+      <a:lnRef idx="2">
+        <a:scrgbClr r="0" g="0" b="0"/>
+      </a:lnRef>
+      <a:fillRef idx="1">
+        <a:scrgbClr r="0" g="0" b="0"/>
+      </a:fillRef>
+      <a:effectRef idx="0">
+        <a:scrgbClr r="0" g="0" b="0"/>
+      </a:effectRef>
+      <a:fontRef idx="minor"/>
+    </dgm:style>
+  </dgm:styleLbl>
+  <dgm:styleLbl name="alignImgPlace1">
+    <dgm:scene3d>
+      <a:camera prst="orthographicFront"/>
+      <a:lightRig rig="threePt" dir="t"/>
+    </dgm:scene3d>
+    <dgm:sp3d/>
+    <dgm:txPr/>
+    <dgm:style>
+      <a:lnRef idx="2">
+        <a:scrgbClr r="0" g="0" b="0"/>
+      </a:lnRef>
+      <a:fillRef idx="1">
+        <a:scrgbClr r="0" g="0" b="0"/>
+      </a:fillRef>
+      <a:effectRef idx="0">
+        <a:scrgbClr r="0" g="0" b="0"/>
+      </a:effectRef>
+      <a:fontRef idx="minor"/>
+    </dgm:style>
+  </dgm:styleLbl>
+  <dgm:styleLbl name="bgImgPlace1">
+    <dgm:scene3d>
+      <a:camera prst="orthographicFront"/>
+      <a:lightRig rig="threePt" dir="t"/>
+    </dgm:scene3d>
+    <dgm:sp3d/>
+    <dgm:txPr/>
+    <dgm:style>
+      <a:lnRef idx="2">
+        <a:scrgbClr r="0" g="0" b="0"/>
+      </a:lnRef>
+      <a:fillRef idx="1">
+        <a:scrgbClr r="0" g="0" b="0"/>
+      </a:fillRef>
+      <a:effectRef idx="0">
+        <a:scrgbClr r="0" g="0" b="0"/>
+      </a:effectRef>
+      <a:fontRef idx="minor"/>
+    </dgm:style>
+  </dgm:styleLbl>
+  <dgm:styleLbl name="sibTrans2D1">
+    <dgm:scene3d>
+      <a:camera prst="orthographicFront"/>
+      <a:lightRig rig="threePt" dir="t"/>
+    </dgm:scene3d>
+    <dgm:sp3d/>
+    <dgm:txPr/>
+    <dgm:style>
+      <a:lnRef idx="0">
+        <a:scrgbClr r="0" g="0" b="0"/>
+      </a:lnRef>
+      <a:fillRef idx="1">
+        <a:scrgbClr r="0" g="0" b="0"/>
+      </a:fillRef>
+      <a:effectRef idx="0">
+        <a:scrgbClr r="0" g="0" b="0"/>
+      </a:effectRef>
+      <a:fontRef idx="minor">
+        <a:schemeClr val="lt1"/>
+      </a:fontRef>
+    </dgm:style>
+  </dgm:styleLbl>
+  <dgm:styleLbl name="fgSibTrans2D1">
+    <dgm:scene3d>
+      <a:camera prst="orthographicFront"/>
+      <a:lightRig rig="threePt" dir="t"/>
+    </dgm:scene3d>
+    <dgm:sp3d/>
+    <dgm:txPr/>
+    <dgm:style>
+      <a:lnRef idx="0">
+        <a:scrgbClr r="0" g="0" b="0"/>
+      </a:lnRef>
+      <a:fillRef idx="1">
+        <a:scrgbClr r="0" g="0" b="0"/>
+      </a:fillRef>
+      <a:effectRef idx="0">
+        <a:scrgbClr r="0" g="0" b="0"/>
+      </a:effectRef>
+      <a:fontRef idx="minor">
+        <a:schemeClr val="lt1"/>
+      </a:fontRef>
+    </dgm:style>
+  </dgm:styleLbl>
+  <dgm:styleLbl name="bgSibTrans2D1">
+    <dgm:scene3d>
+      <a:camera prst="orthographicFront"/>
+      <a:lightRig rig="threePt" dir="t"/>
+    </dgm:scene3d>
+    <dgm:sp3d/>
+    <dgm:txPr/>
+    <dgm:style>
+      <a:lnRef idx="0">
+        <a:scrgbClr r="0" g="0" b="0"/>
+      </a:lnRef>
+      <a:fillRef idx="1">
+        <a:scrgbClr r="0" g="0" b="0"/>
+      </a:fillRef>
+      <a:effectRef idx="0">
+        <a:scrgbClr r="0" g="0" b="0"/>
+      </a:effectRef>
+      <a:fontRef idx="minor">
+        <a:schemeClr val="lt1"/>
+      </a:fontRef>
+    </dgm:style>
+  </dgm:styleLbl>
+  <dgm:styleLbl name="sibTrans1D1">
+    <dgm:scene3d>
+      <a:camera prst="orthographicFront"/>
+      <a:lightRig rig="threePt" dir="t"/>
+    </dgm:scene3d>
+    <dgm:sp3d/>
+    <dgm:txPr/>
+    <dgm:style>
+      <a:lnRef idx="1">
+        <a:scrgbClr r="0" g="0" b="0"/>
+      </a:lnRef>
+      <a:fillRef idx="0">
+        <a:scrgbClr r="0" g="0" b="0"/>
+      </a:fillRef>
+      <a:effectRef idx="0">
+        <a:scrgbClr r="0" g="0" b="0"/>
+      </a:effectRef>
+      <a:fontRef idx="minor"/>
+    </dgm:style>
+  </dgm:styleLbl>
+  <dgm:styleLbl name="callout">
+    <dgm:scene3d>
+      <a:camera prst="orthographicFront"/>
+      <a:lightRig rig="threePt" dir="t"/>
+    </dgm:scene3d>
+    <dgm:sp3d/>
+    <dgm:txPr/>
+    <dgm:style>
+      <a:lnRef idx="2">
+        <a:scrgbClr r="0" g="0" b="0"/>
+      </a:lnRef>
+      <a:fillRef idx="1">
+        <a:scrgbClr r="0" g="0" b="0"/>
+      </a:fillRef>
+      <a:effectRef idx="0">
+        <a:scrgbClr r="0" g="0" b="0"/>
+      </a:effectRef>
+      <a:fontRef idx="minor"/>
+    </dgm:style>
+  </dgm:styleLbl>
+  <dgm:styleLbl name="asst0">
+    <dgm:scene3d>
+      <a:camera prst="orthographicFront"/>
+      <a:lightRig rig="threePt" dir="t"/>
+    </dgm:scene3d>
+    <dgm:sp3d/>
+    <dgm:txPr/>
+    <dgm:style>
+      <a:lnRef idx="2">
+        <a:scrgbClr r="0" g="0" b="0"/>
+      </a:lnRef>
+      <a:fillRef idx="1">
+        <a:scrgbClr r="0" g="0" b="0"/>
+      </a:fillRef>
+      <a:effectRef idx="0">
+        <a:scrgbClr r="0" g="0" b="0"/>
+      </a:effectRef>
+      <a:fontRef idx="minor">
+        <a:schemeClr val="lt1"/>
+      </a:fontRef>
+    </dgm:style>
+  </dgm:styleLbl>
+  <dgm:styleLbl name="asst1">
+    <dgm:scene3d>
+      <a:camera prst="orthographicFront"/>
+      <a:lightRig rig="threePt" dir="t"/>
+    </dgm:scene3d>
+    <dgm:sp3d/>
+    <dgm:txPr/>
+    <dgm:style>
+      <a:lnRef idx="2">
+        <a:scrgbClr r="0" g="0" b="0"/>
+      </a:lnRef>
+      <a:fillRef idx="1">
+        <a:scrgbClr r="0" g="0" b="0"/>
+      </a:fillRef>
+      <a:effectRef idx="0">
+        <a:scrgbClr r="0" g="0" b="0"/>
+      </a:effectRef>
+      <a:fontRef idx="minor">
+        <a:schemeClr val="lt1"/>
+      </a:fontRef>
+    </dgm:style>
+  </dgm:styleLbl>
+  <dgm:styleLbl name="asst2">
+    <dgm:scene3d>
+      <a:camera prst="orthographicFront"/>
+      <a:lightRig rig="threePt" dir="t"/>
+    </dgm:scene3d>
+    <dgm:sp3d/>
+    <dgm:txPr/>
+    <dgm:style>
+      <a:lnRef idx="2">
+        <a:scrgbClr r="0" g="0" b="0"/>
+      </a:lnRef>
+      <a:fillRef idx="1">
+        <a:scrgbClr r="0" g="0" b="0"/>
+      </a:fillRef>
+      <a:effectRef idx="0">
+        <a:scrgbClr r="0" g="0" b="0"/>
+      </a:effectRef>
+      <a:fontRef idx="minor">
+        <a:schemeClr val="lt1"/>
+      </a:fontRef>
+    </dgm:style>
+  </dgm:styleLbl>
+  <dgm:styleLbl name="asst3">
+    <dgm:scene3d>
+      <a:camera prst="orthographicFront"/>
+      <a:lightRig rig="threePt" dir="t"/>
+    </dgm:scene3d>
+    <dgm:sp3d/>
+    <dgm:txPr/>
+    <dgm:style>
+      <a:lnRef idx="2">
+        <a:scrgbClr r="0" g="0" b="0"/>
+      </a:lnRef>
+      <a:fillRef idx="1">
+        <a:scrgbClr r="0" g="0" b="0"/>
+      </a:fillRef>
+      <a:effectRef idx="0">
+        <a:scrgbClr r="0" g="0" b="0"/>
+      </a:effectRef>
+      <a:fontRef idx="minor">
+        <a:schemeClr val="lt1"/>
+      </a:fontRef>
+    </dgm:style>
+  </dgm:styleLbl>
+  <dgm:styleLbl name="asst4">
+    <dgm:scene3d>
+      <a:camera prst="orthographicFront"/>
+      <a:lightRig rig="threePt" dir="t"/>
+    </dgm:scene3d>
+    <dgm:sp3d/>
+    <dgm:txPr/>
+    <dgm:style>
+      <a:lnRef idx="2">
+        <a:scrgbClr r="0" g="0" b="0"/>
+      </a:lnRef>
+      <a:fillRef idx="1">
+        <a:scrgbClr r="0" g="0" b="0"/>
+      </a:fillRef>
+      <a:effectRef idx="0">
+        <a:scrgbClr r="0" g="0" b="0"/>
+      </a:effectRef>
+      <a:fontRef idx="minor">
+        <a:schemeClr val="lt1"/>
+      </a:fontRef>
+    </dgm:style>
+  </dgm:styleLbl>
+  <dgm:styleLbl name="parChTrans2D1">
+    <dgm:scene3d>
+      <a:camera prst="orthographicFront"/>
+      <a:lightRig rig="threePt" dir="t"/>
+    </dgm:scene3d>
+    <dgm:sp3d/>
+    <dgm:txPr/>
+    <dgm:style>
+      <a:lnRef idx="2">
+        <a:scrgbClr r="0" g="0" b="0"/>
+      </a:lnRef>
+      <a:fillRef idx="1">
+        <a:scrgbClr r="0" g="0" b="0"/>
+      </a:fillRef>
+      <a:effectRef idx="0">
+        <a:scrgbClr r="0" g="0" b="0"/>
+      </a:effectRef>
+      <a:fontRef idx="minor">
+        <a:schemeClr val="lt1"/>
+      </a:fontRef>
+    </dgm:style>
+  </dgm:styleLbl>
+  <dgm:styleLbl name="parChTrans2D2">
+    <dgm:scene3d>
+      <a:camera prst="orthographicFront"/>
+      <a:lightRig rig="threePt" dir="t"/>
+    </dgm:scene3d>
+    <dgm:sp3d/>
+    <dgm:txPr/>
+    <dgm:style>
+      <a:lnRef idx="2">
+        <a:scrgbClr r="0" g="0" b="0"/>
+      </a:lnRef>
+      <a:fillRef idx="1">
+        <a:scrgbClr r="0" g="0" b="0"/>
+      </a:fillRef>
+      <a:effectRef idx="0">
+        <a:scrgbClr r="0" g="0" b="0"/>
+      </a:effectRef>
+      <a:fontRef idx="minor">
+        <a:schemeClr val="lt1"/>
+      </a:fontRef>
+    </dgm:style>
+  </dgm:styleLbl>
+  <dgm:styleLbl name="parChTrans2D3">
+    <dgm:scene3d>
+      <a:camera prst="orthographicFront"/>
+      <a:lightRig rig="threePt" dir="t"/>
+    </dgm:scene3d>
+    <dgm:sp3d/>
+    <dgm:txPr/>
+    <dgm:style>
+      <a:lnRef idx="2">
+        <a:scrgbClr r="0" g="0" b="0"/>
+      </a:lnRef>
+      <a:fillRef idx="1">
+        <a:scrgbClr r="0" g="0" b="0"/>
+      </a:fillRef>
+      <a:effectRef idx="0">
+        <a:scrgbClr r="0" g="0" b="0"/>
+      </a:effectRef>
+      <a:fontRef idx="minor">
+        <a:schemeClr val="lt1"/>
+      </a:fontRef>
+    </dgm:style>
+  </dgm:styleLbl>
+  <dgm:styleLbl name="parChTrans2D4">
+    <dgm:scene3d>
+      <a:camera prst="orthographicFront"/>
+      <a:lightRig rig="threePt" dir="t"/>
+    </dgm:scene3d>
+    <dgm:sp3d/>
+    <dgm:txPr/>
+    <dgm:style>
+      <a:lnRef idx="2">
+        <a:scrgbClr r="0" g="0" b="0"/>
+      </a:lnRef>
+      <a:fillRef idx="1">
+        <a:scrgbClr r="0" g="0" b="0"/>
+      </a:fillRef>
+      <a:effectRef idx="0">
+        <a:scrgbClr r="0" g="0" b="0"/>
+      </a:effectRef>
+      <a:fontRef idx="minor">
+        <a:schemeClr val="lt1"/>
+      </a:fontRef>
+    </dgm:style>
+  </dgm:styleLbl>
+  <dgm:styleLbl name="parChTrans1D1">
+    <dgm:scene3d>
+      <a:camera prst="orthographicFront"/>
+      <a:lightRig rig="threePt" dir="t"/>
+    </dgm:scene3d>
+    <dgm:sp3d/>
+    <dgm:txPr/>
+    <dgm:style>
+      <a:lnRef idx="2">
+        <a:scrgbClr r="0" g="0" b="0"/>
+      </a:lnRef>
+      <a:fillRef idx="0">
+        <a:scrgbClr r="0" g="0" b="0"/>
+      </a:fillRef>
+      <a:effectRef idx="0">
+        <a:scrgbClr r="0" g="0" b="0"/>
+      </a:effectRef>
+      <a:fontRef idx="minor"/>
+    </dgm:style>
+  </dgm:styleLbl>
+  <dgm:styleLbl name="parChTrans1D2">
+    <dgm:scene3d>
+      <a:camera prst="orthographicFront"/>
+      <a:lightRig rig="threePt" dir="t"/>
+    </dgm:scene3d>
+    <dgm:sp3d/>
+    <dgm:txPr/>
+    <dgm:style>
+      <a:lnRef idx="2">
+        <a:scrgbClr r="0" g="0" b="0"/>
+      </a:lnRef>
+      <a:fillRef idx="0">
+        <a:scrgbClr r="0" g="0" b="0"/>
+      </a:fillRef>
+      <a:effectRef idx="0">
+        <a:scrgbClr r="0" g="0" b="0"/>
+      </a:effectRef>
+      <a:fontRef idx="minor"/>
+    </dgm:style>
+  </dgm:styleLbl>
+  <dgm:styleLbl name="parChTrans1D3">
+    <dgm:scene3d>
+      <a:camera prst="orthographicFront"/>
+      <a:lightRig rig="threePt" dir="t"/>
+    </dgm:scene3d>
+    <dgm:sp3d/>
+    <dgm:txPr/>
+    <dgm:style>
+      <a:lnRef idx="2">
+        <a:scrgbClr r="0" g="0" b="0"/>
+      </a:lnRef>
+      <a:fillRef idx="0">
+        <a:scrgbClr r="0" g="0" b="0"/>
+      </a:fillRef>
+      <a:effectRef idx="0">
+        <a:scrgbClr r="0" g="0" b="0"/>
+      </a:effectRef>
+      <a:fontRef idx="minor"/>
+    </dgm:style>
+  </dgm:styleLbl>
+  <dgm:styleLbl name="parChTrans1D4">
+    <dgm:scene3d>
+      <a:camera prst="orthographicFront"/>
+      <a:lightRig rig="threePt" dir="t"/>
+    </dgm:scene3d>
+    <dgm:sp3d/>
+    <dgm:txPr/>
+    <dgm:style>
+      <a:lnRef idx="2">
+        <a:scrgbClr r="0" g="0" b="0"/>
+      </a:lnRef>
+      <a:fillRef idx="0">
+        <a:scrgbClr r="0" g="0" b="0"/>
+      </a:fillRef>
+      <a:effectRef idx="0">
+        <a:scrgbClr r="0" g="0" b="0"/>
+      </a:effectRef>
+      <a:fontRef idx="minor"/>
+    </dgm:style>
+  </dgm:styleLbl>
+  <dgm:styleLbl name="fgAcc1">
+    <dgm:scene3d>
+      <a:camera prst="orthographicFront"/>
+      <a:lightRig rig="threePt" dir="t"/>
+    </dgm:scene3d>
+    <dgm:sp3d/>
+    <dgm:txPr/>
+    <dgm:style>
+      <a:lnRef idx="2">
+        <a:scrgbClr r="0" g="0" b="0"/>
+      </a:lnRef>
+      <a:fillRef idx="1">
+        <a:scrgbClr r="0" g="0" b="0"/>
+      </a:fillRef>
+      <a:effectRef idx="0">
+        <a:scrgbClr r="0" g="0" b="0"/>
+      </a:effectRef>
+      <a:fontRef idx="minor"/>
+    </dgm:style>
+  </dgm:styleLbl>
+  <dgm:styleLbl name="conFgAcc1">
+    <dgm:scene3d>
+      <a:camera prst="orthographicFront"/>
+      <a:lightRig rig="threePt" dir="t"/>
+    </dgm:scene3d>
+    <dgm:sp3d/>
+    <dgm:txPr/>
+    <dgm:style>
+      <a:lnRef idx="2">
+        <a:scrgbClr r="0" g="0" b="0"/>
+      </a:lnRef>
+      <a:fillRef idx="1">
+        <a:scrgbClr r="0" g="0" b="0"/>
+      </a:fillRef>
+      <a:effectRef idx="0">
+        <a:scrgbClr r="0" g="0" b="0"/>
+      </a:effectRef>
+      <a:fontRef idx="minor"/>
+    </dgm:style>
+  </dgm:styleLbl>
+  <dgm:styleLbl name="alignAcc1">
+    <dgm:scene3d>
+      <a:camera prst="orthographicFront"/>
+      <a:lightRig rig="threePt" dir="t"/>
+    </dgm:scene3d>
+    <dgm:sp3d/>
+    <dgm:txPr/>
+    <dgm:style>
+      <a:lnRef idx="2">
+        <a:scrgbClr r="0" g="0" b="0"/>
+      </a:lnRef>
+      <a:fillRef idx="1">
+        <a:scrgbClr r="0" g="0" b="0"/>
+      </a:fillRef>
+      <a:effectRef idx="0">
+        <a:scrgbClr r="0" g="0" b="0"/>
+      </a:effectRef>
+      <a:fontRef idx="minor"/>
+    </dgm:style>
+  </dgm:styleLbl>
+  <dgm:styleLbl name="trAlignAcc1">
+    <dgm:scene3d>
+      <a:camera prst="orthographicFront"/>
+      <a:lightRig rig="threePt" dir="t"/>
+    </dgm:scene3d>
+    <dgm:sp3d/>
+    <dgm:txPr/>
+    <dgm:style>
+      <a:lnRef idx="1">
+        <a:scrgbClr r="0" g="0" b="0"/>
+      </a:lnRef>
+      <a:fillRef idx="1">
+        <a:scrgbClr r="0" g="0" b="0"/>
+      </a:fillRef>
+      <a:effectRef idx="0">
+        <a:scrgbClr r="0" g="0" b="0"/>
+      </a:effectRef>
+      <a:fontRef idx="minor"/>
+    </dgm:style>
+  </dgm:styleLbl>
+  <dgm:styleLbl name="bgAcc1">
+    <dgm:scene3d>
+      <a:camera prst="orthographicFront"/>
+      <a:lightRig rig="threePt" dir="t"/>
+    </dgm:scene3d>
+    <dgm:sp3d/>
+    <dgm:txPr/>
+    <dgm:style>
+      <a:lnRef idx="2">
+        <a:scrgbClr r="0" g="0" b="0"/>
+      </a:lnRef>
+      <a:fillRef idx="1">
+        <a:scrgbClr r="0" g="0" b="0"/>
+      </a:fillRef>
+      <a:effectRef idx="0">
+        <a:scrgbClr r="0" g="0" b="0"/>
+      </a:effectRef>
+      <a:fontRef idx="minor"/>
+    </dgm:style>
+  </dgm:styleLbl>
+  <dgm:styleLbl name="solidFgAcc1">
+    <dgm:scene3d>
+      <a:camera prst="orthographicFront"/>
+      <a:lightRig rig="threePt" dir="t"/>
+    </dgm:scene3d>
+    <dgm:sp3d/>
+    <dgm:txPr/>
+    <dgm:style>
+      <a:lnRef idx="2">
+        <a:scrgbClr r="0" g="0" b="0"/>
+      </a:lnRef>
+      <a:fillRef idx="1">
+        <a:scrgbClr r="0" g="0" b="0"/>
+      </a:fillRef>
+      <a:effectRef idx="0">
+        <a:scrgbClr r="0" g="0" b="0"/>
+      </a:effectRef>
+      <a:fontRef idx="minor"/>
+    </dgm:style>
+  </dgm:styleLbl>
+  <dgm:styleLbl name="solidAlignAcc1">
+    <dgm:scene3d>
+      <a:camera prst="orthographicFront"/>
+      <a:lightRig rig="threePt" dir="t"/>
+    </dgm:scene3d>
+    <dgm:sp3d/>
+    <dgm:txPr/>
+    <dgm:style>
+      <a:lnRef idx="2">
+        <a:scrgbClr r="0" g="0" b="0"/>
+      </a:lnRef>
+      <a:fillRef idx="1">
+        <a:scrgbClr r="0" g="0" b="0"/>
+      </a:fillRef>
+      <a:effectRef idx="0">
+        <a:scrgbClr r="0" g="0" b="0"/>
+      </a:effectRef>
+      <a:fontRef idx="minor"/>
+    </dgm:style>
+  </dgm:styleLbl>
+  <dgm:styleLbl name="solidBgAcc1">
+    <dgm:scene3d>
+      <a:camera prst="orthographicFront"/>
+      <a:lightRig rig="threePt" dir="t"/>
+    </dgm:scene3d>
+    <dgm:sp3d/>
+    <dgm:txPr/>
+    <dgm:style>
+      <a:lnRef idx="2">
+        <a:scrgbClr r="0" g="0" b="0"/>
+      </a:lnRef>
+      <a:fillRef idx="1">
+        <a:scrgbClr r="0" g="0" b="0"/>
+      </a:fillRef>
+      <a:effectRef idx="0">
+        <a:scrgbClr r="0" g="0" b="0"/>
+      </a:effectRef>
+      <a:fontRef idx="minor"/>
+    </dgm:style>
+  </dgm:styleLbl>
+  <dgm:styleLbl name="fgAccFollowNode1">
+    <dgm:scene3d>
+      <a:camera prst="orthographicFront"/>
+      <a:lightRig rig="threePt" dir="t"/>
+    </dgm:scene3d>
+    <dgm:sp3d/>
+    <dgm:txPr/>
+    <dgm:style>
+      <a:lnRef idx="2">
+        <a:scrgbClr r="0" g="0" b="0"/>
+      </a:lnRef>
+      <a:fillRef idx="1">
+        <a:scrgbClr r="0" g="0" b="0"/>
+      </a:fillRef>
+      <a:effectRef idx="0">
+        <a:scrgbClr r="0" g="0" b="0"/>
+      </a:effectRef>
+      <a:fontRef idx="minor"/>
+    </dgm:style>
+  </dgm:styleLbl>
+  <dgm:styleLbl name="alignAccFollowNode1">
+    <dgm:scene3d>
+      <a:camera prst="orthographicFront"/>
+      <a:lightRig rig="threePt" dir="t"/>
+    </dgm:scene3d>
+    <dgm:sp3d/>
+    <dgm:txPr/>
+    <dgm:style>
+      <a:lnRef idx="2">
+        <a:scrgbClr r="0" g="0" b="0"/>
+      </a:lnRef>
+      <a:fillRef idx="1">
+        <a:scrgbClr r="0" g="0" b="0"/>
+      </a:fillRef>
+      <a:effectRef idx="0">
+        <a:scrgbClr r="0" g="0" b="0"/>
+      </a:effectRef>
+      <a:fontRef idx="minor"/>
+    </dgm:style>
+  </dgm:styleLbl>
+  <dgm:styleLbl name="bgAccFollowNode1">
+    <dgm:scene3d>
+      <a:camera prst="orthographicFront"/>
+      <a:lightRig rig="threePt" dir="t"/>
+    </dgm:scene3d>
+    <dgm:sp3d/>
+    <dgm:txPr/>
+    <dgm:style>
+      <a:lnRef idx="2">
+        <a:scrgbClr r="0" g="0" b="0"/>
+      </a:lnRef>
+      <a:fillRef idx="1">
+        <a:scrgbClr r="0" g="0" b="0"/>
+      </a:fillRef>
+      <a:effectRef idx="0">
+        <a:scrgbClr r="0" g="0" b="0"/>
+      </a:effectRef>
+      <a:fontRef idx="minor"/>
+    </dgm:style>
+  </dgm:styleLbl>
+  <dgm:styleLbl name="fgAcc0">
+    <dgm:scene3d>
+      <a:camera prst="orthographicFront"/>
+      <a:lightRig rig="threePt" dir="t"/>
+    </dgm:scene3d>
+    <dgm:sp3d/>
+    <dgm:txPr/>
+    <dgm:style>
+      <a:lnRef idx="2">
+        <a:scrgbClr r="0" g="0" b="0"/>
+      </a:lnRef>
+      <a:fillRef idx="1">
+        <a:scrgbClr r="0" g="0" b="0"/>
+      </a:fillRef>
+      <a:effectRef idx="0">
+        <a:scrgbClr r="0" g="0" b="0"/>
+      </a:effectRef>
+      <a:fontRef idx="minor"/>
+    </dgm:style>
+  </dgm:styleLbl>
+  <dgm:styleLbl name="fgAcc2">
+    <dgm:scene3d>
+      <a:camera prst="orthographicFront"/>
+      <a:lightRig rig="threePt" dir="t"/>
+    </dgm:scene3d>
+    <dgm:sp3d/>
+    <dgm:txPr/>
+    <dgm:style>
+      <a:lnRef idx="2">
+        <a:scrgbClr r="0" g="0" b="0"/>
+      </a:lnRef>
+      <a:fillRef idx="1">
+        <a:scrgbClr r="0" g="0" b="0"/>
+      </a:fillRef>
+      <a:effectRef idx="0">
+        <a:scrgbClr r="0" g="0" b="0"/>
+      </a:effectRef>
+      <a:fontRef idx="minor"/>
+    </dgm:style>
+  </dgm:styleLbl>
+  <dgm:styleLbl name="fgAcc3">
+    <dgm:scene3d>
+      <a:camera prst="orthographicFront"/>
+      <a:lightRig rig="threePt" dir="t"/>
+    </dgm:scene3d>
+    <dgm:sp3d/>
+    <dgm:txPr/>
+    <dgm:style>
+      <a:lnRef idx="2">
+        <a:scrgbClr r="0" g="0" b="0"/>
+      </a:lnRef>
+      <a:fillRef idx="1">
+        <a:scrgbClr r="0" g="0" b="0"/>
+      </a:fillRef>
+      <a:effectRef idx="0">
+        <a:scrgbClr r="0" g="0" b="0"/>
+      </a:effectRef>
+      <a:fontRef idx="minor"/>
+    </dgm:style>
+  </dgm:styleLbl>
+  <dgm:styleLbl name="fgAcc4">
+    <dgm:scene3d>
+      <a:camera prst="orthographicFront"/>
+      <a:lightRig rig="threePt" dir="t"/>
+    </dgm:scene3d>
+    <dgm:sp3d/>
+    <dgm:txPr/>
+    <dgm:style>
+      <a:lnRef idx="2">
+        <a:scrgbClr r="0" g="0" b="0"/>
+      </a:lnRef>
+      <a:fillRef idx="1">
+        <a:scrgbClr r="0" g="0" b="0"/>
+      </a:fillRef>
+      <a:effectRef idx="0">
+        <a:scrgbClr r="0" g="0" b="0"/>
+      </a:effectRef>
+      <a:fontRef idx="minor"/>
+    </dgm:style>
+  </dgm:styleLbl>
+  <dgm:styleLbl name="bgShp">
+    <dgm:scene3d>
+      <a:camera prst="orthographicFront"/>
+      <a:lightRig rig="threePt" dir="t"/>
+    </dgm:scene3d>
+    <dgm:sp3d/>
+    <dgm:txPr/>
+    <dgm:style>
+      <a:lnRef idx="0">
+        <a:scrgbClr r="0" g="0" b="0"/>
+      </a:lnRef>
+      <a:fillRef idx="1">
+        <a:scrgbClr r="0" g="0" b="0"/>
+      </a:fillRef>
+      <a:effectRef idx="0">
+        <a:scrgbClr r="0" g="0" b="0"/>
+      </a:effectRef>
+      <a:fontRef idx="minor"/>
+    </dgm:style>
+  </dgm:styleLbl>
+  <dgm:styleLbl name="dkBgShp">
+    <dgm:scene3d>
+      <a:camera prst="orthographicFront"/>
+      <a:lightRig rig="threePt" dir="t"/>
+    </dgm:scene3d>
+    <dgm:sp3d/>
+    <dgm:txPr/>
+    <dgm:style>
+      <a:lnRef idx="0">
+        <a:scrgbClr r="0" g="0" b="0"/>
+      </a:lnRef>
+      <a:fillRef idx="1">
+        <a:scrgbClr r="0" g="0" b="0"/>
+      </a:fillRef>
+      <a:effectRef idx="0">
+        <a:scrgbClr r="0" g="0" b="0"/>
+      </a:effectRef>
+      <a:fontRef idx="minor"/>
+    </dgm:style>
+  </dgm:styleLbl>
+  <dgm:styleLbl name="trBgShp">
+    <dgm:scene3d>
+      <a:camera prst="orthographicFront"/>
+      <a:lightRig rig="threePt" dir="t"/>
+    </dgm:scene3d>
+    <dgm:sp3d/>
+    <dgm:txPr/>
+    <dgm:style>
+      <a:lnRef idx="0">
+        <a:scrgbClr r="0" g="0" b="0"/>
+      </a:lnRef>
+      <a:fillRef idx="1">
+        <a:scrgbClr r="0" g="0" b="0"/>
+      </a:fillRef>
+      <a:effectRef idx="0">
+        <a:scrgbClr r="0" g="0" b="0"/>
+      </a:effectRef>
+      <a:fontRef idx="minor"/>
+    </dgm:style>
+  </dgm:styleLbl>
+  <dgm:styleLbl name="fgShp">
+    <dgm:scene3d>
+      <a:camera prst="orthographicFront"/>
+      <a:lightRig rig="threePt" dir="t"/>
+    </dgm:scene3d>
+    <dgm:sp3d/>
+    <dgm:txPr/>
+    <dgm:style>
+      <a:lnRef idx="2">
+        <a:scrgbClr r="0" g="0" b="0"/>
+      </a:lnRef>
+      <a:fillRef idx="1">
+        <a:scrgbClr r="0" g="0" b="0"/>
+      </a:fillRef>
+      <a:effectRef idx="0">
+        <a:scrgbClr r="0" g="0" b="0"/>
+      </a:effectRef>
+      <a:fontRef idx="minor"/>
+    </dgm:style>
+  </dgm:styleLbl>
+  <dgm:styleLbl name="revTx">
+    <dgm:scene3d>
+      <a:camera prst="orthographicFront"/>
+      <a:lightRig rig="threePt" dir="t"/>
+    </dgm:scene3d>
+    <dgm:sp3d/>
+    <dgm:txPr/>
+    <dgm:style>
+      <a:lnRef idx="0">
+        <a:scrgbClr r="0" g="0" b="0"/>
+      </a:lnRef>
+      <a:fillRef idx="0">
+        <a:scrgbClr r="0" g="0" b="0"/>
+      </a:fillRef>
+      <a:effectRef idx="0">
+        <a:scrgbClr r="0" g="0" b="0"/>
+      </a:effectRef>
+      <a:fontRef idx="minor"/>
+    </dgm:style>
+  </dgm:styleLbl>
+</dgm:styleDef>
+</file>
+
 <file path=ppt/slideLayouts/slideLayout1.xml><?xml version="1.0" encoding="utf-8"?>
 <p:sldLayout xmlns:a="http://schemas.openxmlformats.org/drawingml/2006/main" xmlns:r="http://schemas.openxmlformats.org/officeDocument/2006/relationships" xmlns:p="http://schemas.openxmlformats.org/presentationml/2006/main" type="title" preserve="1">
   <p:cSld name="Diapositiva de título">
@@ -263,7 +2865,7 @@
           <a:p>
             <a:fld id="{AF2B4D62-3BA8-E643-8809-D7017F5BF04E}" type="datetimeFigureOut">
               <a:rPr lang="es-ES" smtClean="0"/>
-              <a:t>2/12/20</a:t>
+              <a:t>5/12/20</a:t>
             </a:fld>
             <a:endParaRPr lang="es-ES"/>
           </a:p>
@@ -461,7 +3063,7 @@
           <a:p>
             <a:fld id="{AF2B4D62-3BA8-E643-8809-D7017F5BF04E}" type="datetimeFigureOut">
               <a:rPr lang="es-ES" smtClean="0"/>
-              <a:t>2/12/20</a:t>
+              <a:t>5/12/20</a:t>
             </a:fld>
             <a:endParaRPr lang="es-ES"/>
           </a:p>
@@ -669,7 +3271,7 @@
           <a:p>
             <a:fld id="{AF2B4D62-3BA8-E643-8809-D7017F5BF04E}" type="datetimeFigureOut">
               <a:rPr lang="es-ES" smtClean="0"/>
-              <a:t>2/12/20</a:t>
+              <a:t>5/12/20</a:t>
             </a:fld>
             <a:endParaRPr lang="es-ES"/>
           </a:p>
@@ -867,7 +3469,7 @@
           <a:p>
             <a:fld id="{AF2B4D62-3BA8-E643-8809-D7017F5BF04E}" type="datetimeFigureOut">
               <a:rPr lang="es-ES" smtClean="0"/>
-              <a:t>2/12/20</a:t>
+              <a:t>5/12/20</a:t>
             </a:fld>
             <a:endParaRPr lang="es-ES"/>
           </a:p>
@@ -1142,7 +3744,7 @@
           <a:p>
             <a:fld id="{AF2B4D62-3BA8-E643-8809-D7017F5BF04E}" type="datetimeFigureOut">
               <a:rPr lang="es-ES" smtClean="0"/>
-              <a:t>2/12/20</a:t>
+              <a:t>5/12/20</a:t>
             </a:fld>
             <a:endParaRPr lang="es-ES"/>
           </a:p>
@@ -1407,7 +4009,7 @@
           <a:p>
             <a:fld id="{AF2B4D62-3BA8-E643-8809-D7017F5BF04E}" type="datetimeFigureOut">
               <a:rPr lang="es-ES" smtClean="0"/>
-              <a:t>2/12/20</a:t>
+              <a:t>5/12/20</a:t>
             </a:fld>
             <a:endParaRPr lang="es-ES"/>
           </a:p>
@@ -1819,7 +4421,7 @@
           <a:p>
             <a:fld id="{AF2B4D62-3BA8-E643-8809-D7017F5BF04E}" type="datetimeFigureOut">
               <a:rPr lang="es-ES" smtClean="0"/>
-              <a:t>2/12/20</a:t>
+              <a:t>5/12/20</a:t>
             </a:fld>
             <a:endParaRPr lang="es-ES"/>
           </a:p>
@@ -1960,7 +4562,7 @@
           <a:p>
             <a:fld id="{AF2B4D62-3BA8-E643-8809-D7017F5BF04E}" type="datetimeFigureOut">
               <a:rPr lang="es-ES" smtClean="0"/>
-              <a:t>2/12/20</a:t>
+              <a:t>5/12/20</a:t>
             </a:fld>
             <a:endParaRPr lang="es-ES"/>
           </a:p>
@@ -2073,7 +4675,7 @@
           <a:p>
             <a:fld id="{AF2B4D62-3BA8-E643-8809-D7017F5BF04E}" type="datetimeFigureOut">
               <a:rPr lang="es-ES" smtClean="0"/>
-              <a:t>2/12/20</a:t>
+              <a:t>5/12/20</a:t>
             </a:fld>
             <a:endParaRPr lang="es-ES"/>
           </a:p>
@@ -2384,7 +4986,7 @@
           <a:p>
             <a:fld id="{AF2B4D62-3BA8-E643-8809-D7017F5BF04E}" type="datetimeFigureOut">
               <a:rPr lang="es-ES" smtClean="0"/>
-              <a:t>2/12/20</a:t>
+              <a:t>5/12/20</a:t>
             </a:fld>
             <a:endParaRPr lang="es-ES"/>
           </a:p>
@@ -2675,7 +5277,7 @@
           <a:p>
             <a:fld id="{AF2B4D62-3BA8-E643-8809-D7017F5BF04E}" type="datetimeFigureOut">
               <a:rPr lang="es-ES" smtClean="0"/>
-              <a:t>2/12/20</a:t>
+              <a:t>5/12/20</a:t>
             </a:fld>
             <a:endParaRPr lang="es-ES"/>
           </a:p>
@@ -2925,7 +5527,7 @@
           <a:p>
             <a:fld id="{AF2B4D62-3BA8-E643-8809-D7017F5BF04E}" type="datetimeFigureOut">
               <a:rPr lang="es-ES" smtClean="0"/>
-              <a:t>2/12/20</a:t>
+              <a:t>5/12/20</a:t>
             </a:fld>
             <a:endParaRPr lang="es-ES"/>
           </a:p>
@@ -3561,20 +6163,26 @@
               <a:buAutoNum type="arabicPeriod"/>
             </a:pPr>
             <a:r>
-              <a:rPr lang="es-ES">
-                <a:solidFill>
-                  <a:schemeClr val="bg1"/>
-                </a:solidFill>
-              </a:rPr>
-              <a:t>Análisis </a:t>
-            </a:r>
-            <a:r>
               <a:rPr lang="es-ES" dirty="0">
                 <a:solidFill>
                   <a:schemeClr val="bg1"/>
                 </a:solidFill>
               </a:rPr>
-              <a:t>de resultados.</a:t>
+              <a:t>Composición de la aplicación.</a:t>
+            </a:r>
+          </a:p>
+          <a:p>
+            <a:pPr marL="514350" indent="-514350">
+              <a:buFont typeface="+mj-lt"/>
+              <a:buAutoNum type="arabicPeriod"/>
+            </a:pPr>
+            <a:r>
+              <a:rPr lang="es-ES" dirty="0">
+                <a:solidFill>
+                  <a:schemeClr val="bg1"/>
+                </a:solidFill>
+              </a:rPr>
+              <a:t>Análisis de resultados.</a:t>
             </a:r>
           </a:p>
           <a:p>
@@ -4427,6 +7035,528 @@
 </file>
 
 <file path=ppt/slides/slide5.xml><?xml version="1.0" encoding="utf-8"?>
+<p:sld xmlns:a="http://schemas.openxmlformats.org/drawingml/2006/main" xmlns:r="http://schemas.openxmlformats.org/officeDocument/2006/relationships" xmlns:p="http://schemas.openxmlformats.org/presentationml/2006/main">
+  <p:cSld>
+    <p:spTree>
+      <p:nvGrpSpPr>
+        <p:cNvPr id="1" name=""/>
+        <p:cNvGrpSpPr/>
+        <p:nvPr/>
+      </p:nvGrpSpPr>
+      <p:grpSpPr>
+        <a:xfrm>
+          <a:off x="0" y="0"/>
+          <a:ext cx="0" cy="0"/>
+          <a:chOff x="0" y="0"/>
+          <a:chExt cx="0" cy="0"/>
+        </a:xfrm>
+      </p:grpSpPr>
+      <p:sp>
+        <p:nvSpPr>
+          <p:cNvPr id="2" name="Título 1">
+            <a:extLst>
+              <a:ext uri="{FF2B5EF4-FFF2-40B4-BE49-F238E27FC236}">
+                <a16:creationId xmlns:a16="http://schemas.microsoft.com/office/drawing/2014/main" id="{1FD39894-7129-3F43-865E-A949E5FD3581}"/>
+              </a:ext>
+            </a:extLst>
+          </p:cNvPr>
+          <p:cNvSpPr>
+            <a:spLocks noGrp="1"/>
+          </p:cNvSpPr>
+          <p:nvPr>
+            <p:ph type="title"/>
+          </p:nvPr>
+        </p:nvSpPr>
+        <p:spPr/>
+        <p:txBody>
+          <a:bodyPr/>
+          <a:lstStyle/>
+          <a:p>
+            <a:r>
+              <a:rPr lang="es-ES" dirty="0">
+                <a:solidFill>
+                  <a:schemeClr val="bg1"/>
+                </a:solidFill>
+              </a:rPr>
+              <a:t>Composición de la aplicación.</a:t>
+            </a:r>
+          </a:p>
+        </p:txBody>
+      </p:sp>
+      <p:sp>
+        <p:nvSpPr>
+          <p:cNvPr id="3" name="Marcador de contenido 2">
+            <a:extLst>
+              <a:ext uri="{FF2B5EF4-FFF2-40B4-BE49-F238E27FC236}">
+                <a16:creationId xmlns:a16="http://schemas.microsoft.com/office/drawing/2014/main" id="{F519EF13-CCD9-AD44-9105-1ED647456D66}"/>
+              </a:ext>
+            </a:extLst>
+          </p:cNvPr>
+          <p:cNvSpPr>
+            <a:spLocks noGrp="1"/>
+          </p:cNvSpPr>
+          <p:nvPr>
+            <p:ph idx="1"/>
+          </p:nvPr>
+        </p:nvSpPr>
+        <p:spPr>
+          <a:xfrm>
+            <a:off x="421512" y="1424961"/>
+            <a:ext cx="3270813" cy="1603375"/>
+          </a:xfrm>
+        </p:spPr>
+        <p:txBody>
+          <a:bodyPr>
+            <a:normAutofit/>
+          </a:bodyPr>
+          <a:lstStyle/>
+          <a:p>
+            <a:r>
+              <a:rPr lang="es-ES" sz="2400" dirty="0">
+                <a:solidFill>
+                  <a:schemeClr val="bg1"/>
+                </a:solidFill>
+              </a:rPr>
+              <a:t>Neo4j: </a:t>
+            </a:r>
+          </a:p>
+          <a:p>
+            <a:pPr lvl="1"/>
+            <a:r>
+              <a:rPr lang="es-ES" sz="2000" dirty="0">
+                <a:solidFill>
+                  <a:schemeClr val="bg1"/>
+                </a:solidFill>
+              </a:rPr>
+              <a:t>Compuesta por :</a:t>
+            </a:r>
+          </a:p>
+          <a:p>
+            <a:pPr lvl="2"/>
+            <a:r>
+              <a:rPr lang="es-ES" sz="1400" dirty="0">
+                <a:solidFill>
+                  <a:schemeClr val="bg1"/>
+                </a:solidFill>
+              </a:rPr>
+              <a:t>Nodo tipo equipo</a:t>
+            </a:r>
+          </a:p>
+          <a:p>
+            <a:pPr lvl="2"/>
+            <a:r>
+              <a:rPr lang="es-ES" sz="1400" dirty="0">
+                <a:solidFill>
+                  <a:schemeClr val="bg1"/>
+                </a:solidFill>
+              </a:rPr>
+              <a:t>Nodos tipo Jugador.</a:t>
+            </a:r>
+          </a:p>
+          <a:p>
+            <a:pPr lvl="2"/>
+            <a:r>
+              <a:rPr lang="es-ES" sz="1400" dirty="0">
+                <a:solidFill>
+                  <a:schemeClr val="bg1"/>
+                </a:solidFill>
+              </a:rPr>
+              <a:t>Relaciones JUGENA_EN</a:t>
+            </a:r>
+          </a:p>
+          <a:p>
+            <a:pPr marL="457200" lvl="1" indent="0">
+              <a:buNone/>
+            </a:pPr>
+            <a:endParaRPr lang="es-ES" sz="1000" dirty="0"/>
+          </a:p>
+        </p:txBody>
+      </p:sp>
+      <p:sp>
+        <p:nvSpPr>
+          <p:cNvPr id="6" name="CuadroTexto 5">
+            <a:extLst>
+              <a:ext uri="{FF2B5EF4-FFF2-40B4-BE49-F238E27FC236}">
+                <a16:creationId xmlns:a16="http://schemas.microsoft.com/office/drawing/2014/main" id="{080B3B67-F79F-6847-84F4-CD31FDF41189}"/>
+              </a:ext>
+            </a:extLst>
+          </p:cNvPr>
+          <p:cNvSpPr txBox="1"/>
+          <p:nvPr/>
+        </p:nvSpPr>
+        <p:spPr>
+          <a:xfrm>
+            <a:off x="7373074" y="4047965"/>
+            <a:ext cx="4259483" cy="2308324"/>
+          </a:xfrm>
+          <a:prstGeom prst="rect">
+            <a:avLst/>
+          </a:prstGeom>
+          <a:noFill/>
+        </p:spPr>
+        <p:txBody>
+          <a:bodyPr wrap="square" rtlCol="0">
+            <a:spAutoFit/>
+          </a:bodyPr>
+          <a:lstStyle/>
+          <a:p>
+            <a:pPr marL="285750" indent="-285750">
+              <a:buFont typeface="Arial" panose="020B0604020202020204" pitchFamily="34" charset="0"/>
+              <a:buChar char="•"/>
+            </a:pPr>
+            <a:r>
+              <a:rPr lang="es-ES" dirty="0">
+                <a:solidFill>
+                  <a:schemeClr val="bg1"/>
+                </a:solidFill>
+              </a:rPr>
+              <a:t>Backend:</a:t>
+            </a:r>
+          </a:p>
+          <a:p>
+            <a:pPr marL="742950" lvl="1" indent="-285750">
+              <a:buFont typeface="Arial" panose="020B0604020202020204" pitchFamily="34" charset="0"/>
+              <a:buChar char="•"/>
+            </a:pPr>
+            <a:r>
+              <a:rPr lang="es-ES" dirty="0" err="1">
+                <a:solidFill>
+                  <a:schemeClr val="bg1"/>
+                </a:solidFill>
+              </a:rPr>
+              <a:t>dameLosMejores</a:t>
+            </a:r>
+            <a:endParaRPr lang="es-ES" dirty="0">
+              <a:solidFill>
+                <a:schemeClr val="bg1"/>
+              </a:solidFill>
+            </a:endParaRPr>
+          </a:p>
+          <a:p>
+            <a:pPr marL="742950" lvl="1" indent="-285750">
+              <a:buFont typeface="Arial" panose="020B0604020202020204" pitchFamily="34" charset="0"/>
+              <a:buChar char="•"/>
+            </a:pPr>
+            <a:r>
+              <a:rPr lang="es-ES" dirty="0" err="1">
+                <a:solidFill>
+                  <a:schemeClr val="bg1"/>
+                </a:solidFill>
+              </a:rPr>
+              <a:t>dameJugadoresPromesas</a:t>
+            </a:r>
+            <a:r>
+              <a:rPr lang="es-ES" dirty="0">
+                <a:solidFill>
+                  <a:schemeClr val="bg1"/>
+                </a:solidFill>
+              </a:rPr>
+              <a:t>.</a:t>
+            </a:r>
+          </a:p>
+          <a:p>
+            <a:pPr marL="742950" lvl="1" indent="-285750">
+              <a:buFont typeface="Arial" panose="020B0604020202020204" pitchFamily="34" charset="0"/>
+              <a:buChar char="•"/>
+            </a:pPr>
+            <a:r>
+              <a:rPr lang="es-ES" dirty="0" err="1">
+                <a:solidFill>
+                  <a:schemeClr val="bg1"/>
+                </a:solidFill>
+              </a:rPr>
+              <a:t>dameNacionalidades</a:t>
+            </a:r>
+            <a:r>
+              <a:rPr lang="es-ES" dirty="0">
+                <a:solidFill>
+                  <a:schemeClr val="bg1"/>
+                </a:solidFill>
+              </a:rPr>
+              <a:t>.</a:t>
+            </a:r>
+          </a:p>
+          <a:p>
+            <a:pPr marL="742950" lvl="1" indent="-285750">
+              <a:buFont typeface="Arial" panose="020B0604020202020204" pitchFamily="34" charset="0"/>
+              <a:buChar char="•"/>
+            </a:pPr>
+            <a:r>
+              <a:rPr lang="es-ES" dirty="0" err="1">
+                <a:solidFill>
+                  <a:schemeClr val="bg1"/>
+                </a:solidFill>
+              </a:rPr>
+              <a:t>dameEquipos</a:t>
+            </a:r>
+            <a:r>
+              <a:rPr lang="es-ES" dirty="0">
+                <a:solidFill>
+                  <a:schemeClr val="bg1"/>
+                </a:solidFill>
+              </a:rPr>
+              <a:t>.</a:t>
+            </a:r>
+          </a:p>
+          <a:p>
+            <a:pPr marL="742950" lvl="1" indent="-285750">
+              <a:buFont typeface="Arial" panose="020B0604020202020204" pitchFamily="34" charset="0"/>
+              <a:buChar char="•"/>
+            </a:pPr>
+            <a:r>
+              <a:rPr lang="es-ES" dirty="0" err="1">
+                <a:solidFill>
+                  <a:schemeClr val="bg1"/>
+                </a:solidFill>
+              </a:rPr>
+              <a:t>damejugadoresConFiltros</a:t>
+            </a:r>
+            <a:r>
+              <a:rPr lang="es-ES" dirty="0">
+                <a:solidFill>
+                  <a:schemeClr val="bg1"/>
+                </a:solidFill>
+              </a:rPr>
+              <a:t>.</a:t>
+            </a:r>
+          </a:p>
+          <a:p>
+            <a:pPr marL="742950" lvl="1" indent="-285750">
+              <a:buFont typeface="Arial" panose="020B0604020202020204" pitchFamily="34" charset="0"/>
+              <a:buChar char="•"/>
+            </a:pPr>
+            <a:r>
+              <a:rPr lang="es-ES" dirty="0" err="1">
+                <a:solidFill>
+                  <a:schemeClr val="bg1"/>
+                </a:solidFill>
+              </a:rPr>
+              <a:t>dameJugadoresAleatorios</a:t>
+            </a:r>
+            <a:r>
+              <a:rPr lang="es-ES" dirty="0">
+                <a:solidFill>
+                  <a:schemeClr val="bg1"/>
+                </a:solidFill>
+              </a:rPr>
+              <a:t>.</a:t>
+            </a:r>
+          </a:p>
+          <a:p>
+            <a:pPr marL="742950" lvl="1" indent="-285750">
+              <a:buFont typeface="Arial" panose="020B0604020202020204" pitchFamily="34" charset="0"/>
+              <a:buChar char="•"/>
+            </a:pPr>
+            <a:endParaRPr lang="es-ES" dirty="0"/>
+          </a:p>
+        </p:txBody>
+      </p:sp>
+      <p:sp>
+        <p:nvSpPr>
+          <p:cNvPr id="7" name="CuadroTexto 6">
+            <a:extLst>
+              <a:ext uri="{FF2B5EF4-FFF2-40B4-BE49-F238E27FC236}">
+                <a16:creationId xmlns:a16="http://schemas.microsoft.com/office/drawing/2014/main" id="{57AC9110-DA27-9F44-A859-1750D7A7A53F}"/>
+              </a:ext>
+            </a:extLst>
+          </p:cNvPr>
+          <p:cNvSpPr txBox="1"/>
+          <p:nvPr/>
+        </p:nvSpPr>
+        <p:spPr>
+          <a:xfrm>
+            <a:off x="4109013" y="1551008"/>
+            <a:ext cx="2986268" cy="1477328"/>
+          </a:xfrm>
+          <a:prstGeom prst="rect">
+            <a:avLst/>
+          </a:prstGeom>
+          <a:noFill/>
+        </p:spPr>
+        <p:txBody>
+          <a:bodyPr wrap="square" rtlCol="0">
+            <a:spAutoFit/>
+          </a:bodyPr>
+          <a:lstStyle/>
+          <a:p>
+            <a:pPr marL="285750" indent="-285750">
+              <a:buFont typeface="Arial" panose="020B0604020202020204" pitchFamily="34" charset="0"/>
+              <a:buChar char="•"/>
+            </a:pPr>
+            <a:r>
+              <a:rPr lang="es-ES" dirty="0">
+                <a:solidFill>
+                  <a:schemeClr val="bg1"/>
+                </a:solidFill>
+              </a:rPr>
+              <a:t>Frontend:</a:t>
+            </a:r>
+          </a:p>
+          <a:p>
+            <a:pPr marL="742950" lvl="1" indent="-285750">
+              <a:buFont typeface="Arial" panose="020B0604020202020204" pitchFamily="34" charset="0"/>
+              <a:buChar char="•"/>
+            </a:pPr>
+            <a:r>
+              <a:rPr lang="es-ES" dirty="0">
+                <a:solidFill>
+                  <a:schemeClr val="bg1"/>
+                </a:solidFill>
+              </a:rPr>
+              <a:t>Jugadores Aleatorios.</a:t>
+            </a:r>
+          </a:p>
+          <a:p>
+            <a:pPr marL="742950" lvl="1" indent="-285750">
+              <a:buFont typeface="Arial" panose="020B0604020202020204" pitchFamily="34" charset="0"/>
+              <a:buChar char="•"/>
+            </a:pPr>
+            <a:r>
+              <a:rPr lang="es-ES" dirty="0">
+                <a:solidFill>
+                  <a:schemeClr val="bg1"/>
+                </a:solidFill>
+              </a:rPr>
+              <a:t>Jugadores con filtros.</a:t>
+            </a:r>
+          </a:p>
+          <a:p>
+            <a:pPr marL="742950" lvl="1" indent="-285750">
+              <a:buFont typeface="Arial" panose="020B0604020202020204" pitchFamily="34" charset="0"/>
+              <a:buChar char="•"/>
+            </a:pPr>
+            <a:r>
+              <a:rPr lang="es-ES" dirty="0">
+                <a:solidFill>
+                  <a:schemeClr val="bg1"/>
+                </a:solidFill>
+              </a:rPr>
+              <a:t>Mejores promesas.</a:t>
+            </a:r>
+          </a:p>
+          <a:p>
+            <a:pPr marL="742950" lvl="1" indent="-285750">
+              <a:buFont typeface="Arial" panose="020B0604020202020204" pitchFamily="34" charset="0"/>
+              <a:buChar char="•"/>
+            </a:pPr>
+            <a:r>
+              <a:rPr lang="es-ES" dirty="0">
+                <a:solidFill>
+                  <a:schemeClr val="bg1"/>
+                </a:solidFill>
+              </a:rPr>
+              <a:t>Mejores jugadores</a:t>
+            </a:r>
+          </a:p>
+        </p:txBody>
+      </p:sp>
+    </p:spTree>
+    <p:extLst>
+      <p:ext uri="{BB962C8B-B14F-4D97-AF65-F5344CB8AC3E}">
+        <p14:creationId xmlns:p14="http://schemas.microsoft.com/office/powerpoint/2010/main" val="2456029097"/>
+      </p:ext>
+    </p:extLst>
+  </p:cSld>
+  <p:clrMapOvr>
+    <a:masterClrMapping/>
+  </p:clrMapOvr>
+</p:sld>
+</file>
+
+<file path=ppt/slides/slide6.xml><?xml version="1.0" encoding="utf-8"?>
+<p:sld xmlns:a="http://schemas.openxmlformats.org/drawingml/2006/main" xmlns:r="http://schemas.openxmlformats.org/officeDocument/2006/relationships" xmlns:p="http://schemas.openxmlformats.org/presentationml/2006/main">
+  <p:cSld>
+    <p:spTree>
+      <p:nvGrpSpPr>
+        <p:cNvPr id="1" name=""/>
+        <p:cNvGrpSpPr/>
+        <p:nvPr/>
+      </p:nvGrpSpPr>
+      <p:grpSpPr>
+        <a:xfrm>
+          <a:off x="0" y="0"/>
+          <a:ext cx="0" cy="0"/>
+          <a:chOff x="0" y="0"/>
+          <a:chExt cx="0" cy="0"/>
+        </a:xfrm>
+      </p:grpSpPr>
+      <p:sp>
+        <p:nvSpPr>
+          <p:cNvPr id="2" name="Título 1">
+            <a:extLst>
+              <a:ext uri="{FF2B5EF4-FFF2-40B4-BE49-F238E27FC236}">
+                <a16:creationId xmlns:a16="http://schemas.microsoft.com/office/drawing/2014/main" id="{3FEAAC3A-2AD0-B848-AEC8-2F4765DF046C}"/>
+              </a:ext>
+            </a:extLst>
+          </p:cNvPr>
+          <p:cNvSpPr>
+            <a:spLocks noGrp="1"/>
+          </p:cNvSpPr>
+          <p:nvPr>
+            <p:ph type="title"/>
+          </p:nvPr>
+        </p:nvSpPr>
+        <p:spPr/>
+        <p:txBody>
+          <a:bodyPr/>
+          <a:lstStyle/>
+          <a:p>
+            <a:r>
+              <a:rPr lang="es-ES" dirty="0">
+                <a:solidFill>
+                  <a:schemeClr val="bg1"/>
+                </a:solidFill>
+              </a:rPr>
+              <a:t>DAFO</a:t>
+            </a:r>
+          </a:p>
+        </p:txBody>
+      </p:sp>
+      <p:graphicFrame>
+        <p:nvGraphicFramePr>
+          <p:cNvPr id="4" name="Marcador de contenido 3">
+            <a:extLst>
+              <a:ext uri="{FF2B5EF4-FFF2-40B4-BE49-F238E27FC236}">
+                <a16:creationId xmlns:a16="http://schemas.microsoft.com/office/drawing/2014/main" id="{C776578B-3B61-494C-8764-7DE2D64823FC}"/>
+              </a:ext>
+            </a:extLst>
+          </p:cNvPr>
+          <p:cNvGraphicFramePr>
+            <a:graphicFrameLocks noGrp="1"/>
+          </p:cNvGraphicFramePr>
+          <p:nvPr>
+            <p:ph idx="1"/>
+            <p:extLst>
+              <p:ext uri="{D42A27DB-BD31-4B8C-83A1-F6EECF244321}">
+                <p14:modId xmlns:p14="http://schemas.microsoft.com/office/powerpoint/2010/main" val="2251559491"/>
+              </p:ext>
+            </p:extLst>
+          </p:nvPr>
+        </p:nvGraphicFramePr>
+        <p:xfrm>
+          <a:off x="2372810" y="1481559"/>
+          <a:ext cx="6875362" cy="5011315"/>
+        </p:xfrm>
+        <a:graphic>
+          <a:graphicData uri="http://schemas.openxmlformats.org/drawingml/2006/diagram">
+            <dgm:relIds xmlns:dgm="http://schemas.openxmlformats.org/drawingml/2006/diagram" xmlns:r="http://schemas.openxmlformats.org/officeDocument/2006/relationships" r:dm="rId2" r:lo="rId3" r:qs="rId4" r:cs="rId5"/>
+          </a:graphicData>
+        </a:graphic>
+      </p:graphicFrame>
+    </p:spTree>
+    <p:extLst>
+      <p:ext uri="{BB962C8B-B14F-4D97-AF65-F5344CB8AC3E}">
+        <p14:creationId xmlns:p14="http://schemas.microsoft.com/office/powerpoint/2010/main" val="2817294124"/>
+      </p:ext>
+    </p:extLst>
+  </p:cSld>
+  <p:clrMapOvr>
+    <a:masterClrMapping/>
+  </p:clrMapOvr>
+</p:sld>
+</file>
+
+<file path=ppt/slides/slide7.xml><?xml version="1.0" encoding="utf-8"?>
 <p:sld xmlns:a="http://schemas.openxmlformats.org/drawingml/2006/main" xmlns:r="http://schemas.openxmlformats.org/officeDocument/2006/relationships" xmlns:p="http://schemas.openxmlformats.org/presentationml/2006/main">
   <p:cSld>
     <p:spTree>

</xml_diff>

<commit_message>
Terminada una primera version, falta pasarlo a pdf
</commit_message>
<xml_diff>
--- a/Presentacion FutbolFichajes.pptx
+++ b/Presentacion FutbolFichajes.pptx
@@ -11,7 +11,8 @@
     <p:sldId id="259" r:id="rId5"/>
     <p:sldId id="261" r:id="rId6"/>
     <p:sldId id="262" r:id="rId7"/>
-    <p:sldId id="260" r:id="rId8"/>
+    <p:sldId id="263" r:id="rId8"/>
+    <p:sldId id="260" r:id="rId9"/>
   </p:sldIdLst>
   <p:sldSz cx="12192000" cy="6858000"/>
   <p:notesSz cx="6858000" cy="9144000"/>
@@ -2865,7 +2866,7 @@
           <a:p>
             <a:fld id="{AF2B4D62-3BA8-E643-8809-D7017F5BF04E}" type="datetimeFigureOut">
               <a:rPr lang="es-ES" smtClean="0"/>
-              <a:t>5/12/20</a:t>
+              <a:t>6/12/20</a:t>
             </a:fld>
             <a:endParaRPr lang="es-ES"/>
           </a:p>
@@ -3063,7 +3064,7 @@
           <a:p>
             <a:fld id="{AF2B4D62-3BA8-E643-8809-D7017F5BF04E}" type="datetimeFigureOut">
               <a:rPr lang="es-ES" smtClean="0"/>
-              <a:t>5/12/20</a:t>
+              <a:t>6/12/20</a:t>
             </a:fld>
             <a:endParaRPr lang="es-ES"/>
           </a:p>
@@ -3271,7 +3272,7 @@
           <a:p>
             <a:fld id="{AF2B4D62-3BA8-E643-8809-D7017F5BF04E}" type="datetimeFigureOut">
               <a:rPr lang="es-ES" smtClean="0"/>
-              <a:t>5/12/20</a:t>
+              <a:t>6/12/20</a:t>
             </a:fld>
             <a:endParaRPr lang="es-ES"/>
           </a:p>
@@ -3469,7 +3470,7 @@
           <a:p>
             <a:fld id="{AF2B4D62-3BA8-E643-8809-D7017F5BF04E}" type="datetimeFigureOut">
               <a:rPr lang="es-ES" smtClean="0"/>
-              <a:t>5/12/20</a:t>
+              <a:t>6/12/20</a:t>
             </a:fld>
             <a:endParaRPr lang="es-ES"/>
           </a:p>
@@ -3744,7 +3745,7 @@
           <a:p>
             <a:fld id="{AF2B4D62-3BA8-E643-8809-D7017F5BF04E}" type="datetimeFigureOut">
               <a:rPr lang="es-ES" smtClean="0"/>
-              <a:t>5/12/20</a:t>
+              <a:t>6/12/20</a:t>
             </a:fld>
             <a:endParaRPr lang="es-ES"/>
           </a:p>
@@ -4009,7 +4010,7 @@
           <a:p>
             <a:fld id="{AF2B4D62-3BA8-E643-8809-D7017F5BF04E}" type="datetimeFigureOut">
               <a:rPr lang="es-ES" smtClean="0"/>
-              <a:t>5/12/20</a:t>
+              <a:t>6/12/20</a:t>
             </a:fld>
             <a:endParaRPr lang="es-ES"/>
           </a:p>
@@ -4421,7 +4422,7 @@
           <a:p>
             <a:fld id="{AF2B4D62-3BA8-E643-8809-D7017F5BF04E}" type="datetimeFigureOut">
               <a:rPr lang="es-ES" smtClean="0"/>
-              <a:t>5/12/20</a:t>
+              <a:t>6/12/20</a:t>
             </a:fld>
             <a:endParaRPr lang="es-ES"/>
           </a:p>
@@ -4562,7 +4563,7 @@
           <a:p>
             <a:fld id="{AF2B4D62-3BA8-E643-8809-D7017F5BF04E}" type="datetimeFigureOut">
               <a:rPr lang="es-ES" smtClean="0"/>
-              <a:t>5/12/20</a:t>
+              <a:t>6/12/20</a:t>
             </a:fld>
             <a:endParaRPr lang="es-ES"/>
           </a:p>
@@ -4675,7 +4676,7 @@
           <a:p>
             <a:fld id="{AF2B4D62-3BA8-E643-8809-D7017F5BF04E}" type="datetimeFigureOut">
               <a:rPr lang="es-ES" smtClean="0"/>
-              <a:t>5/12/20</a:t>
+              <a:t>6/12/20</a:t>
             </a:fld>
             <a:endParaRPr lang="es-ES"/>
           </a:p>
@@ -4986,7 +4987,7 @@
           <a:p>
             <a:fld id="{AF2B4D62-3BA8-E643-8809-D7017F5BF04E}" type="datetimeFigureOut">
               <a:rPr lang="es-ES" smtClean="0"/>
-              <a:t>5/12/20</a:t>
+              <a:t>6/12/20</a:t>
             </a:fld>
             <a:endParaRPr lang="es-ES"/>
           </a:p>
@@ -5277,7 +5278,7 @@
           <a:p>
             <a:fld id="{AF2B4D62-3BA8-E643-8809-D7017F5BF04E}" type="datetimeFigureOut">
               <a:rPr lang="es-ES" smtClean="0"/>
-              <a:t>5/12/20</a:t>
+              <a:t>6/12/20</a:t>
             </a:fld>
             <a:endParaRPr lang="es-ES"/>
           </a:p>
@@ -5527,7 +5528,7 @@
           <a:p>
             <a:fld id="{AF2B4D62-3BA8-E643-8809-D7017F5BF04E}" type="datetimeFigureOut">
               <a:rPr lang="es-ES" smtClean="0"/>
-              <a:t>5/12/20</a:t>
+              <a:t>6/12/20</a:t>
             </a:fld>
             <a:endParaRPr lang="es-ES"/>
           </a:p>
@@ -7578,6 +7579,160 @@
           <p:cNvPr id="2" name="Título 1">
             <a:extLst>
               <a:ext uri="{FF2B5EF4-FFF2-40B4-BE49-F238E27FC236}">
+                <a16:creationId xmlns:a16="http://schemas.microsoft.com/office/drawing/2014/main" id="{B468E06D-D14B-CB4A-9448-F21416E1A551}"/>
+              </a:ext>
+            </a:extLst>
+          </p:cNvPr>
+          <p:cNvSpPr>
+            <a:spLocks noGrp="1"/>
+          </p:cNvSpPr>
+          <p:nvPr>
+            <p:ph type="title"/>
+          </p:nvPr>
+        </p:nvSpPr>
+        <p:spPr/>
+        <p:txBody>
+          <a:bodyPr/>
+          <a:lstStyle/>
+          <a:p>
+            <a:r>
+              <a:rPr lang="es-ES" dirty="0">
+                <a:solidFill>
+                  <a:schemeClr val="bg1"/>
+                </a:solidFill>
+              </a:rPr>
+              <a:t>Líneas de futuro</a:t>
+            </a:r>
+          </a:p>
+        </p:txBody>
+      </p:sp>
+      <p:sp>
+        <p:nvSpPr>
+          <p:cNvPr id="3" name="Marcador de contenido 2">
+            <a:extLst>
+              <a:ext uri="{FF2B5EF4-FFF2-40B4-BE49-F238E27FC236}">
+                <a16:creationId xmlns:a16="http://schemas.microsoft.com/office/drawing/2014/main" id="{E5031219-1D88-2948-AE54-547AD6B011E2}"/>
+              </a:ext>
+            </a:extLst>
+          </p:cNvPr>
+          <p:cNvSpPr>
+            <a:spLocks noGrp="1"/>
+          </p:cNvSpPr>
+          <p:nvPr>
+            <p:ph idx="1"/>
+          </p:nvPr>
+        </p:nvSpPr>
+        <p:spPr>
+          <a:xfrm>
+            <a:off x="838200" y="1825625"/>
+            <a:ext cx="4300959" cy="2457008"/>
+          </a:xfrm>
+        </p:spPr>
+        <p:txBody>
+          <a:bodyPr>
+            <a:normAutofit fontScale="92500" lnSpcReduction="10000"/>
+          </a:bodyPr>
+          <a:lstStyle/>
+          <a:p>
+            <a:r>
+              <a:rPr lang="es-ES" dirty="0">
+                <a:solidFill>
+                  <a:schemeClr val="bg1"/>
+                </a:solidFill>
+              </a:rPr>
+              <a:t>Aplicación mejorada con mas parámetros de búsqueda.</a:t>
+            </a:r>
+          </a:p>
+          <a:p>
+            <a:r>
+              <a:rPr lang="es-ES" dirty="0">
+                <a:solidFill>
+                  <a:schemeClr val="bg1"/>
+                </a:solidFill>
+              </a:rPr>
+              <a:t>Mas herramientas tecnologías en el mundo del futbol usando inteligencia artificial.</a:t>
+            </a:r>
+          </a:p>
+        </p:txBody>
+      </p:sp>
+      <p:sp>
+        <p:nvSpPr>
+          <p:cNvPr id="5" name="CuadroTexto 4">
+            <a:extLst>
+              <a:ext uri="{FF2B5EF4-FFF2-40B4-BE49-F238E27FC236}">
+                <a16:creationId xmlns:a16="http://schemas.microsoft.com/office/drawing/2014/main" id="{E005F712-DD03-544D-BFCB-AA9BE57209C0}"/>
+              </a:ext>
+            </a:extLst>
+          </p:cNvPr>
+          <p:cNvSpPr txBox="1"/>
+          <p:nvPr/>
+        </p:nvSpPr>
+        <p:spPr>
+          <a:xfrm>
+            <a:off x="6632294" y="4016415"/>
+            <a:ext cx="4826643" cy="1692771"/>
+          </a:xfrm>
+          <a:prstGeom prst="rect">
+            <a:avLst/>
+          </a:prstGeom>
+          <a:noFill/>
+        </p:spPr>
+        <p:txBody>
+          <a:bodyPr wrap="square" rtlCol="0">
+            <a:spAutoFit/>
+          </a:bodyPr>
+          <a:lstStyle/>
+          <a:p>
+            <a:pPr marL="285750" indent="-285750">
+              <a:buFont typeface="Arial" panose="020B0604020202020204" pitchFamily="34" charset="0"/>
+              <a:buChar char="•"/>
+            </a:pPr>
+            <a:r>
+              <a:rPr lang="es-ES" sz="2600" dirty="0">
+                <a:solidFill>
+                  <a:schemeClr val="bg1"/>
+                </a:solidFill>
+              </a:rPr>
+              <a:t>Herramientas que permita que equipos mas humildes compitan, cara a cara, con los grandes.</a:t>
+            </a:r>
+          </a:p>
+        </p:txBody>
+      </p:sp>
+    </p:spTree>
+    <p:extLst>
+      <p:ext uri="{BB962C8B-B14F-4D97-AF65-F5344CB8AC3E}">
+        <p14:creationId xmlns:p14="http://schemas.microsoft.com/office/powerpoint/2010/main" val="4147768173"/>
+      </p:ext>
+    </p:extLst>
+  </p:cSld>
+  <p:clrMapOvr>
+    <a:masterClrMapping/>
+  </p:clrMapOvr>
+</p:sld>
+</file>
+
+<file path=ppt/slides/slide8.xml><?xml version="1.0" encoding="utf-8"?>
+<p:sld xmlns:a="http://schemas.openxmlformats.org/drawingml/2006/main" xmlns:r="http://schemas.openxmlformats.org/officeDocument/2006/relationships" xmlns:p="http://schemas.openxmlformats.org/presentationml/2006/main">
+  <p:cSld>
+    <p:spTree>
+      <p:nvGrpSpPr>
+        <p:cNvPr id="1" name=""/>
+        <p:cNvGrpSpPr/>
+        <p:nvPr/>
+      </p:nvGrpSpPr>
+      <p:grpSpPr>
+        <a:xfrm>
+          <a:off x="0" y="0"/>
+          <a:ext cx="0" cy="0"/>
+          <a:chOff x="0" y="0"/>
+          <a:chExt cx="0" cy="0"/>
+        </a:xfrm>
+      </p:grpSpPr>
+      <p:sp>
+        <p:nvSpPr>
+          <p:cNvPr id="2" name="Título 1">
+            <a:extLst>
+              <a:ext uri="{FF2B5EF4-FFF2-40B4-BE49-F238E27FC236}">
                 <a16:creationId xmlns:a16="http://schemas.microsoft.com/office/drawing/2014/main" id="{0D42CE9B-B2EE-3143-9D39-C292A2AF032B}"/>
               </a:ext>
             </a:extLst>

</xml_diff>

<commit_message>
Cambiado el fondo de presentacion
</commit_message>
<xml_diff>
--- a/Presentacion FutbolFichajes.pptx
+++ b/Presentacion FutbolFichajes.pptx
@@ -1052,7 +1052,11 @@
     </dgm:pt>
     <dgm:pt modelId="{5CAAD280-FD73-D244-8AC7-5022BAEEB153}" type="pres">
       <dgm:prSet presAssocID="{C40D42B4-8E68-1749-94C1-3AE0268D09ED}" presName="axisShape" presStyleLbl="bgShp" presStyleIdx="0" presStyleCnt="1"/>
-      <dgm:spPr/>
+      <dgm:spPr>
+        <a:solidFill>
+          <a:srgbClr val="002060"/>
+        </a:solidFill>
+      </dgm:spPr>
     </dgm:pt>
     <dgm:pt modelId="{18333134-1D54-5449-B025-D5DB3F527DC1}" type="pres">
       <dgm:prSet presAssocID="{C40D42B4-8E68-1749-94C1-3AE0268D09ED}" presName="rect1" presStyleLbl="node1" presStyleIdx="0" presStyleCnt="4">
@@ -1147,13 +1151,7 @@
           </a:avLst>
         </a:prstGeom>
         <a:solidFill>
-          <a:schemeClr val="accent1">
-            <a:tint val="40000"/>
-            <a:hueOff val="0"/>
-            <a:satOff val="0"/>
-            <a:lumOff val="0"/>
-            <a:alphaOff val="0"/>
-          </a:schemeClr>
+          <a:srgbClr val="002060"/>
         </a:solidFill>
         <a:ln>
           <a:noFill/>
@@ -5362,7 +5360,7 @@
           </a:blip>
           <a:srcRect/>
           <a:stretch>
-            <a:fillRect t="-7000" b="-18000"/>
+            <a:fillRect/>
           </a:stretch>
         </a:blipFill>
         <a:effectLst/>
@@ -5976,14 +5974,14 @@
             <a:r>
               <a:rPr lang="es-ES" dirty="0" err="1">
                 <a:solidFill>
-                  <a:schemeClr val="bg1"/>
+                  <a:srgbClr val="002060"/>
                 </a:solidFill>
               </a:rPr>
               <a:t>FutbolFichajes</a:t>
             </a:r>
             <a:endParaRPr lang="es-ES" dirty="0">
               <a:solidFill>
-                <a:schemeClr val="bg1"/>
+                <a:srgbClr val="002060"/>
               </a:solidFill>
             </a:endParaRPr>
           </a:p>
@@ -6020,7 +6018,7 @@
             <a:r>
               <a:rPr lang="es-ES" dirty="0">
                 <a:solidFill>
-                  <a:schemeClr val="bg1"/>
+                  <a:srgbClr val="002060"/>
                 </a:solidFill>
               </a:rPr>
               <a:t>Aitor Del Río Ferreras</a:t>
@@ -6030,7 +6028,7 @@
             <a:r>
               <a:rPr lang="es-ES" dirty="0">
                 <a:solidFill>
-                  <a:schemeClr val="bg1"/>
+                  <a:srgbClr val="002060"/>
                 </a:solidFill>
               </a:rPr>
               <a:t>SISTEMAS DE INFORMACIÓN DE GESTION Y BUSINESS INTELLIGENGE</a:t>
@@ -6040,7 +6038,7 @@
             <a:r>
               <a:rPr lang="es-ES" dirty="0">
                 <a:solidFill>
-                  <a:schemeClr val="bg1"/>
+                  <a:srgbClr val="002060"/>
                 </a:solidFill>
               </a:rPr>
               <a:t>4º Ingeniería Informática</a:t>
@@ -6102,7 +6100,7 @@
             <a:r>
               <a:rPr lang="es-ES" dirty="0">
                 <a:solidFill>
-                  <a:schemeClr val="bg1"/>
+                  <a:srgbClr val="002060"/>
                 </a:solidFill>
               </a:rPr>
               <a:t>Índice</a:t>
@@ -6126,7 +6124,12 @@
             <p:ph idx="1"/>
           </p:nvPr>
         </p:nvSpPr>
-        <p:spPr/>
+        <p:spPr>
+          <a:xfrm>
+            <a:off x="838200" y="1825625"/>
+            <a:ext cx="10515600" cy="3843655"/>
+          </a:xfrm>
+        </p:spPr>
         <p:txBody>
           <a:bodyPr/>
           <a:lstStyle/>
@@ -6138,7 +6141,7 @@
             <a:r>
               <a:rPr lang="es-ES" dirty="0">
                 <a:solidFill>
-                  <a:schemeClr val="bg1"/>
+                  <a:srgbClr val="002060"/>
                 </a:solidFill>
               </a:rPr>
               <a:t>Descripción del problema.</a:t>
@@ -6152,7 +6155,7 @@
             <a:r>
               <a:rPr lang="es-ES" dirty="0">
                 <a:solidFill>
-                  <a:schemeClr val="bg1"/>
+                  <a:srgbClr val="002060"/>
                 </a:solidFill>
               </a:rPr>
               <a:t>Herramientas utilizadas.</a:t>
@@ -6166,7 +6169,7 @@
             <a:r>
               <a:rPr lang="es-ES" dirty="0">
                 <a:solidFill>
-                  <a:schemeClr val="bg1"/>
+                  <a:srgbClr val="002060"/>
                 </a:solidFill>
               </a:rPr>
               <a:t>Composición de la aplicación.</a:t>
@@ -6180,7 +6183,7 @@
             <a:r>
               <a:rPr lang="es-ES" dirty="0">
                 <a:solidFill>
-                  <a:schemeClr val="bg1"/>
+                  <a:srgbClr val="002060"/>
                 </a:solidFill>
               </a:rPr>
               <a:t>Análisis de resultados.</a:t>
@@ -6194,7 +6197,7 @@
             <a:r>
               <a:rPr lang="es-ES" dirty="0">
                 <a:solidFill>
-                  <a:schemeClr val="bg1"/>
+                  <a:srgbClr val="002060"/>
                 </a:solidFill>
               </a:rPr>
               <a:t>DAFO.</a:t>
@@ -6208,7 +6211,7 @@
             <a:r>
               <a:rPr lang="es-ES" dirty="0">
                 <a:solidFill>
-                  <a:schemeClr val="bg1"/>
+                  <a:srgbClr val="002060"/>
                 </a:solidFill>
               </a:rPr>
               <a:t>Líneas de futuro.</a:t>
@@ -6222,24 +6225,10 @@
             <a:r>
               <a:rPr lang="es-ES" dirty="0">
                 <a:solidFill>
-                  <a:schemeClr val="bg1"/>
+                  <a:srgbClr val="002060"/>
                 </a:solidFill>
               </a:rPr>
               <a:t>Lecciones aprendidas.</a:t>
-            </a:r>
-          </a:p>
-          <a:p>
-            <a:pPr marL="514350" indent="-514350">
-              <a:buFont typeface="+mj-lt"/>
-              <a:buAutoNum type="arabicPeriod"/>
-            </a:pPr>
-            <a:r>
-              <a:rPr lang="es-ES" dirty="0">
-                <a:solidFill>
-                  <a:schemeClr val="bg1"/>
-                </a:solidFill>
-              </a:rPr>
-              <a:t>Bibliografía.</a:t>
             </a:r>
           </a:p>
         </p:txBody>
@@ -6298,7 +6287,7 @@
             <a:r>
               <a:rPr lang="es-ES" dirty="0">
                 <a:solidFill>
-                  <a:schemeClr val="bg1"/>
+                  <a:srgbClr val="002060"/>
                 </a:solidFill>
               </a:rPr>
               <a:t>Descripción del problema</a:t>
@@ -6335,7 +6324,7 @@
             <a:r>
               <a:rPr lang="es-ES" dirty="0">
                 <a:solidFill>
-                  <a:schemeClr val="bg1"/>
+                  <a:srgbClr val="002060"/>
                 </a:solidFill>
               </a:rPr>
               <a:t>Crisis por la pandemia:</a:t>
@@ -6346,7 +6335,7 @@
             <a:r>
               <a:rPr lang="es-ES" dirty="0">
                 <a:solidFill>
-                  <a:schemeClr val="bg1"/>
+                  <a:srgbClr val="002060"/>
                 </a:solidFill>
               </a:rPr>
               <a:t>Problemas socio-sanitarios.</a:t>
@@ -6357,7 +6346,7 @@
             <a:r>
               <a:rPr lang="es-ES" dirty="0">
                 <a:solidFill>
-                  <a:schemeClr val="bg1"/>
+                  <a:srgbClr val="002060"/>
                 </a:solidFill>
               </a:rPr>
               <a:t>Problemas económicos:</a:t>
@@ -6368,7 +6357,7 @@
             <a:r>
               <a:rPr lang="es-ES" dirty="0">
                 <a:solidFill>
-                  <a:schemeClr val="bg1"/>
+                  <a:srgbClr val="002060"/>
                 </a:solidFill>
               </a:rPr>
               <a:t>Salarios mas bajos.</a:t>
@@ -6379,14 +6368,10 @@
             <a:r>
               <a:rPr lang="es-ES" dirty="0">
                 <a:solidFill>
-                  <a:schemeClr val="bg1"/>
-                </a:solidFill>
-              </a:rPr>
-              <a:t>Economías desbordadas</a:t>
-            </a:r>
-            <a:r>
-              <a:rPr lang="es-ES" dirty="0"/>
-              <a:t>.</a:t>
+                  <a:srgbClr val="002060"/>
+                </a:solidFill>
+              </a:rPr>
+              <a:t>Economías desbordadas.</a:t>
             </a:r>
           </a:p>
           <a:p>
@@ -6438,7 +6423,7 @@
             <a:r>
               <a:rPr lang="es-ES" sz="2800" dirty="0">
                 <a:solidFill>
-                  <a:schemeClr val="bg1"/>
+                  <a:srgbClr val="002060"/>
                 </a:solidFill>
               </a:rPr>
               <a:t>Crisis en el mundo del futbol:</a:t>
@@ -6452,7 +6437,7 @@
             <a:r>
               <a:rPr lang="es-ES" sz="2400" dirty="0">
                 <a:solidFill>
-                  <a:schemeClr val="bg1"/>
+                  <a:srgbClr val="002060"/>
                 </a:solidFill>
               </a:rPr>
               <a:t>Descenso de ingresos</a:t>
@@ -6466,7 +6451,7 @@
             <a:r>
               <a:rPr lang="es-ES" sz="2400" dirty="0">
                 <a:solidFill>
-                  <a:schemeClr val="bg1"/>
+                  <a:srgbClr val="002060"/>
                 </a:solidFill>
               </a:rPr>
               <a:t>Reducción de salarios para cuadrar cuentas</a:t>
@@ -6554,7 +6539,7 @@
             <a:r>
               <a:rPr lang="es-ES" sz="2400" dirty="0">
                 <a:solidFill>
-                  <a:schemeClr val="bg1"/>
+                  <a:srgbClr val="002060"/>
                 </a:solidFill>
               </a:rPr>
               <a:t>Necesidad de rentabilizar el dinero disponible </a:t>
@@ -6616,7 +6601,7 @@
             <a:r>
               <a:rPr lang="es-ES" dirty="0">
                 <a:solidFill>
-                  <a:schemeClr val="bg1"/>
+                  <a:srgbClr val="002060"/>
                 </a:solidFill>
               </a:rPr>
               <a:t>Herramientas utilizadas</a:t>
@@ -6643,19 +6628,19 @@
         <p:spPr>
           <a:xfrm>
             <a:off x="838200" y="1466851"/>
-            <a:ext cx="10515600" cy="1500483"/>
+            <a:ext cx="10515600" cy="2266949"/>
           </a:xfrm>
         </p:spPr>
         <p:txBody>
           <a:bodyPr>
-            <a:normAutofit fontScale="70000" lnSpcReduction="20000"/>
+            <a:normAutofit/>
           </a:bodyPr>
           <a:lstStyle/>
           <a:p>
             <a:r>
-              <a:rPr lang="es-ES" dirty="0">
-                <a:solidFill>
-                  <a:schemeClr val="bg1"/>
+              <a:rPr lang="es-ES" sz="3200" dirty="0">
+                <a:solidFill>
+                  <a:srgbClr val="002060"/>
                 </a:solidFill>
               </a:rPr>
               <a:t>Neo4j: Sistema gestor de bases de datos de grafos.</a:t>
@@ -6664,9 +6649,9 @@
           <a:p>
             <a:pPr lvl="1"/>
             <a:r>
-              <a:rPr lang="es-ES" dirty="0">
-                <a:solidFill>
-                  <a:schemeClr val="bg1"/>
+              <a:rPr lang="es-ES" sz="2000" dirty="0">
+                <a:solidFill>
+                  <a:srgbClr val="002060"/>
                 </a:solidFill>
               </a:rPr>
               <a:t>Compuesto por nodos y relaciones</a:t>
@@ -6675,87 +6660,87 @@
           <a:p>
             <a:pPr lvl="1"/>
             <a:r>
-              <a:rPr lang="es-ES" dirty="0">
-                <a:solidFill>
-                  <a:schemeClr val="bg1"/>
+              <a:rPr lang="es-ES" sz="2000" dirty="0">
+                <a:solidFill>
+                  <a:srgbClr val="002060"/>
                 </a:solidFill>
               </a:rPr>
               <a:t>Archivo </a:t>
             </a:r>
             <a:r>
-              <a:rPr lang="es-ES" dirty="0" err="1">
-                <a:solidFill>
-                  <a:schemeClr val="bg1"/>
+              <a:rPr lang="es-ES" sz="2000" dirty="0" err="1">
+                <a:solidFill>
+                  <a:srgbClr val="002060"/>
                 </a:solidFill>
               </a:rPr>
               <a:t>csv</a:t>
             </a:r>
             <a:r>
-              <a:rPr lang="es-ES" dirty="0">
-                <a:solidFill>
-                  <a:schemeClr val="bg1"/>
+              <a:rPr lang="es-ES" sz="2000" dirty="0">
+                <a:solidFill>
+                  <a:srgbClr val="002060"/>
                 </a:solidFill>
               </a:rPr>
               <a:t> de </a:t>
             </a:r>
             <a:r>
-              <a:rPr lang="es-ES" dirty="0" err="1">
-                <a:solidFill>
-                  <a:schemeClr val="bg1"/>
+              <a:rPr lang="es-ES" sz="2000" dirty="0" err="1">
+                <a:solidFill>
+                  <a:srgbClr val="002060"/>
                 </a:solidFill>
               </a:rPr>
               <a:t>Kaggle</a:t>
             </a:r>
-            <a:endParaRPr lang="es-ES" dirty="0">
+            <a:endParaRPr lang="es-ES" sz="2000" dirty="0">
               <a:solidFill>
-                <a:schemeClr val="bg1"/>
+                <a:srgbClr val="002060"/>
               </a:solidFill>
             </a:endParaRPr>
           </a:p>
           <a:p>
             <a:pPr lvl="1"/>
             <a:r>
+              <a:rPr lang="es-ES" sz="2000" dirty="0">
+                <a:solidFill>
+                  <a:srgbClr val="002060"/>
+                </a:solidFill>
+              </a:rPr>
+              <a:t>Utiliza lenguaje </a:t>
+            </a:r>
+            <a:r>
+              <a:rPr lang="es-ES" sz="2000" dirty="0" err="1">
+                <a:solidFill>
+                  <a:srgbClr val="002060"/>
+                </a:solidFill>
+              </a:rPr>
+              <a:t>Cypher</a:t>
+            </a:r>
+            <a:r>
+              <a:rPr lang="es-ES" sz="2000" dirty="0">
+                <a:solidFill>
+                  <a:srgbClr val="002060"/>
+                </a:solidFill>
+              </a:rPr>
+              <a:t>:</a:t>
+            </a:r>
+          </a:p>
+          <a:p>
+            <a:pPr lvl="2"/>
+            <a:r>
               <a:rPr lang="es-ES" dirty="0">
                 <a:solidFill>
-                  <a:schemeClr val="bg1"/>
-                </a:solidFill>
-              </a:rPr>
-              <a:t>Utiliza lenguaje </a:t>
-            </a:r>
-            <a:r>
-              <a:rPr lang="es-ES" dirty="0" err="1">
-                <a:solidFill>
-                  <a:schemeClr val="bg1"/>
-                </a:solidFill>
-              </a:rPr>
-              <a:t>Cypher</a:t>
-            </a:r>
+                  <a:srgbClr val="002060"/>
+                </a:solidFill>
+              </a:rPr>
+              <a:t>Consultas sencillas con poco texto.</a:t>
+            </a:r>
+          </a:p>
+          <a:p>
+            <a:pPr lvl="2"/>
             <a:r>
               <a:rPr lang="es-ES" dirty="0">
                 <a:solidFill>
-                  <a:schemeClr val="bg1"/>
-                </a:solidFill>
-              </a:rPr>
-              <a:t>:</a:t>
-            </a:r>
-          </a:p>
-          <a:p>
-            <a:pPr lvl="2"/>
-            <a:r>
-              <a:rPr lang="es-ES" dirty="0">
-                <a:solidFill>
-                  <a:schemeClr val="bg1"/>
-                </a:solidFill>
-              </a:rPr>
-              <a:t>Consultas sencillas con poco texto.</a:t>
-            </a:r>
-          </a:p>
-          <a:p>
-            <a:pPr lvl="2"/>
-            <a:r>
-              <a:rPr lang="es-ES" dirty="0">
-                <a:solidFill>
-                  <a:schemeClr val="bg1"/>
+                  <a:srgbClr val="002060"/>
                 </a:solidFill>
               </a:rPr>
               <a:t>Lenguaje similar al lenguaje natural que permite mayor entendimiento.</a:t>
@@ -6777,8 +6762,8 @@
         </p:nvSpPr>
         <p:spPr>
           <a:xfrm>
-            <a:off x="838200" y="2967335"/>
-            <a:ext cx="8258175" cy="954107"/>
+            <a:off x="838200" y="5062281"/>
+            <a:ext cx="9342120" cy="1569660"/>
           </a:xfrm>
           <a:prstGeom prst="rect">
             <a:avLst/>
@@ -6796,33 +6781,33 @@
               <a:buChar char="•"/>
             </a:pPr>
             <a:r>
-              <a:rPr lang="es-ES" sz="2000" dirty="0" err="1">
-                <a:solidFill>
-                  <a:schemeClr val="bg1"/>
+              <a:rPr lang="es-ES" sz="2800" dirty="0" err="1">
+                <a:solidFill>
+                  <a:srgbClr val="002060"/>
                 </a:solidFill>
               </a:rPr>
               <a:t>Node</a:t>
             </a:r>
             <a:r>
-              <a:rPr lang="es-ES" sz="2000" dirty="0">
-                <a:solidFill>
-                  <a:schemeClr val="bg1"/>
+              <a:rPr lang="es-ES" sz="2800" dirty="0">
+                <a:solidFill>
+                  <a:srgbClr val="002060"/>
                 </a:solidFill>
               </a:rPr>
               <a:t> </a:t>
             </a:r>
             <a:r>
-              <a:rPr lang="es-ES" sz="2000" dirty="0" err="1">
-                <a:solidFill>
-                  <a:schemeClr val="bg1"/>
+              <a:rPr lang="es-ES" sz="2800" dirty="0" err="1">
+                <a:solidFill>
+                  <a:srgbClr val="002060"/>
                 </a:solidFill>
               </a:rPr>
               <a:t>Js</a:t>
             </a:r>
             <a:r>
-              <a:rPr lang="es-ES" sz="2000" dirty="0">
-                <a:solidFill>
-                  <a:schemeClr val="bg1"/>
+              <a:rPr lang="es-ES" sz="2800" dirty="0">
+                <a:solidFill>
+                  <a:srgbClr val="002060"/>
                 </a:solidFill>
               </a:rPr>
               <a:t>: entorno para desarrollar código de intercambio de datos:</a:t>
@@ -6834,25 +6819,25 @@
               <a:buChar char="•"/>
             </a:pPr>
             <a:r>
-              <a:rPr lang="es-ES" sz="1700" dirty="0">
-                <a:solidFill>
-                  <a:schemeClr val="bg1"/>
+              <a:rPr lang="es-ES" sz="2000" dirty="0">
+                <a:solidFill>
+                  <a:srgbClr val="002060"/>
                 </a:solidFill>
               </a:rPr>
               <a:t>Express </a:t>
             </a:r>
             <a:r>
-              <a:rPr lang="es-ES" sz="1700" dirty="0" err="1">
-                <a:solidFill>
-                  <a:schemeClr val="bg1"/>
+              <a:rPr lang="es-ES" sz="2000" dirty="0" err="1">
+                <a:solidFill>
+                  <a:srgbClr val="002060"/>
                 </a:solidFill>
               </a:rPr>
               <a:t>js</a:t>
             </a:r>
             <a:r>
-              <a:rPr lang="es-ES" sz="1700" dirty="0">
-                <a:solidFill>
-                  <a:schemeClr val="bg1"/>
+              <a:rPr lang="es-ES" sz="2000" dirty="0">
+                <a:solidFill>
+                  <a:srgbClr val="002060"/>
                 </a:solidFill>
               </a:rPr>
               <a:t>: funciones de HTTP</a:t>
@@ -6864,25 +6849,25 @@
               <a:buChar char="•"/>
             </a:pPr>
             <a:r>
-              <a:rPr lang="es-ES" sz="1700" dirty="0">
-                <a:solidFill>
-                  <a:schemeClr val="bg1"/>
+              <a:rPr lang="es-ES" sz="2000" dirty="0">
+                <a:solidFill>
+                  <a:srgbClr val="002060"/>
                 </a:solidFill>
               </a:rPr>
               <a:t>Neo4j driver: conectar </a:t>
             </a:r>
             <a:r>
-              <a:rPr lang="es-ES" sz="1700" dirty="0" err="1">
-                <a:solidFill>
-                  <a:schemeClr val="bg1"/>
+              <a:rPr lang="es-ES" sz="2000" dirty="0" err="1">
+                <a:solidFill>
+                  <a:srgbClr val="002060"/>
                 </a:solidFill>
               </a:rPr>
               <a:t>nodejs</a:t>
             </a:r>
             <a:r>
-              <a:rPr lang="es-ES" sz="1700" dirty="0">
-                <a:solidFill>
-                  <a:schemeClr val="bg1"/>
+              <a:rPr lang="es-ES" sz="2000" dirty="0">
+                <a:solidFill>
+                  <a:srgbClr val="002060"/>
                 </a:solidFill>
               </a:rPr>
               <a:t> con base de datos de grafos.</a:t>
@@ -6904,8 +6889,8 @@
         </p:nvSpPr>
         <p:spPr>
           <a:xfrm>
-            <a:off x="6096000" y="5198089"/>
-            <a:ext cx="5867400" cy="1015663"/>
+            <a:off x="838200" y="3677286"/>
+            <a:ext cx="7940040" cy="1384995"/>
           </a:xfrm>
           <a:prstGeom prst="rect">
             <a:avLst/>
@@ -6923,33 +6908,33 @@
               <a:buChar char="•"/>
             </a:pPr>
             <a:r>
-              <a:rPr lang="es-ES" sz="2000" dirty="0" err="1">
-                <a:solidFill>
-                  <a:schemeClr val="bg1"/>
+              <a:rPr lang="es-ES" sz="2800" dirty="0" err="1">
+                <a:solidFill>
+                  <a:srgbClr val="002060"/>
                 </a:solidFill>
               </a:rPr>
               <a:t>Vuejs</a:t>
             </a:r>
             <a:r>
-              <a:rPr lang="es-ES" sz="2000" dirty="0">
-                <a:solidFill>
-                  <a:schemeClr val="bg1"/>
+              <a:rPr lang="es-ES" sz="2800" dirty="0">
+                <a:solidFill>
+                  <a:srgbClr val="002060"/>
                 </a:solidFill>
               </a:rPr>
               <a:t>: </a:t>
             </a:r>
             <a:r>
-              <a:rPr lang="es-ES" sz="2000" dirty="0" err="1">
-                <a:solidFill>
-                  <a:schemeClr val="bg1"/>
+              <a:rPr lang="es-ES" sz="2800" dirty="0" err="1">
+                <a:solidFill>
+                  <a:srgbClr val="002060"/>
                 </a:solidFill>
               </a:rPr>
               <a:t>framework</a:t>
             </a:r>
             <a:r>
-              <a:rPr lang="es-ES" sz="2000" dirty="0">
-                <a:solidFill>
-                  <a:schemeClr val="bg1"/>
+              <a:rPr lang="es-ES" sz="2800" dirty="0">
+                <a:solidFill>
+                  <a:srgbClr val="002060"/>
                 </a:solidFill>
               </a:rPr>
               <a:t> para crear aplicaciones web.</a:t>
@@ -6961,33 +6946,33 @@
               <a:buChar char="•"/>
             </a:pPr>
             <a:r>
-              <a:rPr lang="es-ES" sz="2000" dirty="0" err="1">
-                <a:solidFill>
-                  <a:schemeClr val="bg1"/>
+              <a:rPr lang="es-ES" sz="2800" dirty="0" err="1">
+                <a:solidFill>
+                  <a:srgbClr val="002060"/>
                 </a:solidFill>
               </a:rPr>
               <a:t>Vuetify</a:t>
             </a:r>
             <a:r>
-              <a:rPr lang="es-ES" sz="2000" dirty="0">
-                <a:solidFill>
-                  <a:schemeClr val="bg1"/>
+              <a:rPr lang="es-ES" sz="2800" dirty="0">
+                <a:solidFill>
+                  <a:srgbClr val="002060"/>
                 </a:solidFill>
               </a:rPr>
               <a:t>: crear interfaces graficas con </a:t>
             </a:r>
             <a:r>
-              <a:rPr lang="es-ES" sz="2000" dirty="0" err="1">
-                <a:solidFill>
-                  <a:schemeClr val="bg1"/>
+              <a:rPr lang="es-ES" sz="2800" dirty="0" err="1">
+                <a:solidFill>
+                  <a:srgbClr val="002060"/>
                 </a:solidFill>
               </a:rPr>
               <a:t>vuejs</a:t>
             </a:r>
             <a:r>
-              <a:rPr lang="es-ES" sz="2000" dirty="0">
-                <a:solidFill>
-                  <a:schemeClr val="bg1"/>
+              <a:rPr lang="es-ES" sz="2800" dirty="0">
+                <a:solidFill>
+                  <a:srgbClr val="002060"/>
                 </a:solidFill>
               </a:rPr>
               <a:t>.</a:t>
@@ -6999,26 +6984,21 @@
               <a:buChar char="•"/>
             </a:pPr>
             <a:r>
-              <a:rPr lang="es-ES" sz="2000" dirty="0" err="1">
-                <a:solidFill>
-                  <a:schemeClr val="bg1"/>
+              <a:rPr lang="es-ES" sz="2800" dirty="0" err="1">
+                <a:solidFill>
+                  <a:srgbClr val="002060"/>
                 </a:solidFill>
               </a:rPr>
               <a:t>Axios</a:t>
             </a:r>
             <a:r>
-              <a:rPr lang="es-ES" sz="2000" dirty="0">
-                <a:solidFill>
-                  <a:schemeClr val="bg1"/>
+              <a:rPr lang="es-ES" sz="2800" dirty="0">
+                <a:solidFill>
+                  <a:srgbClr val="002060"/>
                 </a:solidFill>
               </a:rPr>
               <a:t>: peticiones HTTP desde cliente a servidor</a:t>
             </a:r>
-            <a:endParaRPr lang="es-ES" sz="1700" dirty="0">
-              <a:solidFill>
-                <a:schemeClr val="bg1"/>
-              </a:solidFill>
-            </a:endParaRPr>
           </a:p>
         </p:txBody>
       </p:sp>
@@ -7076,7 +7056,7 @@
             <a:r>
               <a:rPr lang="es-ES" dirty="0">
                 <a:solidFill>
-                  <a:schemeClr val="bg1"/>
+                  <a:srgbClr val="002060"/>
                 </a:solidFill>
               </a:rPr>
               <a:t>Composición de la aplicación.</a:t>
@@ -7103,7 +7083,7 @@
         <p:spPr>
           <a:xfrm>
             <a:off x="421512" y="1424961"/>
-            <a:ext cx="3270813" cy="1603375"/>
+            <a:ext cx="4135248" cy="2430759"/>
           </a:xfrm>
         </p:spPr>
         <p:txBody>
@@ -7113,9 +7093,9 @@
           <a:lstStyle/>
           <a:p>
             <a:r>
-              <a:rPr lang="es-ES" sz="2400" dirty="0">
-                <a:solidFill>
-                  <a:schemeClr val="bg1"/>
+              <a:rPr lang="es-ES" sz="3600" dirty="0">
+                <a:solidFill>
+                  <a:srgbClr val="002060"/>
                 </a:solidFill>
               </a:rPr>
               <a:t>Neo4j: </a:t>
@@ -7124,9 +7104,9 @@
           <a:p>
             <a:pPr lvl="1"/>
             <a:r>
-              <a:rPr lang="es-ES" sz="2000" dirty="0">
-                <a:solidFill>
-                  <a:schemeClr val="bg1"/>
+              <a:rPr lang="es-ES" sz="3200" dirty="0">
+                <a:solidFill>
+                  <a:srgbClr val="002060"/>
                 </a:solidFill>
               </a:rPr>
               <a:t>Compuesta por :</a:t>
@@ -7135,9 +7115,9 @@
           <a:p>
             <a:pPr lvl="2"/>
             <a:r>
-              <a:rPr lang="es-ES" sz="1400" dirty="0">
-                <a:solidFill>
-                  <a:schemeClr val="bg1"/>
+              <a:rPr lang="es-ES" dirty="0">
+                <a:solidFill>
+                  <a:srgbClr val="002060"/>
                 </a:solidFill>
               </a:rPr>
               <a:t>Nodo tipo equipo</a:t>
@@ -7146,9 +7126,9 @@
           <a:p>
             <a:pPr lvl="2"/>
             <a:r>
-              <a:rPr lang="es-ES" sz="1400" dirty="0">
-                <a:solidFill>
-                  <a:schemeClr val="bg1"/>
+              <a:rPr lang="es-ES" dirty="0">
+                <a:solidFill>
+                  <a:srgbClr val="002060"/>
                 </a:solidFill>
               </a:rPr>
               <a:t>Nodos tipo Jugador.</a:t>
@@ -7157,9 +7137,9 @@
           <a:p>
             <a:pPr lvl="2"/>
             <a:r>
-              <a:rPr lang="es-ES" sz="1400" dirty="0">
-                <a:solidFill>
-                  <a:schemeClr val="bg1"/>
+              <a:rPr lang="es-ES" dirty="0">
+                <a:solidFill>
+                  <a:srgbClr val="002060"/>
                 </a:solidFill>
               </a:rPr>
               <a:t>Relaciones JUGENA_EN</a:t>
@@ -7187,8 +7167,8 @@
         </p:nvSpPr>
         <p:spPr>
           <a:xfrm>
-            <a:off x="7373074" y="4047965"/>
-            <a:ext cx="4259483" cy="2308324"/>
+            <a:off x="6096000" y="3611880"/>
+            <a:ext cx="5943600" cy="3385542"/>
           </a:xfrm>
           <a:prstGeom prst="rect">
             <a:avLst/>
@@ -7206,9 +7186,9 @@
               <a:buChar char="•"/>
             </a:pPr>
             <a:r>
-              <a:rPr lang="es-ES" dirty="0">
-                <a:solidFill>
-                  <a:schemeClr val="bg1"/>
+              <a:rPr lang="es-ES" sz="2800" dirty="0">
+                <a:solidFill>
+                  <a:srgbClr val="002060"/>
                 </a:solidFill>
               </a:rPr>
               <a:t>Backend:</a:t>
@@ -7220,16 +7200,16 @@
               <a:buChar char="•"/>
             </a:pPr>
             <a:r>
-              <a:rPr lang="es-ES" dirty="0" err="1">
-                <a:solidFill>
-                  <a:schemeClr val="bg1"/>
+              <a:rPr lang="es-ES" sz="2800" dirty="0" err="1">
+                <a:solidFill>
+                  <a:srgbClr val="002060"/>
                 </a:solidFill>
               </a:rPr>
               <a:t>dameLosMejores</a:t>
             </a:r>
-            <a:endParaRPr lang="es-ES" dirty="0">
+            <a:endParaRPr lang="es-ES" sz="2800" dirty="0">
               <a:solidFill>
-                <a:schemeClr val="bg1"/>
+                <a:srgbClr val="002060"/>
               </a:solidFill>
             </a:endParaRPr>
           </a:p>
@@ -7239,17 +7219,17 @@
               <a:buChar char="•"/>
             </a:pPr>
             <a:r>
-              <a:rPr lang="es-ES" dirty="0" err="1">
-                <a:solidFill>
-                  <a:schemeClr val="bg1"/>
+              <a:rPr lang="es-ES" sz="2800" dirty="0" err="1">
+                <a:solidFill>
+                  <a:srgbClr val="002060"/>
                 </a:solidFill>
               </a:rPr>
               <a:t>dameJugadoresPromesas</a:t>
             </a:r>
             <a:r>
-              <a:rPr lang="es-ES" dirty="0">
-                <a:solidFill>
-                  <a:schemeClr val="bg1"/>
+              <a:rPr lang="es-ES" sz="2800" dirty="0">
+                <a:solidFill>
+                  <a:srgbClr val="002060"/>
                 </a:solidFill>
               </a:rPr>
               <a:t>.</a:t>
@@ -7261,17 +7241,17 @@
               <a:buChar char="•"/>
             </a:pPr>
             <a:r>
-              <a:rPr lang="es-ES" dirty="0" err="1">
-                <a:solidFill>
-                  <a:schemeClr val="bg1"/>
+              <a:rPr lang="es-ES" sz="2800" dirty="0" err="1">
+                <a:solidFill>
+                  <a:srgbClr val="002060"/>
                 </a:solidFill>
               </a:rPr>
               <a:t>dameNacionalidades</a:t>
             </a:r>
             <a:r>
-              <a:rPr lang="es-ES" dirty="0">
-                <a:solidFill>
-                  <a:schemeClr val="bg1"/>
+              <a:rPr lang="es-ES" sz="2800" dirty="0">
+                <a:solidFill>
+                  <a:srgbClr val="002060"/>
                 </a:solidFill>
               </a:rPr>
               <a:t>.</a:t>
@@ -7283,17 +7263,17 @@
               <a:buChar char="•"/>
             </a:pPr>
             <a:r>
-              <a:rPr lang="es-ES" dirty="0" err="1">
-                <a:solidFill>
-                  <a:schemeClr val="bg1"/>
+              <a:rPr lang="es-ES" sz="2800" dirty="0" err="1">
+                <a:solidFill>
+                  <a:srgbClr val="002060"/>
                 </a:solidFill>
               </a:rPr>
               <a:t>dameEquipos</a:t>
             </a:r>
             <a:r>
-              <a:rPr lang="es-ES" dirty="0">
-                <a:solidFill>
-                  <a:schemeClr val="bg1"/>
+              <a:rPr lang="es-ES" sz="2800" dirty="0">
+                <a:solidFill>
+                  <a:srgbClr val="002060"/>
                 </a:solidFill>
               </a:rPr>
               <a:t>.</a:t>
@@ -7305,17 +7285,17 @@
               <a:buChar char="•"/>
             </a:pPr>
             <a:r>
-              <a:rPr lang="es-ES" dirty="0" err="1">
-                <a:solidFill>
-                  <a:schemeClr val="bg1"/>
+              <a:rPr lang="es-ES" sz="2800" dirty="0" err="1">
+                <a:solidFill>
+                  <a:srgbClr val="002060"/>
                 </a:solidFill>
               </a:rPr>
               <a:t>damejugadoresConFiltros</a:t>
             </a:r>
             <a:r>
-              <a:rPr lang="es-ES" dirty="0">
-                <a:solidFill>
-                  <a:schemeClr val="bg1"/>
+              <a:rPr lang="es-ES" sz="2800" dirty="0">
+                <a:solidFill>
+                  <a:srgbClr val="002060"/>
                 </a:solidFill>
               </a:rPr>
               <a:t>.</a:t>
@@ -7327,17 +7307,17 @@
               <a:buChar char="•"/>
             </a:pPr>
             <a:r>
-              <a:rPr lang="es-ES" dirty="0" err="1">
-                <a:solidFill>
-                  <a:schemeClr val="bg1"/>
+              <a:rPr lang="es-ES" sz="2800" dirty="0" err="1">
+                <a:solidFill>
+                  <a:srgbClr val="002060"/>
                 </a:solidFill>
               </a:rPr>
               <a:t>dameJugadoresAleatorios</a:t>
             </a:r>
             <a:r>
-              <a:rPr lang="es-ES" dirty="0">
-                <a:solidFill>
-                  <a:schemeClr val="bg1"/>
+              <a:rPr lang="es-ES" sz="2800" dirty="0">
+                <a:solidFill>
+                  <a:srgbClr val="002060"/>
                 </a:solidFill>
               </a:rPr>
               <a:t>.</a:t>
@@ -7366,8 +7346,8 @@
         </p:nvSpPr>
         <p:spPr>
           <a:xfrm>
-            <a:off x="4109013" y="1551008"/>
-            <a:ext cx="2986268" cy="1477328"/>
+            <a:off x="838199" y="3740944"/>
+            <a:ext cx="4135247" cy="2246769"/>
           </a:xfrm>
           <a:prstGeom prst="rect">
             <a:avLst/>
@@ -7385,9 +7365,9 @@
               <a:buChar char="•"/>
             </a:pPr>
             <a:r>
-              <a:rPr lang="es-ES" dirty="0">
-                <a:solidFill>
-                  <a:schemeClr val="bg1"/>
+              <a:rPr lang="es-ES" sz="2800" dirty="0">
+                <a:solidFill>
+                  <a:srgbClr val="002060"/>
                 </a:solidFill>
               </a:rPr>
               <a:t>Frontend:</a:t>
@@ -7399,9 +7379,9 @@
               <a:buChar char="•"/>
             </a:pPr>
             <a:r>
-              <a:rPr lang="es-ES" dirty="0">
-                <a:solidFill>
-                  <a:schemeClr val="bg1"/>
+              <a:rPr lang="es-ES" sz="2800" dirty="0">
+                <a:solidFill>
+                  <a:srgbClr val="002060"/>
                 </a:solidFill>
               </a:rPr>
               <a:t>Jugadores Aleatorios.</a:t>
@@ -7413,9 +7393,9 @@
               <a:buChar char="•"/>
             </a:pPr>
             <a:r>
-              <a:rPr lang="es-ES" dirty="0">
-                <a:solidFill>
-                  <a:schemeClr val="bg1"/>
+              <a:rPr lang="es-ES" sz="2800" dirty="0">
+                <a:solidFill>
+                  <a:srgbClr val="002060"/>
                 </a:solidFill>
               </a:rPr>
               <a:t>Jugadores con filtros.</a:t>
@@ -7427,9 +7407,9 @@
               <a:buChar char="•"/>
             </a:pPr>
             <a:r>
-              <a:rPr lang="es-ES" dirty="0">
-                <a:solidFill>
-                  <a:schemeClr val="bg1"/>
+              <a:rPr lang="es-ES" sz="2800" dirty="0">
+                <a:solidFill>
+                  <a:srgbClr val="002060"/>
                 </a:solidFill>
               </a:rPr>
               <a:t>Mejores promesas.</a:t>
@@ -7441,9 +7421,9 @@
               <a:buChar char="•"/>
             </a:pPr>
             <a:r>
-              <a:rPr lang="es-ES" dirty="0">
-                <a:solidFill>
-                  <a:schemeClr val="bg1"/>
+              <a:rPr lang="es-ES" sz="2800" dirty="0">
+                <a:solidFill>
+                  <a:srgbClr val="002060"/>
                 </a:solidFill>
               </a:rPr>
               <a:t>Mejores jugadores</a:t>
@@ -7505,7 +7485,7 @@
             <a:r>
               <a:rPr lang="es-ES" dirty="0">
                 <a:solidFill>
-                  <a:schemeClr val="bg1"/>
+                  <a:srgbClr val="002060"/>
                 </a:solidFill>
               </a:rPr>
               <a:t>DAFO</a:t>
@@ -7529,7 +7509,7 @@
             <p:ph idx="1"/>
             <p:extLst>
               <p:ext uri="{D42A27DB-BD31-4B8C-83A1-F6EECF244321}">
-                <p14:modId xmlns:p14="http://schemas.microsoft.com/office/powerpoint/2010/main" val="2251559491"/>
+                <p14:modId xmlns:p14="http://schemas.microsoft.com/office/powerpoint/2010/main" val="151810814"/>
               </p:ext>
             </p:extLst>
           </p:nvPr>
@@ -7598,7 +7578,7 @@
             <a:r>
               <a:rPr lang="es-ES" dirty="0">
                 <a:solidFill>
-                  <a:schemeClr val="bg1"/>
+                  <a:srgbClr val="002060"/>
                 </a:solidFill>
               </a:rPr>
               <a:t>Líneas de futuro</a:t>
@@ -7624,20 +7604,20 @@
         </p:nvSpPr>
         <p:spPr>
           <a:xfrm>
-            <a:off x="838200" y="1825625"/>
-            <a:ext cx="4300959" cy="2457008"/>
+            <a:off x="1554480" y="2435225"/>
+            <a:ext cx="8092440" cy="2457008"/>
           </a:xfrm>
         </p:spPr>
         <p:txBody>
           <a:bodyPr>
-            <a:normAutofit fontScale="92500" lnSpcReduction="10000"/>
+            <a:normAutofit/>
           </a:bodyPr>
           <a:lstStyle/>
           <a:p>
             <a:r>
               <a:rPr lang="es-ES" dirty="0">
                 <a:solidFill>
-                  <a:schemeClr val="bg1"/>
+                  <a:srgbClr val="002060"/>
                 </a:solidFill>
               </a:rPr>
               <a:t>Aplicación mejorada con mas parámetros de búsqueda.</a:t>
@@ -7647,7 +7627,7 @@
             <a:r>
               <a:rPr lang="es-ES" dirty="0">
                 <a:solidFill>
-                  <a:schemeClr val="bg1"/>
+                  <a:srgbClr val="002060"/>
                 </a:solidFill>
               </a:rPr>
               <a:t>Mas herramientas tecnologías en el mundo del futbol usando inteligencia artificial.</a:t>
@@ -7669,8 +7649,8 @@
         </p:nvSpPr>
         <p:spPr>
           <a:xfrm>
-            <a:off x="6632294" y="4016415"/>
-            <a:ext cx="4826643" cy="1692771"/>
+            <a:off x="1554480" y="4260255"/>
+            <a:ext cx="7254240" cy="892552"/>
           </a:xfrm>
           <a:prstGeom prst="rect">
             <a:avLst/>
@@ -7690,7 +7670,7 @@
             <a:r>
               <a:rPr lang="es-ES" sz="2600" dirty="0">
                 <a:solidFill>
-                  <a:schemeClr val="bg1"/>
+                  <a:srgbClr val="002060"/>
                 </a:solidFill>
               </a:rPr>
               <a:t>Herramientas que permita que equipos mas humildes compitan, cara a cara, con los grandes.</a:t>
@@ -7752,7 +7732,7 @@
             <a:r>
               <a:rPr lang="es-ES" dirty="0">
                 <a:solidFill>
-                  <a:schemeClr val="bg1"/>
+                  <a:srgbClr val="002060"/>
                 </a:solidFill>
               </a:rPr>
               <a:t>Lecciones aprendidas</a:t>
@@ -7789,63 +7769,71 @@
             <a:r>
               <a:rPr lang="es-ES" dirty="0">
                 <a:solidFill>
+                  <a:srgbClr val="002060"/>
+                </a:solidFill>
+              </a:rPr>
+              <a:t>Aprendizaje autónomo de neo4j.</a:t>
+            </a:r>
+          </a:p>
+          <a:p>
+            <a:pPr lvl="1"/>
+            <a:r>
+              <a:rPr lang="es-ES" dirty="0">
+                <a:solidFill>
+                  <a:srgbClr val="002060"/>
+                </a:solidFill>
+              </a:rPr>
+              <a:t>Libros</a:t>
+            </a:r>
+          </a:p>
+          <a:p>
+            <a:pPr lvl="1"/>
+            <a:r>
+              <a:rPr lang="es-ES" dirty="0">
+                <a:solidFill>
+                  <a:srgbClr val="002060"/>
+                </a:solidFill>
+              </a:rPr>
+              <a:t>Consejos del profesor</a:t>
+            </a:r>
+          </a:p>
+          <a:p>
+            <a:pPr lvl="1"/>
+            <a:r>
+              <a:rPr lang="es-ES" dirty="0">
+                <a:solidFill>
+                  <a:srgbClr val="002060"/>
+                </a:solidFill>
+              </a:rPr>
+              <a:t>Tutoriales neo4j</a:t>
+            </a:r>
+          </a:p>
+          <a:p>
+            <a:r>
+              <a:rPr lang="es-ES" dirty="0">
+                <a:solidFill>
+                  <a:srgbClr val="002060"/>
+                </a:solidFill>
+              </a:rPr>
+              <a:t>Descubrimiento de nuevo método para desarrollo.</a:t>
+            </a:r>
+          </a:p>
+          <a:p>
+            <a:r>
+              <a:rPr lang="es-ES" dirty="0">
+                <a:solidFill>
+                  <a:srgbClr val="002060"/>
+                </a:solidFill>
+              </a:rPr>
+              <a:t>Autonomía de desarrollo</a:t>
+            </a:r>
+            <a:r>
+              <a:rPr lang="es-ES" dirty="0">
+                <a:solidFill>
                   <a:schemeClr val="bg1"/>
                 </a:solidFill>
               </a:rPr>
-              <a:t>Aprendizaje autónomo de neo4j.</a:t>
-            </a:r>
-          </a:p>
-          <a:p>
-            <a:pPr lvl="1"/>
-            <a:r>
-              <a:rPr lang="es-ES" dirty="0">
-                <a:solidFill>
-                  <a:schemeClr val="bg1"/>
-                </a:solidFill>
-              </a:rPr>
-              <a:t>Libros</a:t>
-            </a:r>
-          </a:p>
-          <a:p>
-            <a:pPr lvl="1"/>
-            <a:r>
-              <a:rPr lang="es-ES" dirty="0">
-                <a:solidFill>
-                  <a:schemeClr val="bg1"/>
-                </a:solidFill>
-              </a:rPr>
-              <a:t>Consejos del profesor</a:t>
-            </a:r>
-          </a:p>
-          <a:p>
-            <a:pPr lvl="1"/>
-            <a:r>
-              <a:rPr lang="es-ES" dirty="0">
-                <a:solidFill>
-                  <a:schemeClr val="bg1"/>
-                </a:solidFill>
-              </a:rPr>
-              <a:t>Tutoriales neo4j</a:t>
-            </a:r>
-          </a:p>
-          <a:p>
-            <a:r>
-              <a:rPr lang="es-ES" dirty="0">
-                <a:solidFill>
-                  <a:schemeClr val="bg1"/>
-                </a:solidFill>
-              </a:rPr>
-              <a:t>Descubrimiento de nuevo método para desarrollo.</a:t>
-            </a:r>
-          </a:p>
-          <a:p>
-            <a:r>
-              <a:rPr lang="es-ES" dirty="0">
-                <a:solidFill>
-                  <a:schemeClr val="bg1"/>
-                </a:solidFill>
-              </a:rPr>
-              <a:t>Autonomía de desarrollo.</a:t>
+              <a:t>.</a:t>
             </a:r>
           </a:p>
         </p:txBody>

</xml_diff>

<commit_message>
Arreglado un pto del indice y pdf de memoria y presentacion
</commit_message>
<xml_diff>
--- a/Presentacion FutbolFichajes.pptx
+++ b/Presentacion FutbolFichajes.pptx
@@ -2864,7 +2864,7 @@
           <a:p>
             <a:fld id="{AF2B4D62-3BA8-E643-8809-D7017F5BF04E}" type="datetimeFigureOut">
               <a:rPr lang="es-ES" smtClean="0"/>
-              <a:t>6/12/20</a:t>
+              <a:t>7/12/20</a:t>
             </a:fld>
             <a:endParaRPr lang="es-ES"/>
           </a:p>
@@ -3062,7 +3062,7 @@
           <a:p>
             <a:fld id="{AF2B4D62-3BA8-E643-8809-D7017F5BF04E}" type="datetimeFigureOut">
               <a:rPr lang="es-ES" smtClean="0"/>
-              <a:t>6/12/20</a:t>
+              <a:t>7/12/20</a:t>
             </a:fld>
             <a:endParaRPr lang="es-ES"/>
           </a:p>
@@ -3270,7 +3270,7 @@
           <a:p>
             <a:fld id="{AF2B4D62-3BA8-E643-8809-D7017F5BF04E}" type="datetimeFigureOut">
               <a:rPr lang="es-ES" smtClean="0"/>
-              <a:t>6/12/20</a:t>
+              <a:t>7/12/20</a:t>
             </a:fld>
             <a:endParaRPr lang="es-ES"/>
           </a:p>
@@ -3468,7 +3468,7 @@
           <a:p>
             <a:fld id="{AF2B4D62-3BA8-E643-8809-D7017F5BF04E}" type="datetimeFigureOut">
               <a:rPr lang="es-ES" smtClean="0"/>
-              <a:t>6/12/20</a:t>
+              <a:t>7/12/20</a:t>
             </a:fld>
             <a:endParaRPr lang="es-ES"/>
           </a:p>
@@ -3743,7 +3743,7 @@
           <a:p>
             <a:fld id="{AF2B4D62-3BA8-E643-8809-D7017F5BF04E}" type="datetimeFigureOut">
               <a:rPr lang="es-ES" smtClean="0"/>
-              <a:t>6/12/20</a:t>
+              <a:t>7/12/20</a:t>
             </a:fld>
             <a:endParaRPr lang="es-ES"/>
           </a:p>
@@ -4008,7 +4008,7 @@
           <a:p>
             <a:fld id="{AF2B4D62-3BA8-E643-8809-D7017F5BF04E}" type="datetimeFigureOut">
               <a:rPr lang="es-ES" smtClean="0"/>
-              <a:t>6/12/20</a:t>
+              <a:t>7/12/20</a:t>
             </a:fld>
             <a:endParaRPr lang="es-ES"/>
           </a:p>
@@ -4420,7 +4420,7 @@
           <a:p>
             <a:fld id="{AF2B4D62-3BA8-E643-8809-D7017F5BF04E}" type="datetimeFigureOut">
               <a:rPr lang="es-ES" smtClean="0"/>
-              <a:t>6/12/20</a:t>
+              <a:t>7/12/20</a:t>
             </a:fld>
             <a:endParaRPr lang="es-ES"/>
           </a:p>
@@ -4561,7 +4561,7 @@
           <a:p>
             <a:fld id="{AF2B4D62-3BA8-E643-8809-D7017F5BF04E}" type="datetimeFigureOut">
               <a:rPr lang="es-ES" smtClean="0"/>
-              <a:t>6/12/20</a:t>
+              <a:t>7/12/20</a:t>
             </a:fld>
             <a:endParaRPr lang="es-ES"/>
           </a:p>
@@ -4674,7 +4674,7 @@
           <a:p>
             <a:fld id="{AF2B4D62-3BA8-E643-8809-D7017F5BF04E}" type="datetimeFigureOut">
               <a:rPr lang="es-ES" smtClean="0"/>
-              <a:t>6/12/20</a:t>
+              <a:t>7/12/20</a:t>
             </a:fld>
             <a:endParaRPr lang="es-ES"/>
           </a:p>
@@ -4985,7 +4985,7 @@
           <a:p>
             <a:fld id="{AF2B4D62-3BA8-E643-8809-D7017F5BF04E}" type="datetimeFigureOut">
               <a:rPr lang="es-ES" smtClean="0"/>
-              <a:t>6/12/20</a:t>
+              <a:t>7/12/20</a:t>
             </a:fld>
             <a:endParaRPr lang="es-ES"/>
           </a:p>
@@ -5276,7 +5276,7 @@
           <a:p>
             <a:fld id="{AF2B4D62-3BA8-E643-8809-D7017F5BF04E}" type="datetimeFigureOut">
               <a:rPr lang="es-ES" smtClean="0"/>
-              <a:t>6/12/20</a:t>
+              <a:t>7/12/20</a:t>
             </a:fld>
             <a:endParaRPr lang="es-ES"/>
           </a:p>
@@ -5526,7 +5526,7 @@
           <a:p>
             <a:fld id="{AF2B4D62-3BA8-E643-8809-D7017F5BF04E}" type="datetimeFigureOut">
               <a:rPr lang="es-ES" smtClean="0"/>
-              <a:t>6/12/20</a:t>
+              <a:t>7/12/20</a:t>
             </a:fld>
             <a:endParaRPr lang="es-ES"/>
           </a:p>
@@ -6181,26 +6181,20 @@
               <a:buAutoNum type="arabicPeriod"/>
             </a:pPr>
             <a:r>
+              <a:rPr lang="es-ES">
+                <a:solidFill>
+                  <a:srgbClr val="002060"/>
+                </a:solidFill>
+              </a:rPr>
+              <a:t>DAFO</a:t>
+            </a:r>
+            <a:r>
               <a:rPr lang="es-ES" dirty="0">
                 <a:solidFill>
                   <a:srgbClr val="002060"/>
                 </a:solidFill>
               </a:rPr>
-              <a:t>Análisis de resultados.</a:t>
-            </a:r>
-          </a:p>
-          <a:p>
-            <a:pPr marL="514350" indent="-514350">
-              <a:buFont typeface="+mj-lt"/>
-              <a:buAutoNum type="arabicPeriod"/>
-            </a:pPr>
-            <a:r>
-              <a:rPr lang="es-ES" dirty="0">
-                <a:solidFill>
-                  <a:srgbClr val="002060"/>
-                </a:solidFill>
-              </a:rPr>
-              <a:t>DAFO.</a:t>
+              <a:t>.</a:t>
             </a:r>
           </a:p>
           <a:p>

</xml_diff>

<commit_message>
añadido los videos y los pdf correctamente
</commit_message>
<xml_diff>
--- a/Presentacion FutbolFichajes.pptx
+++ b/Presentacion FutbolFichajes.pptx
@@ -2864,7 +2864,7 @@
           <a:p>
             <a:fld id="{AF2B4D62-3BA8-E643-8809-D7017F5BF04E}" type="datetimeFigureOut">
               <a:rPr lang="es-ES" smtClean="0"/>
-              <a:t>7/12/20</a:t>
+              <a:t>8/12/20</a:t>
             </a:fld>
             <a:endParaRPr lang="es-ES"/>
           </a:p>
@@ -3062,7 +3062,7 @@
           <a:p>
             <a:fld id="{AF2B4D62-3BA8-E643-8809-D7017F5BF04E}" type="datetimeFigureOut">
               <a:rPr lang="es-ES" smtClean="0"/>
-              <a:t>7/12/20</a:t>
+              <a:t>8/12/20</a:t>
             </a:fld>
             <a:endParaRPr lang="es-ES"/>
           </a:p>
@@ -3270,7 +3270,7 @@
           <a:p>
             <a:fld id="{AF2B4D62-3BA8-E643-8809-D7017F5BF04E}" type="datetimeFigureOut">
               <a:rPr lang="es-ES" smtClean="0"/>
-              <a:t>7/12/20</a:t>
+              <a:t>8/12/20</a:t>
             </a:fld>
             <a:endParaRPr lang="es-ES"/>
           </a:p>
@@ -3468,7 +3468,7 @@
           <a:p>
             <a:fld id="{AF2B4D62-3BA8-E643-8809-D7017F5BF04E}" type="datetimeFigureOut">
               <a:rPr lang="es-ES" smtClean="0"/>
-              <a:t>7/12/20</a:t>
+              <a:t>8/12/20</a:t>
             </a:fld>
             <a:endParaRPr lang="es-ES"/>
           </a:p>
@@ -3743,7 +3743,7 @@
           <a:p>
             <a:fld id="{AF2B4D62-3BA8-E643-8809-D7017F5BF04E}" type="datetimeFigureOut">
               <a:rPr lang="es-ES" smtClean="0"/>
-              <a:t>7/12/20</a:t>
+              <a:t>8/12/20</a:t>
             </a:fld>
             <a:endParaRPr lang="es-ES"/>
           </a:p>
@@ -4008,7 +4008,7 @@
           <a:p>
             <a:fld id="{AF2B4D62-3BA8-E643-8809-D7017F5BF04E}" type="datetimeFigureOut">
               <a:rPr lang="es-ES" smtClean="0"/>
-              <a:t>7/12/20</a:t>
+              <a:t>8/12/20</a:t>
             </a:fld>
             <a:endParaRPr lang="es-ES"/>
           </a:p>
@@ -4420,7 +4420,7 @@
           <a:p>
             <a:fld id="{AF2B4D62-3BA8-E643-8809-D7017F5BF04E}" type="datetimeFigureOut">
               <a:rPr lang="es-ES" smtClean="0"/>
-              <a:t>7/12/20</a:t>
+              <a:t>8/12/20</a:t>
             </a:fld>
             <a:endParaRPr lang="es-ES"/>
           </a:p>
@@ -4561,7 +4561,7 @@
           <a:p>
             <a:fld id="{AF2B4D62-3BA8-E643-8809-D7017F5BF04E}" type="datetimeFigureOut">
               <a:rPr lang="es-ES" smtClean="0"/>
-              <a:t>7/12/20</a:t>
+              <a:t>8/12/20</a:t>
             </a:fld>
             <a:endParaRPr lang="es-ES"/>
           </a:p>
@@ -4674,7 +4674,7 @@
           <a:p>
             <a:fld id="{AF2B4D62-3BA8-E643-8809-D7017F5BF04E}" type="datetimeFigureOut">
               <a:rPr lang="es-ES" smtClean="0"/>
-              <a:t>7/12/20</a:t>
+              <a:t>8/12/20</a:t>
             </a:fld>
             <a:endParaRPr lang="es-ES"/>
           </a:p>
@@ -4985,7 +4985,7 @@
           <a:p>
             <a:fld id="{AF2B4D62-3BA8-E643-8809-D7017F5BF04E}" type="datetimeFigureOut">
               <a:rPr lang="es-ES" smtClean="0"/>
-              <a:t>7/12/20</a:t>
+              <a:t>8/12/20</a:t>
             </a:fld>
             <a:endParaRPr lang="es-ES"/>
           </a:p>
@@ -5276,7 +5276,7 @@
           <a:p>
             <a:fld id="{AF2B4D62-3BA8-E643-8809-D7017F5BF04E}" type="datetimeFigureOut">
               <a:rPr lang="es-ES" smtClean="0"/>
-              <a:t>7/12/20</a:t>
+              <a:t>8/12/20</a:t>
             </a:fld>
             <a:endParaRPr lang="es-ES"/>
           </a:p>
@@ -5526,7 +5526,7 @@
           <a:p>
             <a:fld id="{AF2B4D62-3BA8-E643-8809-D7017F5BF04E}" type="datetimeFigureOut">
               <a:rPr lang="es-ES" smtClean="0"/>
-              <a:t>7/12/20</a:t>
+              <a:t>8/12/20</a:t>
             </a:fld>
             <a:endParaRPr lang="es-ES"/>
           </a:p>
@@ -7131,12 +7131,20 @@
           <a:p>
             <a:pPr lvl="2"/>
             <a:r>
+              <a:rPr lang="es-ES">
+                <a:solidFill>
+                  <a:srgbClr val="002060"/>
+                </a:solidFill>
+              </a:rPr>
+              <a:t>Relaciones JUEGA_</a:t>
+            </a:r>
+            <a:r>
               <a:rPr lang="es-ES" dirty="0">
                 <a:solidFill>
                   <a:srgbClr val="002060"/>
                 </a:solidFill>
               </a:rPr>
-              <a:t>Relaciones JUGENA_EN</a:t>
+              <a:t>EN</a:t>
             </a:r>
           </a:p>
           <a:p>

</xml_diff>